<commit_message>
Modify ppt content & README
</commit_message>
<xml_diff>
--- a/Presentation/ScalaTeam9Planning.pptx
+++ b/Presentation/ScalaTeam9Planning.pptx
@@ -1,41 +1,27 @@
 
 <file path=ppt/presentation.xml><?xml version="1.0" encoding="utf-8"?>
-<p:presentation xmlns:a="http://schemas.openxmlformats.org/drawingml/2006/main" xmlns:r="http://schemas.openxmlformats.org/officeDocument/2006/relationships" xmlns:mc="http://schemas.openxmlformats.org/markup-compatibility/2006" xmlns:mv="urn:schemas-microsoft-com:mac:vml" xmlns:p="http://schemas.openxmlformats.org/presentationml/2006/main" xmlns:c="http://schemas.openxmlformats.org/drawingml/2006/chart" xmlns:dgm="http://schemas.openxmlformats.org/drawingml/2006/diagram" xmlns:o="urn:schemas-microsoft-com:office:office" xmlns:v="urn:schemas-microsoft-com:vml" xmlns:pvml="urn:schemas-microsoft-com:office:powerpoint" xmlns:com="http://schemas.openxmlformats.org/drawingml/2006/compatibility" xmlns:p14="http://schemas.microsoft.com/office/powerpoint/2010/main" xmlns:p15="http://schemas.microsoft.com/office/powerpoint/2012/main" autoCompressPictures="0" embedTrueTypeFonts="1" strictFirstAndLastChars="0" saveSubsetFonts="1">
+<p:presentation xmlns:a="http://schemas.openxmlformats.org/drawingml/2006/main" xmlns:r="http://schemas.openxmlformats.org/officeDocument/2006/relationships" xmlns:p="http://schemas.openxmlformats.org/presentationml/2006/main" strictFirstAndLastChars="0" saveSubsetFonts="1" autoCompressPictures="0">
   <p:sldMasterIdLst>
-    <p:sldMasterId id="2147483659" r:id="rId3"/>
+    <p:sldMasterId id="2147483659" r:id="rId1"/>
   </p:sldMasterIdLst>
   <p:notesMasterIdLst>
-    <p:notesMasterId r:id="rId4"/>
+    <p:notesMasterId r:id="rId11"/>
   </p:notesMasterIdLst>
   <p:sldIdLst>
-    <p:sldId id="256" r:id="rId5"/>
-    <p:sldId id="257" r:id="rId6"/>
-    <p:sldId id="258" r:id="rId7"/>
-    <p:sldId id="259" r:id="rId8"/>
-    <p:sldId id="260" r:id="rId9"/>
-    <p:sldId id="261" r:id="rId10"/>
-    <p:sldId id="262" r:id="rId11"/>
-    <p:sldId id="263" r:id="rId12"/>
-    <p:sldId id="264" r:id="rId13"/>
+    <p:sldId id="256" r:id="rId2"/>
+    <p:sldId id="257" r:id="rId3"/>
+    <p:sldId id="258" r:id="rId4"/>
+    <p:sldId id="259" r:id="rId5"/>
+    <p:sldId id="260" r:id="rId6"/>
+    <p:sldId id="261" r:id="rId7"/>
+    <p:sldId id="262" r:id="rId8"/>
+    <p:sldId id="263" r:id="rId9"/>
+    <p:sldId id="264" r:id="rId10"/>
   </p:sldIdLst>
-  <p:sldSz cy="5143500" cx="9144000"/>
+  <p:sldSz cx="9144000" cy="5143500" type="screen16x9"/>
   <p:notesSz cx="6858000" cy="9144000"/>
-  <p:embeddedFontLst>
-    <p:embeddedFont>
-      <p:font typeface="Roboto Slab"/>
-      <p:regular r:id="rId14"/>
-      <p:bold r:id="rId15"/>
-    </p:embeddedFont>
-    <p:embeddedFont>
-      <p:font typeface="Roboto"/>
-      <p:regular r:id="rId16"/>
-      <p:bold r:id="rId17"/>
-      <p:italic r:id="rId18"/>
-      <p:boldItalic r:id="rId19"/>
-    </p:embeddedFont>
-  </p:embeddedFontLst>
   <p:defaultTextStyle>
-    <a:defPPr lvl="0" marR="0" rtl="0" algn="l">
+    <a:defPPr marR="0" lvl="0" algn="l" rtl="0">
       <a:lnSpc>
         <a:spcPct val="100000"/>
       </a:lnSpc>
@@ -46,7 +32,7 @@
         <a:spcPts val="0"/>
       </a:spcAft>
     </a:defPPr>
-    <a:lvl1pPr lvl="0" marR="0" rtl="0" algn="l">
+    <a:lvl1pPr marR="0" lvl="0" algn="l" rtl="0">
       <a:lnSpc>
         <a:spcPct val="100000"/>
       </a:lnSpc>
@@ -57,7 +43,7 @@
         <a:spcPts val="0"/>
       </a:spcAft>
       <a:buNone/>
-      <a:defRPr b="0" i="0" sz="1400" u="none" cap="none" strike="noStrike">
+      <a:defRPr sz="1400" b="0" i="0" u="none" strike="noStrike" cap="none">
         <a:solidFill>
           <a:srgbClr val="000000"/>
         </a:solidFill>
@@ -67,7 +53,7 @@
         <a:sym typeface="Arial"/>
       </a:defRPr>
     </a:lvl1pPr>
-    <a:lvl2pPr lvl="1" marR="0" rtl="0" algn="l">
+    <a:lvl2pPr marR="0" lvl="1" algn="l" rtl="0">
       <a:lnSpc>
         <a:spcPct val="100000"/>
       </a:lnSpc>
@@ -78,7 +64,7 @@
         <a:spcPts val="0"/>
       </a:spcAft>
       <a:buNone/>
-      <a:defRPr b="0" i="0" sz="1400" u="none" cap="none" strike="noStrike">
+      <a:defRPr sz="1400" b="0" i="0" u="none" strike="noStrike" cap="none">
         <a:solidFill>
           <a:srgbClr val="000000"/>
         </a:solidFill>
@@ -88,7 +74,7 @@
         <a:sym typeface="Arial"/>
       </a:defRPr>
     </a:lvl2pPr>
-    <a:lvl3pPr lvl="2" marR="0" rtl="0" algn="l">
+    <a:lvl3pPr marR="0" lvl="2" algn="l" rtl="0">
       <a:lnSpc>
         <a:spcPct val="100000"/>
       </a:lnSpc>
@@ -99,7 +85,7 @@
         <a:spcPts val="0"/>
       </a:spcAft>
       <a:buNone/>
-      <a:defRPr b="0" i="0" sz="1400" u="none" cap="none" strike="noStrike">
+      <a:defRPr sz="1400" b="0" i="0" u="none" strike="noStrike" cap="none">
         <a:solidFill>
           <a:srgbClr val="000000"/>
         </a:solidFill>
@@ -109,7 +95,7 @@
         <a:sym typeface="Arial"/>
       </a:defRPr>
     </a:lvl3pPr>
-    <a:lvl4pPr lvl="3" marR="0" rtl="0" algn="l">
+    <a:lvl4pPr marR="0" lvl="3" algn="l" rtl="0">
       <a:lnSpc>
         <a:spcPct val="100000"/>
       </a:lnSpc>
@@ -120,7 +106,7 @@
         <a:spcPts val="0"/>
       </a:spcAft>
       <a:buNone/>
-      <a:defRPr b="0" i="0" sz="1400" u="none" cap="none" strike="noStrike">
+      <a:defRPr sz="1400" b="0" i="0" u="none" strike="noStrike" cap="none">
         <a:solidFill>
           <a:srgbClr val="000000"/>
         </a:solidFill>
@@ -130,7 +116,7 @@
         <a:sym typeface="Arial"/>
       </a:defRPr>
     </a:lvl4pPr>
-    <a:lvl5pPr lvl="4" marR="0" rtl="0" algn="l">
+    <a:lvl5pPr marR="0" lvl="4" algn="l" rtl="0">
       <a:lnSpc>
         <a:spcPct val="100000"/>
       </a:lnSpc>
@@ -141,7 +127,7 @@
         <a:spcPts val="0"/>
       </a:spcAft>
       <a:buNone/>
-      <a:defRPr b="0" i="0" sz="1400" u="none" cap="none" strike="noStrike">
+      <a:defRPr sz="1400" b="0" i="0" u="none" strike="noStrike" cap="none">
         <a:solidFill>
           <a:srgbClr val="000000"/>
         </a:solidFill>
@@ -151,7 +137,7 @@
         <a:sym typeface="Arial"/>
       </a:defRPr>
     </a:lvl5pPr>
-    <a:lvl6pPr lvl="5" marR="0" rtl="0" algn="l">
+    <a:lvl6pPr marR="0" lvl="5" algn="l" rtl="0">
       <a:lnSpc>
         <a:spcPct val="100000"/>
       </a:lnSpc>
@@ -162,7 +148,7 @@
         <a:spcPts val="0"/>
       </a:spcAft>
       <a:buNone/>
-      <a:defRPr b="0" i="0" sz="1400" u="none" cap="none" strike="noStrike">
+      <a:defRPr sz="1400" b="0" i="0" u="none" strike="noStrike" cap="none">
         <a:solidFill>
           <a:srgbClr val="000000"/>
         </a:solidFill>
@@ -172,7 +158,7 @@
         <a:sym typeface="Arial"/>
       </a:defRPr>
     </a:lvl6pPr>
-    <a:lvl7pPr lvl="6" marR="0" rtl="0" algn="l">
+    <a:lvl7pPr marR="0" lvl="6" algn="l" rtl="0">
       <a:lnSpc>
         <a:spcPct val="100000"/>
       </a:lnSpc>
@@ -183,7 +169,7 @@
         <a:spcPts val="0"/>
       </a:spcAft>
       <a:buNone/>
-      <a:defRPr b="0" i="0" sz="1400" u="none" cap="none" strike="noStrike">
+      <a:defRPr sz="1400" b="0" i="0" u="none" strike="noStrike" cap="none">
         <a:solidFill>
           <a:srgbClr val="000000"/>
         </a:solidFill>
@@ -193,7 +179,7 @@
         <a:sym typeface="Arial"/>
       </a:defRPr>
     </a:lvl7pPr>
-    <a:lvl8pPr lvl="7" marR="0" rtl="0" algn="l">
+    <a:lvl8pPr marR="0" lvl="7" algn="l" rtl="0">
       <a:lnSpc>
         <a:spcPct val="100000"/>
       </a:lnSpc>
@@ -204,7 +190,7 @@
         <a:spcPts val="0"/>
       </a:spcAft>
       <a:buNone/>
-      <a:defRPr b="0" i="0" sz="1400" u="none" cap="none" strike="noStrike">
+      <a:defRPr sz="1400" b="0" i="0" u="none" strike="noStrike" cap="none">
         <a:solidFill>
           <a:srgbClr val="000000"/>
         </a:solidFill>
@@ -214,7 +200,7 @@
         <a:sym typeface="Arial"/>
       </a:defRPr>
     </a:lvl8pPr>
-    <a:lvl9pPr lvl="8" marR="0" rtl="0" algn="l">
+    <a:lvl9pPr marR="0" lvl="8" algn="l" rtl="0">
       <a:lnSpc>
         <a:spcPct val="100000"/>
       </a:lnSpc>
@@ -225,7 +211,7 @@
         <a:spcPts val="0"/>
       </a:spcAft>
       <a:buNone/>
-      <a:defRPr b="0" i="0" sz="1400" u="none" cap="none" strike="noStrike">
+      <a:defRPr sz="1400" b="0" i="0" u="none" strike="noStrike" cap="none">
         <a:solidFill>
           <a:srgbClr val="000000"/>
         </a:solidFill>
@@ -240,11 +226,16 @@
 </file>
 
 <file path=ppt/notesMasters/notesMaster1.xml><?xml version="1.0" encoding="utf-8"?>
-<p:notesMaster xmlns:a="http://schemas.openxmlformats.org/drawingml/2006/main" xmlns:r="http://schemas.openxmlformats.org/officeDocument/2006/relationships" xmlns:mc="http://schemas.openxmlformats.org/markup-compatibility/2006" xmlns:mv="urn:schemas-microsoft-com:mac:vml" xmlns:p="http://schemas.openxmlformats.org/presentationml/2006/main" xmlns:c="http://schemas.openxmlformats.org/drawingml/2006/chart" xmlns:dgm="http://schemas.openxmlformats.org/drawingml/2006/diagram" xmlns:o="urn:schemas-microsoft-com:office:office" xmlns:v="urn:schemas-microsoft-com:vml" xmlns:pvml="urn:schemas-microsoft-com:office:powerpoint" xmlns:com="http://schemas.openxmlformats.org/drawingml/2006/compatibility" xmlns:p14="http://schemas.microsoft.com/office/powerpoint/2010/main" xmlns:p15="http://schemas.microsoft.com/office/powerpoint/2012/main">
+<p:notesMaster xmlns:a="http://schemas.openxmlformats.org/drawingml/2006/main" xmlns:r="http://schemas.openxmlformats.org/officeDocument/2006/relationships" xmlns:p="http://schemas.openxmlformats.org/presentationml/2006/main">
   <p:cSld>
+    <p:bg>
+      <p:bgRef idx="1001">
+        <a:schemeClr val="bg1"/>
+      </p:bgRef>
+    </p:bg>
     <p:spTree>
       <p:nvGrpSpPr>
-        <p:cNvPr id="2" name="Shape 2"/>
+        <p:cNvPr id="1" name="Shape 2"/>
         <p:cNvGrpSpPr/>
         <p:nvPr/>
       </p:nvGrpSpPr>
@@ -259,9 +250,11 @@
       <p:sp>
         <p:nvSpPr>
           <p:cNvPr id="3" name="Shape 3"/>
-          <p:cNvSpPr/>
+          <p:cNvSpPr>
+            <a:spLocks noGrp="1" noRot="1" noChangeAspect="1"/>
+          </p:cNvSpPr>
           <p:nvPr>
-            <p:ph idx="2" type="sldImg"/>
+            <p:ph type="sldImg" idx="2"/>
           </p:nvPr>
         </p:nvSpPr>
         <p:spPr>
@@ -270,8 +263,13 @@
             <a:ext cx="6096075" cy="3429000"/>
           </a:xfrm>
           <a:custGeom>
+            <a:avLst/>
+            <a:gdLst/>
+            <a:ahLst/>
+            <a:cxnLst/>
+            <a:rect l="0" t="0" r="0" b="0"/>
             <a:pathLst>
-              <a:path extrusionOk="0" h="120000" w="120000">
+              <a:path w="120000" h="120000" extrusionOk="0">
                 <a:moveTo>
                   <a:pt x="0" y="0"/>
                 </a:moveTo>
@@ -289,23 +287,25 @@
             </a:pathLst>
           </a:custGeom>
           <a:noFill/>
-          <a:ln cap="flat" cmpd="sng" w="9525">
+          <a:ln w="9525" cap="flat" cmpd="sng">
             <a:solidFill>
               <a:srgbClr val="000000"/>
             </a:solidFill>
             <a:prstDash val="solid"/>
             <a:round/>
-            <a:headEnd len="med" w="med" type="none"/>
-            <a:tailEnd len="med" w="med" type="none"/>
+            <a:headEnd type="none" w="med" len="med"/>
+            <a:tailEnd type="none" w="med" len="med"/>
           </a:ln>
         </p:spPr>
       </p:sp>
       <p:sp>
         <p:nvSpPr>
           <p:cNvPr id="4" name="Shape 4"/>
-          <p:cNvSpPr txBox="1"/>
+          <p:cNvSpPr txBox="1">
+            <a:spLocks noGrp="1"/>
+          </p:cNvSpPr>
           <p:nvPr>
-            <p:ph idx="1" type="body"/>
+            <p:ph type="body" idx="1"/>
           </p:nvPr>
         </p:nvSpPr>
         <p:spPr>
@@ -322,7 +322,7 @@
           </a:ln>
         </p:spPr>
         <p:txBody>
-          <a:bodyPr anchorCtr="0" anchor="t" bIns="91425" lIns="91425" rIns="91425" wrap="square" tIns="91425"/>
+          <a:bodyPr wrap="square" lIns="91425" tIns="91425" rIns="91425" bIns="91425" anchor="t" anchorCtr="0"/>
           <a:lstStyle>
             <a:lvl1pPr lvl="0">
               <a:spcBef>
@@ -397,21 +397,120 @@
               <a:defRPr sz="1100"/>
             </a:lvl9pPr>
           </a:lstStyle>
-          <a:p/>
+          <a:p>
+            <a:endParaRPr/>
+          </a:p>
         </p:txBody>
       </p:sp>
     </p:spTree>
+    <p:extLst>
+      <p:ext uri="{BB962C8B-B14F-4D97-AF65-F5344CB8AC3E}">
+        <p14:creationId xmlns:p14="http://schemas.microsoft.com/office/powerpoint/2010/main" val="2076110488"/>
+      </p:ext>
+    </p:extLst>
   </p:cSld>
-  <p:clrMap accent1="accent1" accent2="accent2" accent3="accent3" accent4="accent4" accent5="accent5" accent6="accent6" bg1="lt1" bg2="dk2" tx1="dk1" tx2="lt2" folHlink="folHlink" hlink="hlink"/>
+  <p:clrMap bg1="lt1" tx1="dk1" bg2="dk2" tx2="lt2" accent1="accent1" accent2="accent2" accent3="accent3" accent4="accent4" accent5="accent5" accent6="accent6" hlink="hlink" folHlink="folHlink"/>
+  <p:notesStyle>
+    <a:lvl1pPr marL="0" algn="l" defTabSz="914400" rtl="0" eaLnBrk="1" latinLnBrk="0" hangingPunct="1">
+      <a:defRPr sz="1200" kern="1200">
+        <a:solidFill>
+          <a:schemeClr val="tx1"/>
+        </a:solidFill>
+        <a:latin typeface="+mn-lt"/>
+        <a:ea typeface="+mn-ea"/>
+        <a:cs typeface="+mn-cs"/>
+      </a:defRPr>
+    </a:lvl1pPr>
+    <a:lvl2pPr marL="457200" algn="l" defTabSz="914400" rtl="0" eaLnBrk="1" latinLnBrk="0" hangingPunct="1">
+      <a:defRPr sz="1200" kern="1200">
+        <a:solidFill>
+          <a:schemeClr val="tx1"/>
+        </a:solidFill>
+        <a:latin typeface="+mn-lt"/>
+        <a:ea typeface="+mn-ea"/>
+        <a:cs typeface="+mn-cs"/>
+      </a:defRPr>
+    </a:lvl2pPr>
+    <a:lvl3pPr marL="914400" algn="l" defTabSz="914400" rtl="0" eaLnBrk="1" latinLnBrk="0" hangingPunct="1">
+      <a:defRPr sz="1200" kern="1200">
+        <a:solidFill>
+          <a:schemeClr val="tx1"/>
+        </a:solidFill>
+        <a:latin typeface="+mn-lt"/>
+        <a:ea typeface="+mn-ea"/>
+        <a:cs typeface="+mn-cs"/>
+      </a:defRPr>
+    </a:lvl3pPr>
+    <a:lvl4pPr marL="1371600" algn="l" defTabSz="914400" rtl="0" eaLnBrk="1" latinLnBrk="0" hangingPunct="1">
+      <a:defRPr sz="1200" kern="1200">
+        <a:solidFill>
+          <a:schemeClr val="tx1"/>
+        </a:solidFill>
+        <a:latin typeface="+mn-lt"/>
+        <a:ea typeface="+mn-ea"/>
+        <a:cs typeface="+mn-cs"/>
+      </a:defRPr>
+    </a:lvl4pPr>
+    <a:lvl5pPr marL="1828800" algn="l" defTabSz="914400" rtl="0" eaLnBrk="1" latinLnBrk="0" hangingPunct="1">
+      <a:defRPr sz="1200" kern="1200">
+        <a:solidFill>
+          <a:schemeClr val="tx1"/>
+        </a:solidFill>
+        <a:latin typeface="+mn-lt"/>
+        <a:ea typeface="+mn-ea"/>
+        <a:cs typeface="+mn-cs"/>
+      </a:defRPr>
+    </a:lvl5pPr>
+    <a:lvl6pPr marL="2286000" algn="l" defTabSz="914400" rtl="0" eaLnBrk="1" latinLnBrk="0" hangingPunct="1">
+      <a:defRPr sz="1200" kern="1200">
+        <a:solidFill>
+          <a:schemeClr val="tx1"/>
+        </a:solidFill>
+        <a:latin typeface="+mn-lt"/>
+        <a:ea typeface="+mn-ea"/>
+        <a:cs typeface="+mn-cs"/>
+      </a:defRPr>
+    </a:lvl6pPr>
+    <a:lvl7pPr marL="2743200" algn="l" defTabSz="914400" rtl="0" eaLnBrk="1" latinLnBrk="0" hangingPunct="1">
+      <a:defRPr sz="1200" kern="1200">
+        <a:solidFill>
+          <a:schemeClr val="tx1"/>
+        </a:solidFill>
+        <a:latin typeface="+mn-lt"/>
+        <a:ea typeface="+mn-ea"/>
+        <a:cs typeface="+mn-cs"/>
+      </a:defRPr>
+    </a:lvl7pPr>
+    <a:lvl8pPr marL="3200400" algn="l" defTabSz="914400" rtl="0" eaLnBrk="1" latinLnBrk="0" hangingPunct="1">
+      <a:defRPr sz="1200" kern="1200">
+        <a:solidFill>
+          <a:schemeClr val="tx1"/>
+        </a:solidFill>
+        <a:latin typeface="+mn-lt"/>
+        <a:ea typeface="+mn-ea"/>
+        <a:cs typeface="+mn-cs"/>
+      </a:defRPr>
+    </a:lvl8pPr>
+    <a:lvl9pPr marL="3657600" algn="l" defTabSz="914400" rtl="0" eaLnBrk="1" latinLnBrk="0" hangingPunct="1">
+      <a:defRPr sz="1200" kern="1200">
+        <a:solidFill>
+          <a:schemeClr val="tx1"/>
+        </a:solidFill>
+        <a:latin typeface="+mn-lt"/>
+        <a:ea typeface="+mn-ea"/>
+        <a:cs typeface="+mn-cs"/>
+      </a:defRPr>
+    </a:lvl9pPr>
+  </p:notesStyle>
 </p:notesMaster>
 </file>
 
 <file path=ppt/notesSlides/notesSlide1.xml><?xml version="1.0" encoding="utf-8"?>
-<p:notes xmlns:a="http://schemas.openxmlformats.org/drawingml/2006/main" xmlns:r="http://schemas.openxmlformats.org/officeDocument/2006/relationships" xmlns:mc="http://schemas.openxmlformats.org/markup-compatibility/2006" xmlns:mv="urn:schemas-microsoft-com:mac:vml" xmlns:p="http://schemas.openxmlformats.org/presentationml/2006/main" xmlns:c="http://schemas.openxmlformats.org/drawingml/2006/chart" xmlns:dgm="http://schemas.openxmlformats.org/drawingml/2006/diagram" xmlns:o="urn:schemas-microsoft-com:office:office" xmlns:v="urn:schemas-microsoft-com:vml" xmlns:pvml="urn:schemas-microsoft-com:office:powerpoint" xmlns:com="http://schemas.openxmlformats.org/drawingml/2006/compatibility" xmlns:p14="http://schemas.microsoft.com/office/powerpoint/2010/main" xmlns:p15="http://schemas.microsoft.com/office/powerpoint/2012/main" showMasterPhAnim="0" showMasterSp="0">
+<p:notes xmlns:a="http://schemas.openxmlformats.org/drawingml/2006/main" xmlns:r="http://schemas.openxmlformats.org/officeDocument/2006/relationships" xmlns:p="http://schemas.openxmlformats.org/presentationml/2006/main" showMasterSp="0" showMasterPhAnim="0">
   <p:cSld>
     <p:spTree>
       <p:nvGrpSpPr>
-        <p:cNvPr id="59" name="Shape 59"/>
+        <p:cNvPr id="1" name="Shape 59"/>
         <p:cNvGrpSpPr/>
         <p:nvPr/>
       </p:nvGrpSpPr>
@@ -426,9 +525,11 @@
       <p:sp>
         <p:nvSpPr>
           <p:cNvPr id="60" name="Shape 60"/>
-          <p:cNvSpPr/>
+          <p:cNvSpPr>
+            <a:spLocks noGrp="1" noRot="1" noChangeAspect="1"/>
+          </p:cNvSpPr>
           <p:nvPr>
-            <p:ph idx="2" type="sldImg"/>
+            <p:ph type="sldImg" idx="2"/>
           </p:nvPr>
         </p:nvSpPr>
         <p:spPr>
@@ -437,8 +538,13 @@
             <a:ext cx="6096075" cy="3429000"/>
           </a:xfrm>
           <a:custGeom>
+            <a:avLst/>
+            <a:gdLst/>
+            <a:ahLst/>
+            <a:cxnLst/>
+            <a:rect l="0" t="0" r="0" b="0"/>
             <a:pathLst>
-              <a:path extrusionOk="0" h="120000" w="120000">
+              <a:path w="120000" h="120000" extrusionOk="0">
                 <a:moveTo>
                   <a:pt x="0" y="0"/>
                 </a:moveTo>
@@ -460,9 +566,11 @@
       <p:sp>
         <p:nvSpPr>
           <p:cNvPr id="61" name="Shape 61"/>
-          <p:cNvSpPr txBox="1"/>
+          <p:cNvSpPr txBox="1">
+            <a:spLocks noGrp="1"/>
+          </p:cNvSpPr>
           <p:nvPr>
-            <p:ph idx="1" type="body"/>
+            <p:ph type="body" idx="1"/>
           </p:nvPr>
         </p:nvSpPr>
         <p:spPr>
@@ -475,7 +583,7 @@
           </a:prstGeom>
         </p:spPr>
         <p:txBody>
-          <a:bodyPr anchorCtr="0" anchor="t" bIns="91425" lIns="91425" rIns="91425" wrap="square" tIns="91425">
+          <a:bodyPr wrap="square" lIns="91425" tIns="91425" rIns="91425" bIns="91425" anchor="t" anchorCtr="0">
             <a:noAutofit/>
           </a:bodyPr>
           <a:lstStyle/>
@@ -486,14 +594,16 @@
               </a:spcBef>
               <a:buNone/>
             </a:pPr>
-            <a:r>
-              <a:t/>
-            </a:r>
             <a:endParaRPr/>
           </a:p>
         </p:txBody>
       </p:sp>
     </p:spTree>
+    <p:extLst>
+      <p:ext uri="{BB962C8B-B14F-4D97-AF65-F5344CB8AC3E}">
+        <p14:creationId xmlns:p14="http://schemas.microsoft.com/office/powerpoint/2010/main" val="874675360"/>
+      </p:ext>
+    </p:extLst>
   </p:cSld>
   <p:clrMapOvr>
     <a:masterClrMapping/>
@@ -502,11 +612,11 @@
 </file>
 
 <file path=ppt/notesSlides/notesSlide2.xml><?xml version="1.0" encoding="utf-8"?>
-<p:notes xmlns:a="http://schemas.openxmlformats.org/drawingml/2006/main" xmlns:r="http://schemas.openxmlformats.org/officeDocument/2006/relationships" xmlns:mc="http://schemas.openxmlformats.org/markup-compatibility/2006" xmlns:mv="urn:schemas-microsoft-com:mac:vml" xmlns:p="http://schemas.openxmlformats.org/presentationml/2006/main" xmlns:c="http://schemas.openxmlformats.org/drawingml/2006/chart" xmlns:dgm="http://schemas.openxmlformats.org/drawingml/2006/diagram" xmlns:o="urn:schemas-microsoft-com:office:office" xmlns:v="urn:schemas-microsoft-com:vml" xmlns:pvml="urn:schemas-microsoft-com:office:powerpoint" xmlns:com="http://schemas.openxmlformats.org/drawingml/2006/compatibility" xmlns:p14="http://schemas.microsoft.com/office/powerpoint/2010/main" xmlns:p15="http://schemas.microsoft.com/office/powerpoint/2012/main" showMasterPhAnim="0" showMasterSp="0">
+<p:notes xmlns:a="http://schemas.openxmlformats.org/drawingml/2006/main" xmlns:r="http://schemas.openxmlformats.org/officeDocument/2006/relationships" xmlns:p="http://schemas.openxmlformats.org/presentationml/2006/main" showMasterSp="0" showMasterPhAnim="0">
   <p:cSld>
     <p:spTree>
       <p:nvGrpSpPr>
-        <p:cNvPr id="65" name="Shape 65"/>
+        <p:cNvPr id="1" name="Shape 65"/>
         <p:cNvGrpSpPr/>
         <p:nvPr/>
       </p:nvGrpSpPr>
@@ -521,9 +631,11 @@
       <p:sp>
         <p:nvSpPr>
           <p:cNvPr id="66" name="Shape 66"/>
-          <p:cNvSpPr/>
+          <p:cNvSpPr>
+            <a:spLocks noGrp="1" noRot="1" noChangeAspect="1"/>
+          </p:cNvSpPr>
           <p:nvPr>
-            <p:ph idx="2" type="sldImg"/>
+            <p:ph type="sldImg" idx="2"/>
           </p:nvPr>
         </p:nvSpPr>
         <p:spPr>
@@ -532,8 +644,13 @@
             <a:ext cx="6096000" cy="3429000"/>
           </a:xfrm>
           <a:custGeom>
+            <a:avLst/>
+            <a:gdLst/>
+            <a:ahLst/>
+            <a:cxnLst/>
+            <a:rect l="0" t="0" r="0" b="0"/>
             <a:pathLst>
-              <a:path extrusionOk="0" h="120000" w="120000">
+              <a:path w="120000" h="120000" extrusionOk="0">
                 <a:moveTo>
                   <a:pt x="0" y="0"/>
                 </a:moveTo>
@@ -555,9 +672,11 @@
       <p:sp>
         <p:nvSpPr>
           <p:cNvPr id="67" name="Shape 67"/>
-          <p:cNvSpPr txBox="1"/>
+          <p:cNvSpPr txBox="1">
+            <a:spLocks noGrp="1"/>
+          </p:cNvSpPr>
           <p:nvPr>
-            <p:ph idx="1" type="body"/>
+            <p:ph type="body" idx="1"/>
           </p:nvPr>
         </p:nvSpPr>
         <p:spPr>
@@ -570,7 +689,7 @@
           </a:prstGeom>
         </p:spPr>
         <p:txBody>
-          <a:bodyPr anchorCtr="0" anchor="t" bIns="91425" lIns="91425" rIns="91425" wrap="square" tIns="91425">
+          <a:bodyPr wrap="square" lIns="91425" tIns="91425" rIns="91425" bIns="91425" anchor="t" anchorCtr="0">
             <a:noAutofit/>
           </a:bodyPr>
           <a:lstStyle/>
@@ -581,14 +700,16 @@
               </a:spcBef>
               <a:buNone/>
             </a:pPr>
-            <a:r>
-              <a:t/>
-            </a:r>
             <a:endParaRPr/>
           </a:p>
         </p:txBody>
       </p:sp>
     </p:spTree>
+    <p:extLst>
+      <p:ext uri="{BB962C8B-B14F-4D97-AF65-F5344CB8AC3E}">
+        <p14:creationId xmlns:p14="http://schemas.microsoft.com/office/powerpoint/2010/main" val="1143211805"/>
+      </p:ext>
+    </p:extLst>
   </p:cSld>
   <p:clrMapOvr>
     <a:masterClrMapping/>
@@ -597,11 +718,11 @@
 </file>
 
 <file path=ppt/notesSlides/notesSlide3.xml><?xml version="1.0" encoding="utf-8"?>
-<p:notes xmlns:a="http://schemas.openxmlformats.org/drawingml/2006/main" xmlns:r="http://schemas.openxmlformats.org/officeDocument/2006/relationships" xmlns:mc="http://schemas.openxmlformats.org/markup-compatibility/2006" xmlns:mv="urn:schemas-microsoft-com:mac:vml" xmlns:p="http://schemas.openxmlformats.org/presentationml/2006/main" xmlns:c="http://schemas.openxmlformats.org/drawingml/2006/chart" xmlns:dgm="http://schemas.openxmlformats.org/drawingml/2006/diagram" xmlns:o="urn:schemas-microsoft-com:office:office" xmlns:v="urn:schemas-microsoft-com:vml" xmlns:pvml="urn:schemas-microsoft-com:office:powerpoint" xmlns:com="http://schemas.openxmlformats.org/drawingml/2006/compatibility" xmlns:p14="http://schemas.microsoft.com/office/powerpoint/2010/main" xmlns:p15="http://schemas.microsoft.com/office/powerpoint/2012/main" showMasterPhAnim="0" showMasterSp="0">
+<p:notes xmlns:a="http://schemas.openxmlformats.org/drawingml/2006/main" xmlns:r="http://schemas.openxmlformats.org/officeDocument/2006/relationships" xmlns:p="http://schemas.openxmlformats.org/presentationml/2006/main" showMasterSp="0" showMasterPhAnim="0">
   <p:cSld>
     <p:spTree>
       <p:nvGrpSpPr>
-        <p:cNvPr id="71" name="Shape 71"/>
+        <p:cNvPr id="1" name="Shape 71"/>
         <p:cNvGrpSpPr/>
         <p:nvPr/>
       </p:nvGrpSpPr>
@@ -616,19 +737,26 @@
       <p:sp>
         <p:nvSpPr>
           <p:cNvPr id="72" name="Shape 72"/>
-          <p:cNvSpPr/>
+          <p:cNvSpPr>
+            <a:spLocks noGrp="1" noRot="1" noChangeAspect="1"/>
+          </p:cNvSpPr>
           <p:nvPr>
-            <p:ph idx="2" type="sldImg"/>
+            <p:ph type="sldImg" idx="2"/>
           </p:nvPr>
         </p:nvSpPr>
         <p:spPr>
           <a:xfrm>
-            <a:off x="381300" y="685800"/>
+            <a:off x="381000" y="685800"/>
             <a:ext cx="6096000" cy="3429000"/>
           </a:xfrm>
           <a:custGeom>
+            <a:avLst/>
+            <a:gdLst/>
+            <a:ahLst/>
+            <a:cxnLst/>
+            <a:rect l="0" t="0" r="0" b="0"/>
             <a:pathLst>
-              <a:path extrusionOk="0" h="120000" w="120000">
+              <a:path w="120000" h="120000" extrusionOk="0">
                 <a:moveTo>
                   <a:pt x="0" y="0"/>
                 </a:moveTo>
@@ -650,9 +778,11 @@
       <p:sp>
         <p:nvSpPr>
           <p:cNvPr id="73" name="Shape 73"/>
-          <p:cNvSpPr txBox="1"/>
+          <p:cNvSpPr txBox="1">
+            <a:spLocks noGrp="1"/>
+          </p:cNvSpPr>
           <p:nvPr>
-            <p:ph idx="1" type="body"/>
+            <p:ph type="body" idx="1"/>
           </p:nvPr>
         </p:nvSpPr>
         <p:spPr>
@@ -665,7 +795,7 @@
           </a:prstGeom>
         </p:spPr>
         <p:txBody>
-          <a:bodyPr anchorCtr="0" anchor="t" bIns="91425" lIns="91425" rIns="91425" wrap="square" tIns="91425">
+          <a:bodyPr wrap="square" lIns="91425" tIns="91425" rIns="91425" bIns="91425" anchor="t" anchorCtr="0">
             <a:noAutofit/>
           </a:bodyPr>
           <a:lstStyle/>
@@ -676,14 +806,16 @@
               </a:spcBef>
               <a:buNone/>
             </a:pPr>
-            <a:r>
-              <a:t/>
-            </a:r>
             <a:endParaRPr/>
           </a:p>
         </p:txBody>
       </p:sp>
     </p:spTree>
+    <p:extLst>
+      <p:ext uri="{BB962C8B-B14F-4D97-AF65-F5344CB8AC3E}">
+        <p14:creationId xmlns:p14="http://schemas.microsoft.com/office/powerpoint/2010/main" val="424616926"/>
+      </p:ext>
+    </p:extLst>
   </p:cSld>
   <p:clrMapOvr>
     <a:masterClrMapping/>
@@ -692,11 +824,11 @@
 </file>
 
 <file path=ppt/notesSlides/notesSlide4.xml><?xml version="1.0" encoding="utf-8"?>
-<p:notes xmlns:a="http://schemas.openxmlformats.org/drawingml/2006/main" xmlns:r="http://schemas.openxmlformats.org/officeDocument/2006/relationships" xmlns:mc="http://schemas.openxmlformats.org/markup-compatibility/2006" xmlns:mv="urn:schemas-microsoft-com:mac:vml" xmlns:p="http://schemas.openxmlformats.org/presentationml/2006/main" xmlns:c="http://schemas.openxmlformats.org/drawingml/2006/chart" xmlns:dgm="http://schemas.openxmlformats.org/drawingml/2006/diagram" xmlns:o="urn:schemas-microsoft-com:office:office" xmlns:v="urn:schemas-microsoft-com:vml" xmlns:pvml="urn:schemas-microsoft-com:office:powerpoint" xmlns:com="http://schemas.openxmlformats.org/drawingml/2006/compatibility" xmlns:p14="http://schemas.microsoft.com/office/powerpoint/2010/main" xmlns:p15="http://schemas.microsoft.com/office/powerpoint/2012/main" showMasterPhAnim="0" showMasterSp="0">
+<p:notes xmlns:a="http://schemas.openxmlformats.org/drawingml/2006/main" xmlns:r="http://schemas.openxmlformats.org/officeDocument/2006/relationships" xmlns:p="http://schemas.openxmlformats.org/presentationml/2006/main" showMasterSp="0" showMasterPhAnim="0">
   <p:cSld>
     <p:spTree>
       <p:nvGrpSpPr>
-        <p:cNvPr id="77" name="Shape 77"/>
+        <p:cNvPr id="1" name="Shape 77"/>
         <p:cNvGrpSpPr/>
         <p:nvPr/>
       </p:nvGrpSpPr>
@@ -711,9 +843,11 @@
       <p:sp>
         <p:nvSpPr>
           <p:cNvPr id="78" name="Shape 78"/>
-          <p:cNvSpPr/>
+          <p:cNvSpPr>
+            <a:spLocks noGrp="1" noRot="1" noChangeAspect="1"/>
+          </p:cNvSpPr>
           <p:nvPr>
-            <p:ph idx="2" type="sldImg"/>
+            <p:ph type="sldImg" idx="2"/>
           </p:nvPr>
         </p:nvSpPr>
         <p:spPr>
@@ -722,8 +856,13 @@
             <a:ext cx="6096000" cy="3429000"/>
           </a:xfrm>
           <a:custGeom>
+            <a:avLst/>
+            <a:gdLst/>
+            <a:ahLst/>
+            <a:cxnLst/>
+            <a:rect l="0" t="0" r="0" b="0"/>
             <a:pathLst>
-              <a:path extrusionOk="0" h="120000" w="120000">
+              <a:path w="120000" h="120000" extrusionOk="0">
                 <a:moveTo>
                   <a:pt x="0" y="0"/>
                 </a:moveTo>
@@ -745,9 +884,11 @@
       <p:sp>
         <p:nvSpPr>
           <p:cNvPr id="79" name="Shape 79"/>
-          <p:cNvSpPr txBox="1"/>
+          <p:cNvSpPr txBox="1">
+            <a:spLocks noGrp="1"/>
+          </p:cNvSpPr>
           <p:nvPr>
-            <p:ph idx="1" type="body"/>
+            <p:ph type="body" idx="1"/>
           </p:nvPr>
         </p:nvSpPr>
         <p:spPr>
@@ -760,7 +901,7 @@
           </a:prstGeom>
         </p:spPr>
         <p:txBody>
-          <a:bodyPr anchorCtr="0" anchor="t" bIns="91425" lIns="91425" rIns="91425" wrap="square" tIns="91425">
+          <a:bodyPr wrap="square" lIns="91425" tIns="91425" rIns="91425" bIns="91425" anchor="t" anchorCtr="0">
             <a:noAutofit/>
           </a:bodyPr>
           <a:lstStyle/>
@@ -771,14 +912,16 @@
               </a:spcBef>
               <a:buNone/>
             </a:pPr>
-            <a:r>
-              <a:t/>
-            </a:r>
             <a:endParaRPr/>
           </a:p>
         </p:txBody>
       </p:sp>
     </p:spTree>
+    <p:extLst>
+      <p:ext uri="{BB962C8B-B14F-4D97-AF65-F5344CB8AC3E}">
+        <p14:creationId xmlns:p14="http://schemas.microsoft.com/office/powerpoint/2010/main" val="448516301"/>
+      </p:ext>
+    </p:extLst>
   </p:cSld>
   <p:clrMapOvr>
     <a:masterClrMapping/>
@@ -787,11 +930,11 @@
 </file>
 
 <file path=ppt/notesSlides/notesSlide5.xml><?xml version="1.0" encoding="utf-8"?>
-<p:notes xmlns:a="http://schemas.openxmlformats.org/drawingml/2006/main" xmlns:r="http://schemas.openxmlformats.org/officeDocument/2006/relationships" xmlns:mc="http://schemas.openxmlformats.org/markup-compatibility/2006" xmlns:mv="urn:schemas-microsoft-com:mac:vml" xmlns:p="http://schemas.openxmlformats.org/presentationml/2006/main" xmlns:c="http://schemas.openxmlformats.org/drawingml/2006/chart" xmlns:dgm="http://schemas.openxmlformats.org/drawingml/2006/diagram" xmlns:o="urn:schemas-microsoft-com:office:office" xmlns:v="urn:schemas-microsoft-com:vml" xmlns:pvml="urn:schemas-microsoft-com:office:powerpoint" xmlns:com="http://schemas.openxmlformats.org/drawingml/2006/compatibility" xmlns:p14="http://schemas.microsoft.com/office/powerpoint/2010/main" xmlns:p15="http://schemas.microsoft.com/office/powerpoint/2012/main" showMasterPhAnim="0" showMasterSp="0">
+<p:notes xmlns:a="http://schemas.openxmlformats.org/drawingml/2006/main" xmlns:r="http://schemas.openxmlformats.org/officeDocument/2006/relationships" xmlns:p="http://schemas.openxmlformats.org/presentationml/2006/main" showMasterSp="0" showMasterPhAnim="0">
   <p:cSld>
     <p:spTree>
       <p:nvGrpSpPr>
-        <p:cNvPr id="83" name="Shape 83"/>
+        <p:cNvPr id="1" name="Shape 83"/>
         <p:cNvGrpSpPr/>
         <p:nvPr/>
       </p:nvGrpSpPr>
@@ -806,9 +949,11 @@
       <p:sp>
         <p:nvSpPr>
           <p:cNvPr id="84" name="Shape 84"/>
-          <p:cNvSpPr/>
+          <p:cNvSpPr>
+            <a:spLocks noGrp="1" noRot="1" noChangeAspect="1"/>
+          </p:cNvSpPr>
           <p:nvPr>
-            <p:ph idx="2" type="sldImg"/>
+            <p:ph type="sldImg" idx="2"/>
           </p:nvPr>
         </p:nvSpPr>
         <p:spPr>
@@ -817,8 +962,13 @@
             <a:ext cx="6096000" cy="3429000"/>
           </a:xfrm>
           <a:custGeom>
+            <a:avLst/>
+            <a:gdLst/>
+            <a:ahLst/>
+            <a:cxnLst/>
+            <a:rect l="0" t="0" r="0" b="0"/>
             <a:pathLst>
-              <a:path extrusionOk="0" h="120000" w="120000">
+              <a:path w="120000" h="120000" extrusionOk="0">
                 <a:moveTo>
                   <a:pt x="0" y="0"/>
                 </a:moveTo>
@@ -840,9 +990,11 @@
       <p:sp>
         <p:nvSpPr>
           <p:cNvPr id="85" name="Shape 85"/>
-          <p:cNvSpPr txBox="1"/>
+          <p:cNvSpPr txBox="1">
+            <a:spLocks noGrp="1"/>
+          </p:cNvSpPr>
           <p:nvPr>
-            <p:ph idx="1" type="body"/>
+            <p:ph type="body" idx="1"/>
           </p:nvPr>
         </p:nvSpPr>
         <p:spPr>
@@ -855,7 +1007,7 @@
           </a:prstGeom>
         </p:spPr>
         <p:txBody>
-          <a:bodyPr anchorCtr="0" anchor="t" bIns="91425" lIns="91425" rIns="91425" wrap="square" tIns="91425">
+          <a:bodyPr wrap="square" lIns="91425" tIns="91425" rIns="91425" bIns="91425" anchor="t" anchorCtr="0">
             <a:noAutofit/>
           </a:bodyPr>
           <a:lstStyle/>
@@ -866,14 +1018,16 @@
               </a:spcBef>
               <a:buNone/>
             </a:pPr>
-            <a:r>
-              <a:t/>
-            </a:r>
             <a:endParaRPr/>
           </a:p>
         </p:txBody>
       </p:sp>
     </p:spTree>
+    <p:extLst>
+      <p:ext uri="{BB962C8B-B14F-4D97-AF65-F5344CB8AC3E}">
+        <p14:creationId xmlns:p14="http://schemas.microsoft.com/office/powerpoint/2010/main" val="545869937"/>
+      </p:ext>
+    </p:extLst>
   </p:cSld>
   <p:clrMapOvr>
     <a:masterClrMapping/>
@@ -882,11 +1036,11 @@
 </file>
 
 <file path=ppt/notesSlides/notesSlide6.xml><?xml version="1.0" encoding="utf-8"?>
-<p:notes xmlns:a="http://schemas.openxmlformats.org/drawingml/2006/main" xmlns:r="http://schemas.openxmlformats.org/officeDocument/2006/relationships" xmlns:mc="http://schemas.openxmlformats.org/markup-compatibility/2006" xmlns:mv="urn:schemas-microsoft-com:mac:vml" xmlns:p="http://schemas.openxmlformats.org/presentationml/2006/main" xmlns:c="http://schemas.openxmlformats.org/drawingml/2006/chart" xmlns:dgm="http://schemas.openxmlformats.org/drawingml/2006/diagram" xmlns:o="urn:schemas-microsoft-com:office:office" xmlns:v="urn:schemas-microsoft-com:vml" xmlns:pvml="urn:schemas-microsoft-com:office:powerpoint" xmlns:com="http://schemas.openxmlformats.org/drawingml/2006/compatibility" xmlns:p14="http://schemas.microsoft.com/office/powerpoint/2010/main" xmlns:p15="http://schemas.microsoft.com/office/powerpoint/2012/main" showMasterPhAnim="0" showMasterSp="0">
+<p:notes xmlns:a="http://schemas.openxmlformats.org/drawingml/2006/main" xmlns:r="http://schemas.openxmlformats.org/officeDocument/2006/relationships" xmlns:p="http://schemas.openxmlformats.org/presentationml/2006/main" showMasterSp="0" showMasterPhAnim="0">
   <p:cSld>
     <p:spTree>
       <p:nvGrpSpPr>
-        <p:cNvPr id="98" name="Shape 98"/>
+        <p:cNvPr id="1" name="Shape 98"/>
         <p:cNvGrpSpPr/>
         <p:nvPr/>
       </p:nvGrpSpPr>
@@ -901,9 +1055,11 @@
       <p:sp>
         <p:nvSpPr>
           <p:cNvPr id="99" name="Shape 99"/>
-          <p:cNvSpPr/>
+          <p:cNvSpPr>
+            <a:spLocks noGrp="1" noRot="1" noChangeAspect="1"/>
+          </p:cNvSpPr>
           <p:nvPr>
-            <p:ph idx="2" type="sldImg"/>
+            <p:ph type="sldImg" idx="2"/>
           </p:nvPr>
         </p:nvSpPr>
         <p:spPr>
@@ -912,8 +1068,13 @@
             <a:ext cx="6096000" cy="3429000"/>
           </a:xfrm>
           <a:custGeom>
+            <a:avLst/>
+            <a:gdLst/>
+            <a:ahLst/>
+            <a:cxnLst/>
+            <a:rect l="0" t="0" r="0" b="0"/>
             <a:pathLst>
-              <a:path extrusionOk="0" h="120000" w="120000">
+              <a:path w="120000" h="120000" extrusionOk="0">
                 <a:moveTo>
                   <a:pt x="0" y="0"/>
                 </a:moveTo>
@@ -935,9 +1096,11 @@
       <p:sp>
         <p:nvSpPr>
           <p:cNvPr id="100" name="Shape 100"/>
-          <p:cNvSpPr txBox="1"/>
+          <p:cNvSpPr txBox="1">
+            <a:spLocks noGrp="1"/>
+          </p:cNvSpPr>
           <p:nvPr>
-            <p:ph idx="1" type="body"/>
+            <p:ph type="body" idx="1"/>
           </p:nvPr>
         </p:nvSpPr>
         <p:spPr>
@@ -950,7 +1113,7 @@
           </a:prstGeom>
         </p:spPr>
         <p:txBody>
-          <a:bodyPr anchorCtr="0" anchor="t" bIns="91425" lIns="91425" rIns="91425" wrap="square" tIns="91425">
+          <a:bodyPr wrap="square" lIns="91425" tIns="91425" rIns="91425" bIns="91425" anchor="t" anchorCtr="0">
             <a:noAutofit/>
           </a:bodyPr>
           <a:lstStyle/>
@@ -961,14 +1124,16 @@
               </a:spcBef>
               <a:buNone/>
             </a:pPr>
-            <a:r>
-              <a:t/>
-            </a:r>
             <a:endParaRPr/>
           </a:p>
         </p:txBody>
       </p:sp>
     </p:spTree>
+    <p:extLst>
+      <p:ext uri="{BB962C8B-B14F-4D97-AF65-F5344CB8AC3E}">
+        <p14:creationId xmlns:p14="http://schemas.microsoft.com/office/powerpoint/2010/main" val="385891175"/>
+      </p:ext>
+    </p:extLst>
   </p:cSld>
   <p:clrMapOvr>
     <a:masterClrMapping/>
@@ -977,11 +1142,11 @@
 </file>
 
 <file path=ppt/notesSlides/notesSlide7.xml><?xml version="1.0" encoding="utf-8"?>
-<p:notes xmlns:a="http://schemas.openxmlformats.org/drawingml/2006/main" xmlns:r="http://schemas.openxmlformats.org/officeDocument/2006/relationships" xmlns:mc="http://schemas.openxmlformats.org/markup-compatibility/2006" xmlns:mv="urn:schemas-microsoft-com:mac:vml" xmlns:p="http://schemas.openxmlformats.org/presentationml/2006/main" xmlns:c="http://schemas.openxmlformats.org/drawingml/2006/chart" xmlns:dgm="http://schemas.openxmlformats.org/drawingml/2006/diagram" xmlns:o="urn:schemas-microsoft-com:office:office" xmlns:v="urn:schemas-microsoft-com:vml" xmlns:pvml="urn:schemas-microsoft-com:office:powerpoint" xmlns:com="http://schemas.openxmlformats.org/drawingml/2006/compatibility" xmlns:p14="http://schemas.microsoft.com/office/powerpoint/2010/main" xmlns:p15="http://schemas.microsoft.com/office/powerpoint/2012/main" showMasterPhAnim="0" showMasterSp="0">
+<p:notes xmlns:a="http://schemas.openxmlformats.org/drawingml/2006/main" xmlns:r="http://schemas.openxmlformats.org/officeDocument/2006/relationships" xmlns:p="http://schemas.openxmlformats.org/presentationml/2006/main" showMasterSp="0" showMasterPhAnim="0">
   <p:cSld>
     <p:spTree>
       <p:nvGrpSpPr>
-        <p:cNvPr id="104" name="Shape 104"/>
+        <p:cNvPr id="1" name="Shape 104"/>
         <p:cNvGrpSpPr/>
         <p:nvPr/>
       </p:nvGrpSpPr>
@@ -996,19 +1161,26 @@
       <p:sp>
         <p:nvSpPr>
           <p:cNvPr id="105" name="Shape 105"/>
-          <p:cNvSpPr/>
+          <p:cNvSpPr>
+            <a:spLocks noGrp="1" noRot="1" noChangeAspect="1"/>
+          </p:cNvSpPr>
           <p:nvPr>
-            <p:ph idx="2" type="sldImg"/>
+            <p:ph type="sldImg" idx="2"/>
           </p:nvPr>
         </p:nvSpPr>
         <p:spPr>
           <a:xfrm>
-            <a:off x="381300" y="685800"/>
+            <a:off x="381000" y="685800"/>
             <a:ext cx="6096000" cy="3429000"/>
           </a:xfrm>
           <a:custGeom>
+            <a:avLst/>
+            <a:gdLst/>
+            <a:ahLst/>
+            <a:cxnLst/>
+            <a:rect l="0" t="0" r="0" b="0"/>
             <a:pathLst>
-              <a:path extrusionOk="0" h="120000" w="120000">
+              <a:path w="120000" h="120000" extrusionOk="0">
                 <a:moveTo>
                   <a:pt x="0" y="0"/>
                 </a:moveTo>
@@ -1030,9 +1202,11 @@
       <p:sp>
         <p:nvSpPr>
           <p:cNvPr id="106" name="Shape 106"/>
-          <p:cNvSpPr txBox="1"/>
+          <p:cNvSpPr txBox="1">
+            <a:spLocks noGrp="1"/>
+          </p:cNvSpPr>
           <p:nvPr>
-            <p:ph idx="1" type="body"/>
+            <p:ph type="body" idx="1"/>
           </p:nvPr>
         </p:nvSpPr>
         <p:spPr>
@@ -1045,7 +1219,7 @@
           </a:prstGeom>
         </p:spPr>
         <p:txBody>
-          <a:bodyPr anchorCtr="0" anchor="t" bIns="91425" lIns="91425" rIns="91425" wrap="square" tIns="91425">
+          <a:bodyPr wrap="square" lIns="91425" tIns="91425" rIns="91425" bIns="91425" anchor="t" anchorCtr="0">
             <a:noAutofit/>
           </a:bodyPr>
           <a:lstStyle/>
@@ -1056,14 +1230,16 @@
               </a:spcBef>
               <a:buNone/>
             </a:pPr>
-            <a:r>
-              <a:t/>
-            </a:r>
             <a:endParaRPr/>
           </a:p>
         </p:txBody>
       </p:sp>
     </p:spTree>
+    <p:extLst>
+      <p:ext uri="{BB962C8B-B14F-4D97-AF65-F5344CB8AC3E}">
+        <p14:creationId xmlns:p14="http://schemas.microsoft.com/office/powerpoint/2010/main" val="272364285"/>
+      </p:ext>
+    </p:extLst>
   </p:cSld>
   <p:clrMapOvr>
     <a:masterClrMapping/>
@@ -1072,11 +1248,11 @@
 </file>
 
 <file path=ppt/notesSlides/notesSlide8.xml><?xml version="1.0" encoding="utf-8"?>
-<p:notes xmlns:a="http://schemas.openxmlformats.org/drawingml/2006/main" xmlns:r="http://schemas.openxmlformats.org/officeDocument/2006/relationships" xmlns:mc="http://schemas.openxmlformats.org/markup-compatibility/2006" xmlns:mv="urn:schemas-microsoft-com:mac:vml" xmlns:p="http://schemas.openxmlformats.org/presentationml/2006/main" xmlns:c="http://schemas.openxmlformats.org/drawingml/2006/chart" xmlns:dgm="http://schemas.openxmlformats.org/drawingml/2006/diagram" xmlns:o="urn:schemas-microsoft-com:office:office" xmlns:v="urn:schemas-microsoft-com:vml" xmlns:pvml="urn:schemas-microsoft-com:office:powerpoint" xmlns:com="http://schemas.openxmlformats.org/drawingml/2006/compatibility" xmlns:p14="http://schemas.microsoft.com/office/powerpoint/2010/main" xmlns:p15="http://schemas.microsoft.com/office/powerpoint/2012/main" showMasterPhAnim="0" showMasterSp="0">
+<p:notes xmlns:a="http://schemas.openxmlformats.org/drawingml/2006/main" xmlns:r="http://schemas.openxmlformats.org/officeDocument/2006/relationships" xmlns:p="http://schemas.openxmlformats.org/presentationml/2006/main" showMasterSp="0" showMasterPhAnim="0">
   <p:cSld>
     <p:spTree>
       <p:nvGrpSpPr>
-        <p:cNvPr id="110" name="Shape 110"/>
+        <p:cNvPr id="1" name="Shape 110"/>
         <p:cNvGrpSpPr/>
         <p:nvPr/>
       </p:nvGrpSpPr>
@@ -1091,9 +1267,11 @@
       <p:sp>
         <p:nvSpPr>
           <p:cNvPr id="111" name="Shape 111"/>
-          <p:cNvSpPr/>
+          <p:cNvSpPr>
+            <a:spLocks noGrp="1" noRot="1" noChangeAspect="1"/>
+          </p:cNvSpPr>
           <p:nvPr>
-            <p:ph idx="2" type="sldImg"/>
+            <p:ph type="sldImg" idx="2"/>
           </p:nvPr>
         </p:nvSpPr>
         <p:spPr>
@@ -1102,8 +1280,13 @@
             <a:ext cx="6096000" cy="3429000"/>
           </a:xfrm>
           <a:custGeom>
+            <a:avLst/>
+            <a:gdLst/>
+            <a:ahLst/>
+            <a:cxnLst/>
+            <a:rect l="0" t="0" r="0" b="0"/>
             <a:pathLst>
-              <a:path extrusionOk="0" h="120000" w="120000">
+              <a:path w="120000" h="120000" extrusionOk="0">
                 <a:moveTo>
                   <a:pt x="0" y="0"/>
                 </a:moveTo>
@@ -1125,9 +1308,11 @@
       <p:sp>
         <p:nvSpPr>
           <p:cNvPr id="112" name="Shape 112"/>
-          <p:cNvSpPr txBox="1"/>
+          <p:cNvSpPr txBox="1">
+            <a:spLocks noGrp="1"/>
+          </p:cNvSpPr>
           <p:nvPr>
-            <p:ph idx="1" type="body"/>
+            <p:ph type="body" idx="1"/>
           </p:nvPr>
         </p:nvSpPr>
         <p:spPr>
@@ -1140,7 +1325,7 @@
           </a:prstGeom>
         </p:spPr>
         <p:txBody>
-          <a:bodyPr anchorCtr="0" anchor="t" bIns="91425" lIns="91425" rIns="91425" wrap="square" tIns="91425">
+          <a:bodyPr wrap="square" lIns="91425" tIns="91425" rIns="91425" bIns="91425" anchor="t" anchorCtr="0">
             <a:noAutofit/>
           </a:bodyPr>
           <a:lstStyle/>
@@ -1151,14 +1336,16 @@
               </a:spcBef>
               <a:buNone/>
             </a:pPr>
-            <a:r>
-              <a:t/>
-            </a:r>
             <a:endParaRPr/>
           </a:p>
         </p:txBody>
       </p:sp>
     </p:spTree>
+    <p:extLst>
+      <p:ext uri="{BB962C8B-B14F-4D97-AF65-F5344CB8AC3E}">
+        <p14:creationId xmlns:p14="http://schemas.microsoft.com/office/powerpoint/2010/main" val="1338886238"/>
+      </p:ext>
+    </p:extLst>
   </p:cSld>
   <p:clrMapOvr>
     <a:masterClrMapping/>
@@ -1167,11 +1354,11 @@
 </file>
 
 <file path=ppt/notesSlides/notesSlide9.xml><?xml version="1.0" encoding="utf-8"?>
-<p:notes xmlns:a="http://schemas.openxmlformats.org/drawingml/2006/main" xmlns:r="http://schemas.openxmlformats.org/officeDocument/2006/relationships" xmlns:mc="http://schemas.openxmlformats.org/markup-compatibility/2006" xmlns:mv="urn:schemas-microsoft-com:mac:vml" xmlns:p="http://schemas.openxmlformats.org/presentationml/2006/main" xmlns:c="http://schemas.openxmlformats.org/drawingml/2006/chart" xmlns:dgm="http://schemas.openxmlformats.org/drawingml/2006/diagram" xmlns:o="urn:schemas-microsoft-com:office:office" xmlns:v="urn:schemas-microsoft-com:vml" xmlns:pvml="urn:schemas-microsoft-com:office:powerpoint" xmlns:com="http://schemas.openxmlformats.org/drawingml/2006/compatibility" xmlns:p14="http://schemas.microsoft.com/office/powerpoint/2010/main" xmlns:p15="http://schemas.microsoft.com/office/powerpoint/2012/main" showMasterPhAnim="0" showMasterSp="0">
+<p:notes xmlns:a="http://schemas.openxmlformats.org/drawingml/2006/main" xmlns:r="http://schemas.openxmlformats.org/officeDocument/2006/relationships" xmlns:p="http://schemas.openxmlformats.org/presentationml/2006/main" showMasterSp="0" showMasterPhAnim="0">
   <p:cSld>
     <p:spTree>
       <p:nvGrpSpPr>
-        <p:cNvPr id="116" name="Shape 116"/>
+        <p:cNvPr id="1" name="Shape 116"/>
         <p:cNvGrpSpPr/>
         <p:nvPr/>
       </p:nvGrpSpPr>
@@ -1186,9 +1373,11 @@
       <p:sp>
         <p:nvSpPr>
           <p:cNvPr id="117" name="Shape 117"/>
-          <p:cNvSpPr/>
+          <p:cNvSpPr>
+            <a:spLocks noGrp="1" noRot="1" noChangeAspect="1"/>
+          </p:cNvSpPr>
           <p:nvPr>
-            <p:ph idx="2" type="sldImg"/>
+            <p:ph type="sldImg" idx="2"/>
           </p:nvPr>
         </p:nvSpPr>
         <p:spPr>
@@ -1197,8 +1386,13 @@
             <a:ext cx="6096000" cy="3429000"/>
           </a:xfrm>
           <a:custGeom>
+            <a:avLst/>
+            <a:gdLst/>
+            <a:ahLst/>
+            <a:cxnLst/>
+            <a:rect l="0" t="0" r="0" b="0"/>
             <a:pathLst>
-              <a:path extrusionOk="0" h="120000" w="120000">
+              <a:path w="120000" h="120000" extrusionOk="0">
                 <a:moveTo>
                   <a:pt x="0" y="0"/>
                 </a:moveTo>
@@ -1220,9 +1414,11 @@
       <p:sp>
         <p:nvSpPr>
           <p:cNvPr id="118" name="Shape 118"/>
-          <p:cNvSpPr txBox="1"/>
+          <p:cNvSpPr txBox="1">
+            <a:spLocks noGrp="1"/>
+          </p:cNvSpPr>
           <p:nvPr>
-            <p:ph idx="1" type="body"/>
+            <p:ph type="body" idx="1"/>
           </p:nvPr>
         </p:nvSpPr>
         <p:spPr>
@@ -1235,7 +1431,7 @@
           </a:prstGeom>
         </p:spPr>
         <p:txBody>
-          <a:bodyPr anchorCtr="0" anchor="t" bIns="91425" lIns="91425" rIns="91425" wrap="square" tIns="91425">
+          <a:bodyPr wrap="square" lIns="91425" tIns="91425" rIns="91425" bIns="91425" anchor="t" anchorCtr="0">
             <a:noAutofit/>
           </a:bodyPr>
           <a:lstStyle/>
@@ -1246,14 +1442,16 @@
               </a:spcBef>
               <a:buNone/>
             </a:pPr>
-            <a:r>
-              <a:t/>
-            </a:r>
             <a:endParaRPr/>
           </a:p>
         </p:txBody>
       </p:sp>
     </p:spTree>
+    <p:extLst>
+      <p:ext uri="{BB962C8B-B14F-4D97-AF65-F5344CB8AC3E}">
+        <p14:creationId xmlns:p14="http://schemas.microsoft.com/office/powerpoint/2010/main" val="691156564"/>
+      </p:ext>
+    </p:extLst>
   </p:cSld>
   <p:clrMapOvr>
     <a:masterClrMapping/>
@@ -1262,11 +1460,11 @@
 </file>
 
 <file path=ppt/slideLayouts/slideLayout1.xml><?xml version="1.0" encoding="utf-8"?>
-<p:sldLayout xmlns:a="http://schemas.openxmlformats.org/drawingml/2006/main" xmlns:r="http://schemas.openxmlformats.org/officeDocument/2006/relationships" xmlns:mc="http://schemas.openxmlformats.org/markup-compatibility/2006" xmlns:mv="urn:schemas-microsoft-com:mac:vml" xmlns:p="http://schemas.openxmlformats.org/presentationml/2006/main" xmlns:c="http://schemas.openxmlformats.org/drawingml/2006/chart" xmlns:dgm="http://schemas.openxmlformats.org/drawingml/2006/diagram" xmlns:o="urn:schemas-microsoft-com:office:office" xmlns:v="urn:schemas-microsoft-com:vml" xmlns:pvml="urn:schemas-microsoft-com:office:powerpoint" xmlns:com="http://schemas.openxmlformats.org/drawingml/2006/compatibility" xmlns:p14="http://schemas.microsoft.com/office/powerpoint/2010/main" xmlns:p15="http://schemas.microsoft.com/office/powerpoint/2012/main" type="title">
+<p:sldLayout xmlns:a="http://schemas.openxmlformats.org/drawingml/2006/main" xmlns:r="http://schemas.openxmlformats.org/officeDocument/2006/relationships" xmlns:p="http://schemas.openxmlformats.org/presentationml/2006/main" type="title">
   <p:cSld name="Title slide">
     <p:spTree>
       <p:nvGrpSpPr>
-        <p:cNvPr id="9" name="Shape 9"/>
+        <p:cNvPr id="1" name="Shape 9"/>
         <p:cNvGrpSpPr/>
         <p:nvPr/>
       </p:nvGrpSpPr>
@@ -1290,8 +1488,13 @@
             <a:ext cx="1081625" cy="1124950"/>
           </a:xfrm>
           <a:custGeom>
+            <a:avLst/>
+            <a:gdLst/>
+            <a:ahLst/>
+            <a:cxnLst/>
+            <a:rect l="0" t="0" r="0" b="0"/>
             <a:pathLst>
-              <a:path extrusionOk="0" h="44998" w="43265">
+              <a:path w="43265" h="44998" extrusionOk="0">
                 <a:moveTo>
                   <a:pt x="0" y="44998"/>
                 </a:moveTo>
@@ -1305,14 +1508,14 @@
             </a:pathLst>
           </a:custGeom>
           <a:noFill/>
-          <a:ln cap="flat" cmpd="sng" w="28575">
+          <a:ln w="28575" cap="flat" cmpd="sng">
             <a:solidFill>
               <a:schemeClr val="accent5"/>
             </a:solidFill>
             <a:prstDash val="solid"/>
             <a:miter lim="8000"/>
-            <a:headEnd len="med" w="med" type="none"/>
-            <a:tailEnd len="med" w="med" type="none"/>
+            <a:headEnd type="none" w="med" len="med"/>
+            <a:tailEnd type="none" w="med" len="med"/>
           </a:ln>
         </p:spPr>
       </p:sp>
@@ -1328,8 +1531,13 @@
             <a:ext cx="1081625" cy="1124950"/>
           </a:xfrm>
           <a:custGeom>
+            <a:avLst/>
+            <a:gdLst/>
+            <a:ahLst/>
+            <a:cxnLst/>
+            <a:rect l="0" t="0" r="0" b="0"/>
             <a:pathLst>
-              <a:path extrusionOk="0" h="44998" w="43265">
+              <a:path w="43265" h="44998" extrusionOk="0">
                 <a:moveTo>
                   <a:pt x="0" y="44998"/>
                 </a:moveTo>
@@ -1343,14 +1551,14 @@
             </a:pathLst>
           </a:custGeom>
           <a:noFill/>
-          <a:ln cap="flat" cmpd="sng" w="28575">
+          <a:ln w="28575" cap="flat" cmpd="sng">
             <a:solidFill>
               <a:schemeClr val="accent5"/>
             </a:solidFill>
             <a:prstDash val="solid"/>
             <a:miter lim="8000"/>
-            <a:headEnd len="med" w="med" type="none"/>
-            <a:tailEnd len="med" w="med" type="none"/>
+            <a:headEnd type="none" w="med" len="med"/>
+            <a:tailEnd type="none" w="med" len="med"/>
           </a:ln>
         </p:spPr>
       </p:sp>
@@ -1369,21 +1577,23 @@
             <a:avLst/>
           </a:prstGeom>
           <a:noFill/>
-          <a:ln cap="flat" cmpd="sng" w="38100">
+          <a:ln w="38100" cap="flat" cmpd="sng">
             <a:solidFill>
               <a:schemeClr val="accent4"/>
             </a:solidFill>
             <a:prstDash val="solid"/>
             <a:round/>
-            <a:headEnd len="med" w="med" type="none"/>
-            <a:tailEnd len="med" w="med" type="none"/>
+            <a:headEnd type="none" w="med" len="med"/>
+            <a:tailEnd type="none" w="med" len="med"/>
           </a:ln>
         </p:spPr>
       </p:cxnSp>
       <p:sp>
         <p:nvSpPr>
           <p:cNvPr id="13" name="Shape 13"/>
-          <p:cNvSpPr txBox="1"/>
+          <p:cNvSpPr txBox="1">
+            <a:spLocks noGrp="1"/>
+          </p:cNvSpPr>
           <p:nvPr>
             <p:ph type="ctrTitle"/>
           </p:nvPr>
@@ -1398,7 +1608,7 @@
           </a:prstGeom>
         </p:spPr>
         <p:txBody>
-          <a:bodyPr anchorCtr="0" anchor="b" bIns="91425" lIns="91425" rIns="91425" wrap="square" tIns="91425"/>
+          <a:bodyPr wrap="square" lIns="91425" tIns="91425" rIns="91425" bIns="91425" anchor="b" anchorCtr="0"/>
           <a:lstStyle>
             <a:lvl1pPr lvl="0" algn="ctr">
               <a:spcBef>
@@ -1464,15 +1674,19 @@
               <a:defRPr sz="4000"/>
             </a:lvl9pPr>
           </a:lstStyle>
-          <a:p/>
+          <a:p>
+            <a:endParaRPr/>
+          </a:p>
         </p:txBody>
       </p:sp>
       <p:sp>
         <p:nvSpPr>
           <p:cNvPr id="14" name="Shape 14"/>
-          <p:cNvSpPr txBox="1"/>
+          <p:cNvSpPr txBox="1">
+            <a:spLocks noGrp="1"/>
+          </p:cNvSpPr>
           <p:nvPr>
-            <p:ph idx="1" type="subTitle"/>
+            <p:ph type="subTitle" idx="1"/>
           </p:nvPr>
         </p:nvSpPr>
         <p:spPr>
@@ -1485,7 +1699,7 @@
           </a:prstGeom>
         </p:spPr>
         <p:txBody>
-          <a:bodyPr anchorCtr="0" anchor="t" bIns="91425" lIns="91425" rIns="91425" wrap="square" tIns="91425"/>
+          <a:bodyPr wrap="square" lIns="91425" tIns="91425" rIns="91425" bIns="91425" anchor="t" anchorCtr="0"/>
           <a:lstStyle>
             <a:lvl1pPr lvl="0" algn="ctr">
               <a:lnSpc>
@@ -1722,15 +1936,19 @@
               </a:defRPr>
             </a:lvl9pPr>
           </a:lstStyle>
-          <a:p/>
+          <a:p>
+            <a:endParaRPr/>
+          </a:p>
         </p:txBody>
       </p:sp>
       <p:sp>
         <p:nvSpPr>
           <p:cNvPr id="15" name="Shape 15"/>
-          <p:cNvSpPr txBox="1"/>
+          <p:cNvSpPr txBox="1">
+            <a:spLocks noGrp="1"/>
+          </p:cNvSpPr>
           <p:nvPr>
-            <p:ph idx="12" type="sldNum"/>
+            <p:ph type="sldNum" idx="12"/>
           </p:nvPr>
         </p:nvSpPr>
         <p:spPr>
@@ -1743,7 +1961,7 @@
           </a:prstGeom>
         </p:spPr>
         <p:txBody>
-          <a:bodyPr anchorCtr="0" anchor="ctr" bIns="91425" lIns="91425" rIns="91425" wrap="square" tIns="91425">
+          <a:bodyPr wrap="square" lIns="91425" tIns="91425" rIns="91425" bIns="91425" anchor="ctr" anchorCtr="0">
             <a:noAutofit/>
           </a:bodyPr>
           <a:lstStyle/>
@@ -1758,6 +1976,7 @@
               <a:rPr lang="en"/>
               <a:t>‹#›</a:t>
             </a:fld>
+            <a:endParaRPr lang="en"/>
           </a:p>
         </p:txBody>
       </p:sp>
@@ -1770,11 +1989,11 @@
 </file>
 
 <file path=ppt/slideLayouts/slideLayout10.xml><?xml version="1.0" encoding="utf-8"?>
-<p:sldLayout xmlns:a="http://schemas.openxmlformats.org/drawingml/2006/main" xmlns:r="http://schemas.openxmlformats.org/officeDocument/2006/relationships" xmlns:mc="http://schemas.openxmlformats.org/markup-compatibility/2006" xmlns:mv="urn:schemas-microsoft-com:mac:vml" xmlns:p="http://schemas.openxmlformats.org/presentationml/2006/main" xmlns:c="http://schemas.openxmlformats.org/drawingml/2006/chart" xmlns:dgm="http://schemas.openxmlformats.org/drawingml/2006/diagram" xmlns:o="urn:schemas-microsoft-com:office:office" xmlns:v="urn:schemas-microsoft-com:vml" xmlns:pvml="urn:schemas-microsoft-com:office:powerpoint" xmlns:com="http://schemas.openxmlformats.org/drawingml/2006/compatibility" xmlns:p14="http://schemas.microsoft.com/office/powerpoint/2010/main" xmlns:p15="http://schemas.microsoft.com/office/powerpoint/2012/main">
+<p:sldLayout xmlns:a="http://schemas.openxmlformats.org/drawingml/2006/main" xmlns:r="http://schemas.openxmlformats.org/officeDocument/2006/relationships" xmlns:p="http://schemas.openxmlformats.org/presentationml/2006/main">
   <p:cSld name="Big number">
     <p:spTree>
       <p:nvGrpSpPr>
-        <p:cNvPr id="52" name="Shape 52"/>
+        <p:cNvPr id="1" name="Shape 52"/>
         <p:cNvGrpSpPr/>
         <p:nvPr/>
       </p:nvGrpSpPr>
@@ -1808,7 +2027,7 @@
           </a:ln>
         </p:spPr>
         <p:txBody>
-          <a:bodyPr anchorCtr="0" anchor="ctr" bIns="91425" lIns="91425" rIns="91425" wrap="square" tIns="91425">
+          <a:bodyPr wrap="square" lIns="91425" tIns="91425" rIns="91425" bIns="91425" anchor="ctr" anchorCtr="0">
             <a:noAutofit/>
           </a:bodyPr>
           <a:lstStyle/>
@@ -1819,9 +2038,6 @@
               </a:spcBef>
               <a:buNone/>
             </a:pPr>
-            <a:r>
-              <a:t/>
-            </a:r>
             <a:endParaRPr/>
           </a:p>
         </p:txBody>
@@ -1829,7 +2045,9 @@
       <p:sp>
         <p:nvSpPr>
           <p:cNvPr id="54" name="Shape 54"/>
-          <p:cNvSpPr txBox="1"/>
+          <p:cNvSpPr txBox="1">
+            <a:spLocks noGrp="1"/>
+          </p:cNvSpPr>
           <p:nvPr>
             <p:ph type="title"/>
           </p:nvPr>
@@ -1844,7 +2062,7 @@
           </a:prstGeom>
         </p:spPr>
         <p:txBody>
-          <a:bodyPr anchorCtr="0" anchor="ctr" bIns="91425" lIns="91425" rIns="91425" wrap="square" tIns="91425"/>
+          <a:bodyPr wrap="square" lIns="91425" tIns="91425" rIns="91425" bIns="91425" anchor="ctr" anchorCtr="0"/>
           <a:lstStyle>
             <a:lvl1pPr lvl="0" algn="ctr">
               <a:spcBef>
@@ -1973,15 +2191,19 @@
               </a:defRPr>
             </a:lvl9pPr>
           </a:lstStyle>
-          <a:p/>
+          <a:p>
+            <a:endParaRPr/>
+          </a:p>
         </p:txBody>
       </p:sp>
       <p:sp>
         <p:nvSpPr>
           <p:cNvPr id="55" name="Shape 55"/>
-          <p:cNvSpPr txBox="1"/>
+          <p:cNvSpPr txBox="1">
+            <a:spLocks noGrp="1"/>
+          </p:cNvSpPr>
           <p:nvPr>
-            <p:ph idx="1" type="body"/>
+            <p:ph type="body" idx="1"/>
           </p:nvPr>
         </p:nvSpPr>
         <p:spPr>
@@ -1994,7 +2216,7 @@
           </a:prstGeom>
         </p:spPr>
         <p:txBody>
-          <a:bodyPr anchorCtr="0" anchor="t" bIns="91425" lIns="91425" rIns="91425" wrap="square" tIns="91425"/>
+          <a:bodyPr wrap="square" lIns="91425" tIns="91425" rIns="91425" bIns="91425" anchor="t" anchorCtr="0"/>
           <a:lstStyle>
             <a:lvl1pPr lvl="0" algn="ctr">
               <a:spcBef>
@@ -2051,15 +2273,19 @@
               <a:defRPr/>
             </a:lvl9pPr>
           </a:lstStyle>
-          <a:p/>
+          <a:p>
+            <a:endParaRPr/>
+          </a:p>
         </p:txBody>
       </p:sp>
       <p:sp>
         <p:nvSpPr>
           <p:cNvPr id="56" name="Shape 56"/>
-          <p:cNvSpPr txBox="1"/>
+          <p:cNvSpPr txBox="1">
+            <a:spLocks noGrp="1"/>
+          </p:cNvSpPr>
           <p:nvPr>
-            <p:ph idx="12" type="sldNum"/>
+            <p:ph type="sldNum" idx="12"/>
           </p:nvPr>
         </p:nvSpPr>
         <p:spPr>
@@ -2072,7 +2298,7 @@
           </a:prstGeom>
         </p:spPr>
         <p:txBody>
-          <a:bodyPr anchorCtr="0" anchor="ctr" bIns="91425" lIns="91425" rIns="91425" wrap="square" tIns="91425">
+          <a:bodyPr wrap="square" lIns="91425" tIns="91425" rIns="91425" bIns="91425" anchor="ctr" anchorCtr="0">
             <a:noAutofit/>
           </a:bodyPr>
           <a:lstStyle/>
@@ -2087,6 +2313,7 @@
               <a:rPr lang="en"/>
               <a:t>‹#›</a:t>
             </a:fld>
+            <a:endParaRPr lang="en"/>
           </a:p>
         </p:txBody>
       </p:sp>
@@ -2099,11 +2326,11 @@
 </file>
 
 <file path=ppt/slideLayouts/slideLayout11.xml><?xml version="1.0" encoding="utf-8"?>
-<p:sldLayout xmlns:a="http://schemas.openxmlformats.org/drawingml/2006/main" xmlns:r="http://schemas.openxmlformats.org/officeDocument/2006/relationships" xmlns:mc="http://schemas.openxmlformats.org/markup-compatibility/2006" xmlns:mv="urn:schemas-microsoft-com:mac:vml" xmlns:p="http://schemas.openxmlformats.org/presentationml/2006/main" xmlns:c="http://schemas.openxmlformats.org/drawingml/2006/chart" xmlns:dgm="http://schemas.openxmlformats.org/drawingml/2006/diagram" xmlns:o="urn:schemas-microsoft-com:office:office" xmlns:v="urn:schemas-microsoft-com:vml" xmlns:pvml="urn:schemas-microsoft-com:office:powerpoint" xmlns:com="http://schemas.openxmlformats.org/drawingml/2006/compatibility" xmlns:p14="http://schemas.microsoft.com/office/powerpoint/2010/main" xmlns:p15="http://schemas.microsoft.com/office/powerpoint/2012/main" type="blank">
+<p:sldLayout xmlns:a="http://schemas.openxmlformats.org/drawingml/2006/main" xmlns:r="http://schemas.openxmlformats.org/officeDocument/2006/relationships" xmlns:p="http://schemas.openxmlformats.org/presentationml/2006/main" type="blank">
   <p:cSld name="Blank">
     <p:spTree>
       <p:nvGrpSpPr>
-        <p:cNvPr id="57" name="Shape 57"/>
+        <p:cNvPr id="1" name="Shape 57"/>
         <p:cNvGrpSpPr/>
         <p:nvPr/>
       </p:nvGrpSpPr>
@@ -2118,9 +2345,11 @@
       <p:sp>
         <p:nvSpPr>
           <p:cNvPr id="58" name="Shape 58"/>
-          <p:cNvSpPr txBox="1"/>
+          <p:cNvSpPr txBox="1">
+            <a:spLocks noGrp="1"/>
+          </p:cNvSpPr>
           <p:nvPr>
-            <p:ph idx="12" type="sldNum"/>
+            <p:ph type="sldNum" idx="12"/>
           </p:nvPr>
         </p:nvSpPr>
         <p:spPr>
@@ -2133,7 +2362,7 @@
           </a:prstGeom>
         </p:spPr>
         <p:txBody>
-          <a:bodyPr anchorCtr="0" anchor="ctr" bIns="91425" lIns="91425" rIns="91425" wrap="square" tIns="91425">
+          <a:bodyPr wrap="square" lIns="91425" tIns="91425" rIns="91425" bIns="91425" anchor="ctr" anchorCtr="0">
             <a:noAutofit/>
           </a:bodyPr>
           <a:lstStyle/>
@@ -2148,6 +2377,7 @@
               <a:rPr lang="en"/>
               <a:t>‹#›</a:t>
             </a:fld>
+            <a:endParaRPr lang="en"/>
           </a:p>
         </p:txBody>
       </p:sp>
@@ -2160,11 +2390,11 @@
 </file>
 
 <file path=ppt/slideLayouts/slideLayout2.xml><?xml version="1.0" encoding="utf-8"?>
-<p:sldLayout xmlns:a="http://schemas.openxmlformats.org/drawingml/2006/main" xmlns:r="http://schemas.openxmlformats.org/officeDocument/2006/relationships" xmlns:mc="http://schemas.openxmlformats.org/markup-compatibility/2006" xmlns:mv="urn:schemas-microsoft-com:mac:vml" xmlns:p="http://schemas.openxmlformats.org/presentationml/2006/main" xmlns:c="http://schemas.openxmlformats.org/drawingml/2006/chart" xmlns:dgm="http://schemas.openxmlformats.org/drawingml/2006/diagram" xmlns:o="urn:schemas-microsoft-com:office:office" xmlns:v="urn:schemas-microsoft-com:vml" xmlns:pvml="urn:schemas-microsoft-com:office:powerpoint" xmlns:com="http://schemas.openxmlformats.org/drawingml/2006/compatibility" xmlns:p14="http://schemas.microsoft.com/office/powerpoint/2010/main" xmlns:p15="http://schemas.microsoft.com/office/powerpoint/2012/main" type="secHead">
+<p:sldLayout xmlns:a="http://schemas.openxmlformats.org/drawingml/2006/main" xmlns:r="http://schemas.openxmlformats.org/officeDocument/2006/relationships" xmlns:p="http://schemas.openxmlformats.org/presentationml/2006/main" type="secHead">
   <p:cSld name="Section header">
     <p:spTree>
       <p:nvGrpSpPr>
-        <p:cNvPr id="16" name="Shape 16"/>
+        <p:cNvPr id="1" name="Shape 16"/>
         <p:cNvGrpSpPr/>
         <p:nvPr/>
       </p:nvGrpSpPr>
@@ -2191,21 +2421,23 @@
             <a:avLst/>
           </a:prstGeom>
           <a:noFill/>
-          <a:ln cap="flat" cmpd="sng" w="38100">
+          <a:ln w="38100" cap="flat" cmpd="sng">
             <a:solidFill>
               <a:schemeClr val="accent4"/>
             </a:solidFill>
             <a:prstDash val="solid"/>
             <a:round/>
-            <a:headEnd len="med" w="med" type="none"/>
-            <a:tailEnd len="med" w="med" type="none"/>
+            <a:headEnd type="none" w="med" len="med"/>
+            <a:tailEnd type="none" w="med" len="med"/>
           </a:ln>
         </p:spPr>
       </p:cxnSp>
       <p:sp>
         <p:nvSpPr>
           <p:cNvPr id="18" name="Shape 18"/>
-          <p:cNvSpPr txBox="1"/>
+          <p:cNvSpPr txBox="1">
+            <a:spLocks noGrp="1"/>
+          </p:cNvSpPr>
           <p:nvPr>
             <p:ph type="title"/>
           </p:nvPr>
@@ -2220,7 +2452,7 @@
           </a:prstGeom>
         </p:spPr>
         <p:txBody>
-          <a:bodyPr anchorCtr="0" anchor="b" bIns="91425" lIns="91425" rIns="91425" wrap="square" tIns="91425"/>
+          <a:bodyPr wrap="square" lIns="91425" tIns="91425" rIns="91425" bIns="91425" anchor="b" anchorCtr="0"/>
           <a:lstStyle>
             <a:lvl1pPr lvl="0" algn="ctr">
               <a:spcBef>
@@ -2286,15 +2518,19 @@
               <a:defRPr sz="4800"/>
             </a:lvl9pPr>
           </a:lstStyle>
-          <a:p/>
+          <a:p>
+            <a:endParaRPr/>
+          </a:p>
         </p:txBody>
       </p:sp>
       <p:sp>
         <p:nvSpPr>
           <p:cNvPr id="19" name="Shape 19"/>
-          <p:cNvSpPr txBox="1"/>
+          <p:cNvSpPr txBox="1">
+            <a:spLocks noGrp="1"/>
+          </p:cNvSpPr>
           <p:nvPr>
-            <p:ph idx="12" type="sldNum"/>
+            <p:ph type="sldNum" idx="12"/>
           </p:nvPr>
         </p:nvSpPr>
         <p:spPr>
@@ -2307,7 +2543,7 @@
           </a:prstGeom>
         </p:spPr>
         <p:txBody>
-          <a:bodyPr anchorCtr="0" anchor="ctr" bIns="91425" lIns="91425" rIns="91425" wrap="square" tIns="91425">
+          <a:bodyPr wrap="square" lIns="91425" tIns="91425" rIns="91425" bIns="91425" anchor="ctr" anchorCtr="0">
             <a:noAutofit/>
           </a:bodyPr>
           <a:lstStyle/>
@@ -2322,6 +2558,7 @@
               <a:rPr lang="en"/>
               <a:t>‹#›</a:t>
             </a:fld>
+            <a:endParaRPr lang="en"/>
           </a:p>
         </p:txBody>
       </p:sp>
@@ -2334,11 +2571,11 @@
 </file>
 
 <file path=ppt/slideLayouts/slideLayout3.xml><?xml version="1.0" encoding="utf-8"?>
-<p:sldLayout xmlns:a="http://schemas.openxmlformats.org/drawingml/2006/main" xmlns:r="http://schemas.openxmlformats.org/officeDocument/2006/relationships" xmlns:mc="http://schemas.openxmlformats.org/markup-compatibility/2006" xmlns:mv="urn:schemas-microsoft-com:mac:vml" xmlns:p="http://schemas.openxmlformats.org/presentationml/2006/main" xmlns:c="http://schemas.openxmlformats.org/drawingml/2006/chart" xmlns:dgm="http://schemas.openxmlformats.org/drawingml/2006/diagram" xmlns:o="urn:schemas-microsoft-com:office:office" xmlns:v="urn:schemas-microsoft-com:vml" xmlns:pvml="urn:schemas-microsoft-com:office:powerpoint" xmlns:com="http://schemas.openxmlformats.org/drawingml/2006/compatibility" xmlns:p14="http://schemas.microsoft.com/office/powerpoint/2010/main" xmlns:p15="http://schemas.microsoft.com/office/powerpoint/2012/main" type="tx">
+<p:sldLayout xmlns:a="http://schemas.openxmlformats.org/drawingml/2006/main" xmlns:r="http://schemas.openxmlformats.org/officeDocument/2006/relationships" xmlns:p="http://schemas.openxmlformats.org/presentationml/2006/main" type="tx">
   <p:cSld name="Title and body">
     <p:spTree>
       <p:nvGrpSpPr>
-        <p:cNvPr id="20" name="Shape 20"/>
+        <p:cNvPr id="1" name="Shape 20"/>
         <p:cNvGrpSpPr/>
         <p:nvPr/>
       </p:nvGrpSpPr>
@@ -2365,21 +2602,23 @@
             <a:avLst/>
           </a:prstGeom>
           <a:noFill/>
-          <a:ln cap="flat" cmpd="sng" w="38100">
+          <a:ln w="38100" cap="flat" cmpd="sng">
             <a:solidFill>
               <a:schemeClr val="accent4"/>
             </a:solidFill>
             <a:prstDash val="solid"/>
             <a:round/>
-            <a:headEnd len="med" w="med" type="none"/>
-            <a:tailEnd len="med" w="med" type="none"/>
+            <a:headEnd type="none" w="med" len="med"/>
+            <a:tailEnd type="none" w="med" len="med"/>
           </a:ln>
         </p:spPr>
       </p:cxnSp>
       <p:sp>
         <p:nvSpPr>
           <p:cNvPr id="22" name="Shape 22"/>
-          <p:cNvSpPr txBox="1"/>
+          <p:cNvSpPr txBox="1">
+            <a:spLocks noGrp="1"/>
+          </p:cNvSpPr>
           <p:nvPr>
             <p:ph type="title"/>
           </p:nvPr>
@@ -2394,7 +2633,7 @@
           </a:prstGeom>
         </p:spPr>
         <p:txBody>
-          <a:bodyPr anchorCtr="0" anchor="b" bIns="91425" lIns="91425" rIns="91425" wrap="square" tIns="91425"/>
+          <a:bodyPr wrap="square" lIns="91425" tIns="91425" rIns="91425" bIns="91425" anchor="b" anchorCtr="0"/>
           <a:lstStyle>
             <a:lvl1pPr lvl="0">
               <a:spcBef>
@@ -2451,15 +2690,19 @@
               <a:defRPr/>
             </a:lvl9pPr>
           </a:lstStyle>
-          <a:p/>
+          <a:p>
+            <a:endParaRPr/>
+          </a:p>
         </p:txBody>
       </p:sp>
       <p:sp>
         <p:nvSpPr>
           <p:cNvPr id="23" name="Shape 23"/>
-          <p:cNvSpPr txBox="1"/>
+          <p:cNvSpPr txBox="1">
+            <a:spLocks noGrp="1"/>
+          </p:cNvSpPr>
           <p:nvPr>
-            <p:ph idx="1" type="body"/>
+            <p:ph type="body" idx="1"/>
           </p:nvPr>
         </p:nvSpPr>
         <p:spPr>
@@ -2472,7 +2715,7 @@
           </a:prstGeom>
         </p:spPr>
         <p:txBody>
-          <a:bodyPr anchorCtr="0" anchor="t" bIns="91425" lIns="91425" rIns="91425" wrap="square" tIns="91425"/>
+          <a:bodyPr wrap="square" lIns="91425" tIns="91425" rIns="91425" bIns="91425" anchor="t" anchorCtr="0"/>
           <a:lstStyle>
             <a:lvl1pPr lvl="0">
               <a:spcBef>
@@ -2529,15 +2772,19 @@
               <a:defRPr/>
             </a:lvl9pPr>
           </a:lstStyle>
-          <a:p/>
+          <a:p>
+            <a:endParaRPr/>
+          </a:p>
         </p:txBody>
       </p:sp>
       <p:sp>
         <p:nvSpPr>
           <p:cNvPr id="24" name="Shape 24"/>
-          <p:cNvSpPr txBox="1"/>
+          <p:cNvSpPr txBox="1">
+            <a:spLocks noGrp="1"/>
+          </p:cNvSpPr>
           <p:nvPr>
-            <p:ph idx="12" type="sldNum"/>
+            <p:ph type="sldNum" idx="12"/>
           </p:nvPr>
         </p:nvSpPr>
         <p:spPr>
@@ -2550,7 +2797,7 @@
           </a:prstGeom>
         </p:spPr>
         <p:txBody>
-          <a:bodyPr anchorCtr="0" anchor="ctr" bIns="91425" lIns="91425" rIns="91425" wrap="square" tIns="91425">
+          <a:bodyPr wrap="square" lIns="91425" tIns="91425" rIns="91425" bIns="91425" anchor="ctr" anchorCtr="0">
             <a:noAutofit/>
           </a:bodyPr>
           <a:lstStyle/>
@@ -2565,6 +2812,7 @@
               <a:rPr lang="en"/>
               <a:t>‹#›</a:t>
             </a:fld>
+            <a:endParaRPr lang="en"/>
           </a:p>
         </p:txBody>
       </p:sp>
@@ -2577,11 +2825,11 @@
 </file>
 
 <file path=ppt/slideLayouts/slideLayout4.xml><?xml version="1.0" encoding="utf-8"?>
-<p:sldLayout xmlns:a="http://schemas.openxmlformats.org/drawingml/2006/main" xmlns:r="http://schemas.openxmlformats.org/officeDocument/2006/relationships" xmlns:mc="http://schemas.openxmlformats.org/markup-compatibility/2006" xmlns:mv="urn:schemas-microsoft-com:mac:vml" xmlns:p="http://schemas.openxmlformats.org/presentationml/2006/main" xmlns:c="http://schemas.openxmlformats.org/drawingml/2006/chart" xmlns:dgm="http://schemas.openxmlformats.org/drawingml/2006/diagram" xmlns:o="urn:schemas-microsoft-com:office:office" xmlns:v="urn:schemas-microsoft-com:vml" xmlns:pvml="urn:schemas-microsoft-com:office:powerpoint" xmlns:com="http://schemas.openxmlformats.org/drawingml/2006/compatibility" xmlns:p14="http://schemas.microsoft.com/office/powerpoint/2010/main" xmlns:p15="http://schemas.microsoft.com/office/powerpoint/2012/main" type="twoColTx">
+<p:sldLayout xmlns:a="http://schemas.openxmlformats.org/drawingml/2006/main" xmlns:r="http://schemas.openxmlformats.org/officeDocument/2006/relationships" xmlns:p="http://schemas.openxmlformats.org/presentationml/2006/main" type="twoColTx">
   <p:cSld name="Title and two columns">
     <p:spTree>
       <p:nvGrpSpPr>
-        <p:cNvPr id="25" name="Shape 25"/>
+        <p:cNvPr id="1" name="Shape 25"/>
         <p:cNvGrpSpPr/>
         <p:nvPr/>
       </p:nvGrpSpPr>
@@ -2608,21 +2856,23 @@
             <a:avLst/>
           </a:prstGeom>
           <a:noFill/>
-          <a:ln cap="flat" cmpd="sng" w="38100">
+          <a:ln w="38100" cap="flat" cmpd="sng">
             <a:solidFill>
               <a:schemeClr val="accent4"/>
             </a:solidFill>
             <a:prstDash val="solid"/>
             <a:round/>
-            <a:headEnd len="med" w="med" type="none"/>
-            <a:tailEnd len="med" w="med" type="none"/>
+            <a:headEnd type="none" w="med" len="med"/>
+            <a:tailEnd type="none" w="med" len="med"/>
           </a:ln>
         </p:spPr>
       </p:cxnSp>
       <p:sp>
         <p:nvSpPr>
           <p:cNvPr id="27" name="Shape 27"/>
-          <p:cNvSpPr txBox="1"/>
+          <p:cNvSpPr txBox="1">
+            <a:spLocks noGrp="1"/>
+          </p:cNvSpPr>
           <p:nvPr>
             <p:ph type="title"/>
           </p:nvPr>
@@ -2637,7 +2887,7 @@
           </a:prstGeom>
         </p:spPr>
         <p:txBody>
-          <a:bodyPr anchorCtr="0" anchor="b" bIns="91425" lIns="91425" rIns="91425" wrap="square" tIns="91425"/>
+          <a:bodyPr wrap="square" lIns="91425" tIns="91425" rIns="91425" bIns="91425" anchor="b" anchorCtr="0"/>
           <a:lstStyle>
             <a:lvl1pPr lvl="0">
               <a:spcBef>
@@ -2694,15 +2944,19 @@
               <a:defRPr/>
             </a:lvl9pPr>
           </a:lstStyle>
-          <a:p/>
+          <a:p>
+            <a:endParaRPr/>
+          </a:p>
         </p:txBody>
       </p:sp>
       <p:sp>
         <p:nvSpPr>
           <p:cNvPr id="28" name="Shape 28"/>
-          <p:cNvSpPr txBox="1"/>
+          <p:cNvSpPr txBox="1">
+            <a:spLocks noGrp="1"/>
+          </p:cNvSpPr>
           <p:nvPr>
-            <p:ph idx="1" type="body"/>
+            <p:ph type="body" idx="1"/>
           </p:nvPr>
         </p:nvSpPr>
         <p:spPr>
@@ -2715,7 +2969,7 @@
           </a:prstGeom>
         </p:spPr>
         <p:txBody>
-          <a:bodyPr anchorCtr="0" anchor="t" bIns="91425" lIns="91425" rIns="91425" wrap="square" tIns="91425"/>
+          <a:bodyPr wrap="square" lIns="91425" tIns="91425" rIns="91425" bIns="91425" anchor="t" anchorCtr="0"/>
           <a:lstStyle>
             <a:lvl1pPr lvl="0">
               <a:spcBef>
@@ -2781,15 +3035,19 @@
               <a:defRPr sz="1200"/>
             </a:lvl9pPr>
           </a:lstStyle>
-          <a:p/>
+          <a:p>
+            <a:endParaRPr/>
+          </a:p>
         </p:txBody>
       </p:sp>
       <p:sp>
         <p:nvSpPr>
           <p:cNvPr id="29" name="Shape 29"/>
-          <p:cNvSpPr txBox="1"/>
+          <p:cNvSpPr txBox="1">
+            <a:spLocks noGrp="1"/>
+          </p:cNvSpPr>
           <p:nvPr>
-            <p:ph idx="2" type="body"/>
+            <p:ph type="body" idx="2"/>
           </p:nvPr>
         </p:nvSpPr>
         <p:spPr>
@@ -2802,7 +3060,7 @@
           </a:prstGeom>
         </p:spPr>
         <p:txBody>
-          <a:bodyPr anchorCtr="0" anchor="t" bIns="91425" lIns="91425" rIns="91425" wrap="square" tIns="91425"/>
+          <a:bodyPr wrap="square" lIns="91425" tIns="91425" rIns="91425" bIns="91425" anchor="t" anchorCtr="0"/>
           <a:lstStyle>
             <a:lvl1pPr lvl="0">
               <a:spcBef>
@@ -2868,15 +3126,19 @@
               <a:defRPr sz="1200"/>
             </a:lvl9pPr>
           </a:lstStyle>
-          <a:p/>
+          <a:p>
+            <a:endParaRPr/>
+          </a:p>
         </p:txBody>
       </p:sp>
       <p:sp>
         <p:nvSpPr>
           <p:cNvPr id="30" name="Shape 30"/>
-          <p:cNvSpPr txBox="1"/>
+          <p:cNvSpPr txBox="1">
+            <a:spLocks noGrp="1"/>
+          </p:cNvSpPr>
           <p:nvPr>
-            <p:ph idx="12" type="sldNum"/>
+            <p:ph type="sldNum" idx="12"/>
           </p:nvPr>
         </p:nvSpPr>
         <p:spPr>
@@ -2889,7 +3151,7 @@
           </a:prstGeom>
         </p:spPr>
         <p:txBody>
-          <a:bodyPr anchorCtr="0" anchor="ctr" bIns="91425" lIns="91425" rIns="91425" wrap="square" tIns="91425">
+          <a:bodyPr wrap="square" lIns="91425" tIns="91425" rIns="91425" bIns="91425" anchor="ctr" anchorCtr="0">
             <a:noAutofit/>
           </a:bodyPr>
           <a:lstStyle/>
@@ -2904,6 +3166,7 @@
               <a:rPr lang="en"/>
               <a:t>‹#›</a:t>
             </a:fld>
+            <a:endParaRPr lang="en"/>
           </a:p>
         </p:txBody>
       </p:sp>
@@ -2916,11 +3179,11 @@
 </file>
 
 <file path=ppt/slideLayouts/slideLayout5.xml><?xml version="1.0" encoding="utf-8"?>
-<p:sldLayout xmlns:a="http://schemas.openxmlformats.org/drawingml/2006/main" xmlns:r="http://schemas.openxmlformats.org/officeDocument/2006/relationships" xmlns:mc="http://schemas.openxmlformats.org/markup-compatibility/2006" xmlns:mv="urn:schemas-microsoft-com:mac:vml" xmlns:p="http://schemas.openxmlformats.org/presentationml/2006/main" xmlns:c="http://schemas.openxmlformats.org/drawingml/2006/chart" xmlns:dgm="http://schemas.openxmlformats.org/drawingml/2006/diagram" xmlns:o="urn:schemas-microsoft-com:office:office" xmlns:v="urn:schemas-microsoft-com:vml" xmlns:pvml="urn:schemas-microsoft-com:office:powerpoint" xmlns:com="http://schemas.openxmlformats.org/drawingml/2006/compatibility" xmlns:p14="http://schemas.microsoft.com/office/powerpoint/2010/main" xmlns:p15="http://schemas.microsoft.com/office/powerpoint/2012/main" type="titleOnly">
+<p:sldLayout xmlns:a="http://schemas.openxmlformats.org/drawingml/2006/main" xmlns:r="http://schemas.openxmlformats.org/officeDocument/2006/relationships" xmlns:p="http://schemas.openxmlformats.org/presentationml/2006/main" type="titleOnly">
   <p:cSld name="Title only">
     <p:spTree>
       <p:nvGrpSpPr>
-        <p:cNvPr id="31" name="Shape 31"/>
+        <p:cNvPr id="1" name="Shape 31"/>
         <p:cNvGrpSpPr/>
         <p:nvPr/>
       </p:nvGrpSpPr>
@@ -2935,7 +3198,9 @@
       <p:sp>
         <p:nvSpPr>
           <p:cNvPr id="32" name="Shape 32"/>
-          <p:cNvSpPr txBox="1"/>
+          <p:cNvSpPr txBox="1">
+            <a:spLocks noGrp="1"/>
+          </p:cNvSpPr>
           <p:nvPr>
             <p:ph type="title"/>
           </p:nvPr>
@@ -2950,7 +3215,7 @@
           </a:prstGeom>
         </p:spPr>
         <p:txBody>
-          <a:bodyPr anchorCtr="0" anchor="b" bIns="91425" lIns="91425" rIns="91425" wrap="square" tIns="91425"/>
+          <a:bodyPr wrap="square" lIns="91425" tIns="91425" rIns="91425" bIns="91425" anchor="b" anchorCtr="0"/>
           <a:lstStyle>
             <a:lvl1pPr lvl="0">
               <a:spcBef>
@@ -3007,15 +3272,19 @@
               <a:defRPr/>
             </a:lvl9pPr>
           </a:lstStyle>
-          <a:p/>
+          <a:p>
+            <a:endParaRPr/>
+          </a:p>
         </p:txBody>
       </p:sp>
       <p:sp>
         <p:nvSpPr>
           <p:cNvPr id="33" name="Shape 33"/>
-          <p:cNvSpPr txBox="1"/>
+          <p:cNvSpPr txBox="1">
+            <a:spLocks noGrp="1"/>
+          </p:cNvSpPr>
           <p:nvPr>
-            <p:ph idx="12" type="sldNum"/>
+            <p:ph type="sldNum" idx="12"/>
           </p:nvPr>
         </p:nvSpPr>
         <p:spPr>
@@ -3028,7 +3297,7 @@
           </a:prstGeom>
         </p:spPr>
         <p:txBody>
-          <a:bodyPr anchorCtr="0" anchor="ctr" bIns="91425" lIns="91425" rIns="91425" wrap="square" tIns="91425">
+          <a:bodyPr wrap="square" lIns="91425" tIns="91425" rIns="91425" bIns="91425" anchor="ctr" anchorCtr="0">
             <a:noAutofit/>
           </a:bodyPr>
           <a:lstStyle/>
@@ -3043,6 +3312,7 @@
               <a:rPr lang="en"/>
               <a:t>‹#›</a:t>
             </a:fld>
+            <a:endParaRPr lang="en"/>
           </a:p>
         </p:txBody>
       </p:sp>
@@ -3055,11 +3325,11 @@
 </file>
 
 <file path=ppt/slideLayouts/slideLayout6.xml><?xml version="1.0" encoding="utf-8"?>
-<p:sldLayout xmlns:a="http://schemas.openxmlformats.org/drawingml/2006/main" xmlns:r="http://schemas.openxmlformats.org/officeDocument/2006/relationships" xmlns:mc="http://schemas.openxmlformats.org/markup-compatibility/2006" xmlns:mv="urn:schemas-microsoft-com:mac:vml" xmlns:p="http://schemas.openxmlformats.org/presentationml/2006/main" xmlns:c="http://schemas.openxmlformats.org/drawingml/2006/chart" xmlns:dgm="http://schemas.openxmlformats.org/drawingml/2006/diagram" xmlns:o="urn:schemas-microsoft-com:office:office" xmlns:v="urn:schemas-microsoft-com:vml" xmlns:pvml="urn:schemas-microsoft-com:office:powerpoint" xmlns:com="http://schemas.openxmlformats.org/drawingml/2006/compatibility" xmlns:p14="http://schemas.microsoft.com/office/powerpoint/2010/main" xmlns:p15="http://schemas.microsoft.com/office/powerpoint/2012/main">
+<p:sldLayout xmlns:a="http://schemas.openxmlformats.org/drawingml/2006/main" xmlns:r="http://schemas.openxmlformats.org/officeDocument/2006/relationships" xmlns:p="http://schemas.openxmlformats.org/presentationml/2006/main">
   <p:cSld name="One column text">
     <p:spTree>
       <p:nvGrpSpPr>
-        <p:cNvPr id="34" name="Shape 34"/>
+        <p:cNvPr id="1" name="Shape 34"/>
         <p:cNvGrpSpPr/>
         <p:nvPr/>
       </p:nvGrpSpPr>
@@ -3086,21 +3356,23 @@
             <a:avLst/>
           </a:prstGeom>
           <a:noFill/>
-          <a:ln cap="flat" cmpd="sng" w="38100">
+          <a:ln w="38100" cap="flat" cmpd="sng">
             <a:solidFill>
               <a:schemeClr val="accent4"/>
             </a:solidFill>
             <a:prstDash val="solid"/>
             <a:round/>
-            <a:headEnd len="med" w="med" type="none"/>
-            <a:tailEnd len="med" w="med" type="none"/>
+            <a:headEnd type="none" w="med" len="med"/>
+            <a:tailEnd type="none" w="med" len="med"/>
           </a:ln>
         </p:spPr>
       </p:cxnSp>
       <p:sp>
         <p:nvSpPr>
           <p:cNvPr id="36" name="Shape 36"/>
-          <p:cNvSpPr txBox="1"/>
+          <p:cNvSpPr txBox="1">
+            <a:spLocks noGrp="1"/>
+          </p:cNvSpPr>
           <p:nvPr>
             <p:ph type="title"/>
           </p:nvPr>
@@ -3115,7 +3387,7 @@
           </a:prstGeom>
         </p:spPr>
         <p:txBody>
-          <a:bodyPr anchorCtr="0" anchor="b" bIns="91425" lIns="91425" rIns="91425" wrap="square" tIns="91425"/>
+          <a:bodyPr wrap="square" lIns="91425" tIns="91425" rIns="91425" bIns="91425" anchor="b" anchorCtr="0"/>
           <a:lstStyle>
             <a:lvl1pPr lvl="0">
               <a:spcBef>
@@ -3181,15 +3453,19 @@
               <a:defRPr sz="2400"/>
             </a:lvl9pPr>
           </a:lstStyle>
-          <a:p/>
+          <a:p>
+            <a:endParaRPr/>
+          </a:p>
         </p:txBody>
       </p:sp>
       <p:sp>
         <p:nvSpPr>
           <p:cNvPr id="37" name="Shape 37"/>
-          <p:cNvSpPr txBox="1"/>
+          <p:cNvSpPr txBox="1">
+            <a:spLocks noGrp="1"/>
+          </p:cNvSpPr>
           <p:nvPr>
-            <p:ph idx="1" type="body"/>
+            <p:ph type="body" idx="1"/>
           </p:nvPr>
         </p:nvSpPr>
         <p:spPr>
@@ -3202,7 +3478,7 @@
           </a:prstGeom>
         </p:spPr>
         <p:txBody>
-          <a:bodyPr anchorCtr="0" anchor="t" bIns="91425" lIns="91425" rIns="91425" wrap="square" tIns="91425"/>
+          <a:bodyPr wrap="square" lIns="91425" tIns="91425" rIns="91425" bIns="91425" anchor="t" anchorCtr="0"/>
           <a:lstStyle>
             <a:lvl1pPr lvl="0">
               <a:spcBef>
@@ -3268,15 +3544,19 @@
               <a:defRPr sz="1200"/>
             </a:lvl9pPr>
           </a:lstStyle>
-          <a:p/>
+          <a:p>
+            <a:endParaRPr/>
+          </a:p>
         </p:txBody>
       </p:sp>
       <p:sp>
         <p:nvSpPr>
           <p:cNvPr id="38" name="Shape 38"/>
-          <p:cNvSpPr txBox="1"/>
+          <p:cNvSpPr txBox="1">
+            <a:spLocks noGrp="1"/>
+          </p:cNvSpPr>
           <p:nvPr>
-            <p:ph idx="12" type="sldNum"/>
+            <p:ph type="sldNum" idx="12"/>
           </p:nvPr>
         </p:nvSpPr>
         <p:spPr>
@@ -3289,7 +3569,7 @@
           </a:prstGeom>
         </p:spPr>
         <p:txBody>
-          <a:bodyPr anchorCtr="0" anchor="ctr" bIns="91425" lIns="91425" rIns="91425" wrap="square" tIns="91425">
+          <a:bodyPr wrap="square" lIns="91425" tIns="91425" rIns="91425" bIns="91425" anchor="ctr" anchorCtr="0">
             <a:noAutofit/>
           </a:bodyPr>
           <a:lstStyle/>
@@ -3304,6 +3584,7 @@
               <a:rPr lang="en"/>
               <a:t>‹#›</a:t>
             </a:fld>
+            <a:endParaRPr lang="en"/>
           </a:p>
         </p:txBody>
       </p:sp>
@@ -3316,11 +3597,11 @@
 </file>
 
 <file path=ppt/slideLayouts/slideLayout7.xml><?xml version="1.0" encoding="utf-8"?>
-<p:sldLayout xmlns:a="http://schemas.openxmlformats.org/drawingml/2006/main" xmlns:r="http://schemas.openxmlformats.org/officeDocument/2006/relationships" xmlns:mc="http://schemas.openxmlformats.org/markup-compatibility/2006" xmlns:mv="urn:schemas-microsoft-com:mac:vml" xmlns:p="http://schemas.openxmlformats.org/presentationml/2006/main" xmlns:c="http://schemas.openxmlformats.org/drawingml/2006/chart" xmlns:dgm="http://schemas.openxmlformats.org/drawingml/2006/diagram" xmlns:o="urn:schemas-microsoft-com:office:office" xmlns:v="urn:schemas-microsoft-com:vml" xmlns:pvml="urn:schemas-microsoft-com:office:powerpoint" xmlns:com="http://schemas.openxmlformats.org/drawingml/2006/compatibility" xmlns:p14="http://schemas.microsoft.com/office/powerpoint/2010/main" xmlns:p15="http://schemas.microsoft.com/office/powerpoint/2012/main">
+<p:sldLayout xmlns:a="http://schemas.openxmlformats.org/drawingml/2006/main" xmlns:r="http://schemas.openxmlformats.org/officeDocument/2006/relationships" xmlns:p="http://schemas.openxmlformats.org/presentationml/2006/main">
   <p:cSld name="Main point">
     <p:spTree>
       <p:nvGrpSpPr>
-        <p:cNvPr id="39" name="Shape 39"/>
+        <p:cNvPr id="1" name="Shape 39"/>
         <p:cNvGrpSpPr/>
         <p:nvPr/>
       </p:nvGrpSpPr>
@@ -3335,7 +3616,9 @@
       <p:sp>
         <p:nvSpPr>
           <p:cNvPr id="40" name="Shape 40"/>
-          <p:cNvSpPr txBox="1"/>
+          <p:cNvSpPr txBox="1">
+            <a:spLocks noGrp="1"/>
+          </p:cNvSpPr>
           <p:nvPr>
             <p:ph type="title"/>
           </p:nvPr>
@@ -3350,7 +3633,7 @@
           </a:prstGeom>
         </p:spPr>
         <p:txBody>
-          <a:bodyPr anchorCtr="0" anchor="ctr" bIns="91425" lIns="91425" rIns="91425" wrap="square" tIns="91425"/>
+          <a:bodyPr wrap="square" lIns="91425" tIns="91425" rIns="91425" bIns="91425" anchor="ctr" anchorCtr="0"/>
           <a:lstStyle>
             <a:lvl1pPr lvl="0">
               <a:spcBef>
@@ -3416,15 +3699,19 @@
               <a:defRPr sz="4800"/>
             </a:lvl9pPr>
           </a:lstStyle>
-          <a:p/>
+          <a:p>
+            <a:endParaRPr/>
+          </a:p>
         </p:txBody>
       </p:sp>
       <p:sp>
         <p:nvSpPr>
           <p:cNvPr id="41" name="Shape 41"/>
-          <p:cNvSpPr txBox="1"/>
+          <p:cNvSpPr txBox="1">
+            <a:spLocks noGrp="1"/>
+          </p:cNvSpPr>
           <p:nvPr>
-            <p:ph idx="12" type="sldNum"/>
+            <p:ph type="sldNum" idx="12"/>
           </p:nvPr>
         </p:nvSpPr>
         <p:spPr>
@@ -3437,7 +3724,7 @@
           </a:prstGeom>
         </p:spPr>
         <p:txBody>
-          <a:bodyPr anchorCtr="0" anchor="ctr" bIns="91425" lIns="91425" rIns="91425" wrap="square" tIns="91425">
+          <a:bodyPr wrap="square" lIns="91425" tIns="91425" rIns="91425" bIns="91425" anchor="ctr" anchorCtr="0">
             <a:noAutofit/>
           </a:bodyPr>
           <a:lstStyle/>
@@ -3452,6 +3739,7 @@
               <a:rPr lang="en"/>
               <a:t>‹#›</a:t>
             </a:fld>
+            <a:endParaRPr lang="en"/>
           </a:p>
         </p:txBody>
       </p:sp>
@@ -3464,11 +3752,11 @@
 </file>
 
 <file path=ppt/slideLayouts/slideLayout8.xml><?xml version="1.0" encoding="utf-8"?>
-<p:sldLayout xmlns:a="http://schemas.openxmlformats.org/drawingml/2006/main" xmlns:r="http://schemas.openxmlformats.org/officeDocument/2006/relationships" xmlns:mc="http://schemas.openxmlformats.org/markup-compatibility/2006" xmlns:mv="urn:schemas-microsoft-com:mac:vml" xmlns:p="http://schemas.openxmlformats.org/presentationml/2006/main" xmlns:c="http://schemas.openxmlformats.org/drawingml/2006/chart" xmlns:dgm="http://schemas.openxmlformats.org/drawingml/2006/diagram" xmlns:o="urn:schemas-microsoft-com:office:office" xmlns:v="urn:schemas-microsoft-com:vml" xmlns:pvml="urn:schemas-microsoft-com:office:powerpoint" xmlns:com="http://schemas.openxmlformats.org/drawingml/2006/compatibility" xmlns:p14="http://schemas.microsoft.com/office/powerpoint/2010/main" xmlns:p15="http://schemas.microsoft.com/office/powerpoint/2012/main">
+<p:sldLayout xmlns:a="http://schemas.openxmlformats.org/drawingml/2006/main" xmlns:r="http://schemas.openxmlformats.org/officeDocument/2006/relationships" xmlns:p="http://schemas.openxmlformats.org/presentationml/2006/main">
   <p:cSld name="Section title and description">
     <p:spTree>
       <p:nvGrpSpPr>
-        <p:cNvPr id="42" name="Shape 42"/>
+        <p:cNvPr id="1" name="Shape 42"/>
         <p:cNvGrpSpPr/>
         <p:nvPr/>
       </p:nvGrpSpPr>
@@ -3502,7 +3790,7 @@
           </a:ln>
         </p:spPr>
         <p:txBody>
-          <a:bodyPr anchorCtr="0" anchor="ctr" bIns="91425" lIns="91425" rIns="91425" wrap="square" tIns="91425">
+          <a:bodyPr wrap="square" lIns="91425" tIns="91425" rIns="91425" bIns="91425" anchor="ctr" anchorCtr="0">
             <a:noAutofit/>
           </a:bodyPr>
           <a:lstStyle/>
@@ -3513,9 +3801,6 @@
               </a:spcBef>
               <a:buNone/>
             </a:pPr>
-            <a:r>
-              <a:t/>
-            </a:r>
             <a:endParaRPr/>
           </a:p>
         </p:txBody>
@@ -3535,21 +3820,23 @@
             <a:avLst/>
           </a:prstGeom>
           <a:noFill/>
-          <a:ln cap="flat" cmpd="sng" w="38100">
+          <a:ln w="38100" cap="flat" cmpd="sng">
             <a:solidFill>
               <a:schemeClr val="accent5"/>
             </a:solidFill>
             <a:prstDash val="solid"/>
             <a:round/>
-            <a:headEnd len="med" w="med" type="none"/>
-            <a:tailEnd len="med" w="med" type="none"/>
+            <a:headEnd type="none" w="med" len="med"/>
+            <a:tailEnd type="none" w="med" len="med"/>
           </a:ln>
         </p:spPr>
       </p:cxnSp>
       <p:sp>
         <p:nvSpPr>
           <p:cNvPr id="45" name="Shape 45"/>
-          <p:cNvSpPr txBox="1"/>
+          <p:cNvSpPr txBox="1">
+            <a:spLocks noGrp="1"/>
+          </p:cNvSpPr>
           <p:nvPr>
             <p:ph type="title"/>
           </p:nvPr>
@@ -3564,7 +3851,7 @@
           </a:prstGeom>
         </p:spPr>
         <p:txBody>
-          <a:bodyPr anchorCtr="0" anchor="b" bIns="91425" lIns="91425" rIns="91425" wrap="square" tIns="91425"/>
+          <a:bodyPr wrap="square" lIns="91425" tIns="91425" rIns="91425" bIns="91425" anchor="b" anchorCtr="0"/>
           <a:lstStyle>
             <a:lvl1pPr lvl="0" algn="ctr">
               <a:spcBef>
@@ -3630,15 +3917,19 @@
               <a:defRPr sz="3800"/>
             </a:lvl9pPr>
           </a:lstStyle>
-          <a:p/>
+          <a:p>
+            <a:endParaRPr/>
+          </a:p>
         </p:txBody>
       </p:sp>
       <p:sp>
         <p:nvSpPr>
           <p:cNvPr id="46" name="Shape 46"/>
-          <p:cNvSpPr txBox="1"/>
+          <p:cNvSpPr txBox="1">
+            <a:spLocks noGrp="1"/>
+          </p:cNvSpPr>
           <p:nvPr>
-            <p:ph idx="1" type="subTitle"/>
+            <p:ph type="subTitle" idx="1"/>
           </p:nvPr>
         </p:nvSpPr>
         <p:spPr>
@@ -3651,7 +3942,7 @@
           </a:prstGeom>
         </p:spPr>
         <p:txBody>
-          <a:bodyPr anchorCtr="0" anchor="t" bIns="91425" lIns="91425" rIns="91425" wrap="square" tIns="91425"/>
+          <a:bodyPr wrap="square" lIns="91425" tIns="91425" rIns="91425" bIns="91425" anchor="t" anchorCtr="0"/>
           <a:lstStyle>
             <a:lvl1pPr lvl="0" algn="ctr">
               <a:lnSpc>
@@ -3843,15 +4134,19 @@
               </a:defRPr>
             </a:lvl9pPr>
           </a:lstStyle>
-          <a:p/>
+          <a:p>
+            <a:endParaRPr/>
+          </a:p>
         </p:txBody>
       </p:sp>
       <p:sp>
         <p:nvSpPr>
           <p:cNvPr id="47" name="Shape 47"/>
-          <p:cNvSpPr txBox="1"/>
+          <p:cNvSpPr txBox="1">
+            <a:spLocks noGrp="1"/>
+          </p:cNvSpPr>
           <p:nvPr>
-            <p:ph idx="2" type="body"/>
+            <p:ph type="body" idx="2"/>
           </p:nvPr>
         </p:nvSpPr>
         <p:spPr>
@@ -3864,7 +4159,7 @@
           </a:prstGeom>
         </p:spPr>
         <p:txBody>
-          <a:bodyPr anchorCtr="0" anchor="ctr" bIns="91425" lIns="91425" rIns="91425" wrap="square" tIns="91425"/>
+          <a:bodyPr wrap="square" lIns="91425" tIns="91425" rIns="91425" bIns="91425" anchor="ctr" anchorCtr="0"/>
           <a:lstStyle>
             <a:lvl1pPr lvl="0">
               <a:spcBef>
@@ -3921,15 +4216,19 @@
               <a:defRPr/>
             </a:lvl9pPr>
           </a:lstStyle>
-          <a:p/>
+          <a:p>
+            <a:endParaRPr/>
+          </a:p>
         </p:txBody>
       </p:sp>
       <p:sp>
         <p:nvSpPr>
           <p:cNvPr id="48" name="Shape 48"/>
-          <p:cNvSpPr txBox="1"/>
+          <p:cNvSpPr txBox="1">
+            <a:spLocks noGrp="1"/>
+          </p:cNvSpPr>
           <p:nvPr>
-            <p:ph idx="12" type="sldNum"/>
+            <p:ph type="sldNum" idx="12"/>
           </p:nvPr>
         </p:nvSpPr>
         <p:spPr>
@@ -3942,7 +4241,7 @@
           </a:prstGeom>
         </p:spPr>
         <p:txBody>
-          <a:bodyPr anchorCtr="0" anchor="ctr" bIns="91425" lIns="91425" rIns="91425" wrap="square" tIns="91425">
+          <a:bodyPr wrap="square" lIns="91425" tIns="91425" rIns="91425" bIns="91425" anchor="ctr" anchorCtr="0">
             <a:noAutofit/>
           </a:bodyPr>
           <a:lstStyle/>
@@ -3957,6 +4256,7 @@
               <a:rPr lang="en"/>
               <a:t>‹#›</a:t>
             </a:fld>
+            <a:endParaRPr lang="en"/>
           </a:p>
         </p:txBody>
       </p:sp>
@@ -3969,11 +4269,11 @@
 </file>
 
 <file path=ppt/slideLayouts/slideLayout9.xml><?xml version="1.0" encoding="utf-8"?>
-<p:sldLayout xmlns:a="http://schemas.openxmlformats.org/drawingml/2006/main" xmlns:r="http://schemas.openxmlformats.org/officeDocument/2006/relationships" xmlns:mc="http://schemas.openxmlformats.org/markup-compatibility/2006" xmlns:mv="urn:schemas-microsoft-com:mac:vml" xmlns:p="http://schemas.openxmlformats.org/presentationml/2006/main" xmlns:c="http://schemas.openxmlformats.org/drawingml/2006/chart" xmlns:dgm="http://schemas.openxmlformats.org/drawingml/2006/diagram" xmlns:o="urn:schemas-microsoft-com:office:office" xmlns:v="urn:schemas-microsoft-com:vml" xmlns:pvml="urn:schemas-microsoft-com:office:powerpoint" xmlns:com="http://schemas.openxmlformats.org/drawingml/2006/compatibility" xmlns:p14="http://schemas.microsoft.com/office/powerpoint/2010/main" xmlns:p15="http://schemas.microsoft.com/office/powerpoint/2012/main">
+<p:sldLayout xmlns:a="http://schemas.openxmlformats.org/drawingml/2006/main" xmlns:r="http://schemas.openxmlformats.org/officeDocument/2006/relationships" xmlns:p="http://schemas.openxmlformats.org/presentationml/2006/main">
   <p:cSld name="Caption">
     <p:spTree>
       <p:nvGrpSpPr>
-        <p:cNvPr id="49" name="Shape 49"/>
+        <p:cNvPr id="1" name="Shape 49"/>
         <p:cNvGrpSpPr/>
         <p:nvPr/>
       </p:nvGrpSpPr>
@@ -3988,9 +4288,11 @@
       <p:sp>
         <p:nvSpPr>
           <p:cNvPr id="50" name="Shape 50"/>
-          <p:cNvSpPr txBox="1"/>
+          <p:cNvSpPr txBox="1">
+            <a:spLocks noGrp="1"/>
+          </p:cNvSpPr>
           <p:nvPr>
-            <p:ph idx="1" type="body"/>
+            <p:ph type="body" idx="1"/>
           </p:nvPr>
         </p:nvSpPr>
         <p:spPr>
@@ -4003,7 +4305,7 @@
           </a:prstGeom>
         </p:spPr>
         <p:txBody>
-          <a:bodyPr anchorCtr="0" anchor="ctr" bIns="91425" lIns="91425" rIns="91425" wrap="square" tIns="91425"/>
+          <a:bodyPr wrap="square" lIns="91425" tIns="91425" rIns="91425" bIns="91425" anchor="ctr" anchorCtr="0"/>
           <a:lstStyle>
             <a:lvl1pPr lvl="0">
               <a:lnSpc>
@@ -4025,15 +4327,19 @@
               </a:defRPr>
             </a:lvl1pPr>
           </a:lstStyle>
-          <a:p/>
+          <a:p>
+            <a:endParaRPr/>
+          </a:p>
         </p:txBody>
       </p:sp>
       <p:sp>
         <p:nvSpPr>
           <p:cNvPr id="51" name="Shape 51"/>
-          <p:cNvSpPr txBox="1"/>
+          <p:cNvSpPr txBox="1">
+            <a:spLocks noGrp="1"/>
+          </p:cNvSpPr>
           <p:nvPr>
-            <p:ph idx="12" type="sldNum"/>
+            <p:ph type="sldNum" idx="12"/>
           </p:nvPr>
         </p:nvSpPr>
         <p:spPr>
@@ -4046,7 +4352,7 @@
           </a:prstGeom>
         </p:spPr>
         <p:txBody>
-          <a:bodyPr anchorCtr="0" anchor="ctr" bIns="91425" lIns="91425" rIns="91425" wrap="square" tIns="91425">
+          <a:bodyPr wrap="square" lIns="91425" tIns="91425" rIns="91425" bIns="91425" anchor="ctr" anchorCtr="0">
             <a:noAutofit/>
           </a:bodyPr>
           <a:lstStyle/>
@@ -4061,6 +4367,7 @@
               <a:rPr lang="en"/>
               <a:t>‹#›</a:t>
             </a:fld>
+            <a:endParaRPr lang="en"/>
           </a:p>
         </p:txBody>
       </p:sp>
@@ -4073,18 +4380,19 @@
 </file>
 
 <file path=ppt/slideMasters/slideMaster1.xml><?xml version="1.0" encoding="utf-8"?>
-<p:sldMaster xmlns:a="http://schemas.openxmlformats.org/drawingml/2006/main" xmlns:r="http://schemas.openxmlformats.org/officeDocument/2006/relationships" xmlns:mc="http://schemas.openxmlformats.org/markup-compatibility/2006" xmlns:mv="urn:schemas-microsoft-com:mac:vml" xmlns:p="http://schemas.openxmlformats.org/presentationml/2006/main" xmlns:c="http://schemas.openxmlformats.org/drawingml/2006/chart" xmlns:dgm="http://schemas.openxmlformats.org/drawingml/2006/diagram" xmlns:o="urn:schemas-microsoft-com:office:office" xmlns:v="urn:schemas-microsoft-com:vml" xmlns:pvml="urn:schemas-microsoft-com:office:powerpoint" xmlns:com="http://schemas.openxmlformats.org/drawingml/2006/compatibility" xmlns:p14="http://schemas.microsoft.com/office/powerpoint/2010/main" xmlns:p15="http://schemas.microsoft.com/office/powerpoint/2012/main">
+<p:sldMaster xmlns:a="http://schemas.openxmlformats.org/drawingml/2006/main" xmlns:r="http://schemas.openxmlformats.org/officeDocument/2006/relationships" xmlns:p="http://schemas.openxmlformats.org/presentationml/2006/main">
   <p:cSld name="marina">
     <p:bg>
       <p:bgPr>
         <a:solidFill>
           <a:schemeClr val="lt1"/>
         </a:solidFill>
+        <a:effectLst/>
       </p:bgPr>
     </p:bg>
     <p:spTree>
       <p:nvGrpSpPr>
-        <p:cNvPr id="5" name="Shape 5"/>
+        <p:cNvPr id="1" name="Shape 5"/>
         <p:cNvGrpSpPr/>
         <p:nvPr/>
       </p:nvGrpSpPr>
@@ -4099,7 +4407,9 @@
       <p:sp>
         <p:nvSpPr>
           <p:cNvPr id="6" name="Shape 6"/>
-          <p:cNvSpPr txBox="1"/>
+          <p:cNvSpPr txBox="1">
+            <a:spLocks noGrp="1"/>
+          </p:cNvSpPr>
           <p:nvPr>
             <p:ph type="title"/>
           </p:nvPr>
@@ -4118,7 +4428,7 @@
           </a:ln>
         </p:spPr>
         <p:txBody>
-          <a:bodyPr anchorCtr="0" anchor="b" bIns="91425" lIns="91425" rIns="91425" wrap="square" tIns="91425"/>
+          <a:bodyPr wrap="square" lIns="91425" tIns="91425" rIns="91425" bIns="91425" anchor="b" anchorCtr="0"/>
           <a:lstStyle>
             <a:lvl1pPr lvl="0">
               <a:spcBef>
@@ -4301,15 +4611,19 @@
               </a:defRPr>
             </a:lvl9pPr>
           </a:lstStyle>
-          <a:p/>
+          <a:p>
+            <a:endParaRPr/>
+          </a:p>
         </p:txBody>
       </p:sp>
       <p:sp>
         <p:nvSpPr>
           <p:cNvPr id="7" name="Shape 7"/>
-          <p:cNvSpPr txBox="1"/>
+          <p:cNvSpPr txBox="1">
+            <a:spLocks noGrp="1"/>
+          </p:cNvSpPr>
           <p:nvPr>
-            <p:ph idx="1" type="body"/>
+            <p:ph type="body" idx="1"/>
           </p:nvPr>
         </p:nvSpPr>
         <p:spPr>
@@ -4326,7 +4640,7 @@
           </a:ln>
         </p:spPr>
         <p:txBody>
-          <a:bodyPr anchorCtr="0" anchor="t" bIns="91425" lIns="91425" rIns="91425" wrap="square" tIns="91425"/>
+          <a:bodyPr wrap="square" lIns="91425" tIns="91425" rIns="91425" bIns="91425" anchor="t" anchorCtr="0"/>
           <a:lstStyle>
             <a:lvl1pPr lvl="0">
               <a:lnSpc>
@@ -4555,15 +4869,19 @@
               </a:defRPr>
             </a:lvl9pPr>
           </a:lstStyle>
-          <a:p/>
+          <a:p>
+            <a:endParaRPr/>
+          </a:p>
         </p:txBody>
       </p:sp>
       <p:sp>
         <p:nvSpPr>
           <p:cNvPr id="8" name="Shape 8"/>
-          <p:cNvSpPr txBox="1"/>
+          <p:cNvSpPr txBox="1">
+            <a:spLocks noGrp="1"/>
+          </p:cNvSpPr>
           <p:nvPr>
-            <p:ph idx="12" type="sldNum"/>
+            <p:ph type="sldNum" idx="12"/>
           </p:nvPr>
         </p:nvSpPr>
         <p:spPr>
@@ -4580,7 +4898,7 @@
           </a:ln>
         </p:spPr>
         <p:txBody>
-          <a:bodyPr anchorCtr="0" anchor="ctr" bIns="91425" lIns="91425" rIns="91425" wrap="square" tIns="91425">
+          <a:bodyPr wrap="square" lIns="91425" tIns="91425" rIns="91425" bIns="91425" anchor="ctr" anchorCtr="0">
             <a:noAutofit/>
           </a:bodyPr>
           <a:lstStyle/>
@@ -4603,12 +4921,21 @@
               </a:rPr>
               <a:t>‹#›</a:t>
             </a:fld>
+            <a:endParaRPr lang="en" sz="1000">
+              <a:solidFill>
+                <a:schemeClr val="dk1"/>
+              </a:solidFill>
+              <a:latin typeface="Roboto"/>
+              <a:ea typeface="Roboto"/>
+              <a:cs typeface="Roboto"/>
+              <a:sym typeface="Roboto"/>
+            </a:endParaRPr>
           </a:p>
         </p:txBody>
       </p:sp>
     </p:spTree>
   </p:cSld>
-  <p:clrMap accent1="accent1" accent2="accent2" accent3="accent3" accent4="accent4" accent5="accent5" accent6="accent6" bg1="lt1" bg2="dk2" tx1="dk1" tx2="lt2" folHlink="folHlink" hlink="hlink"/>
+  <p:clrMap bg1="lt1" tx1="dk1" bg2="dk2" tx2="lt2" accent1="accent1" accent2="accent2" accent3="accent3" accent4="accent4" accent5="accent5" accent6="accent6" hlink="hlink" folHlink="folHlink"/>
   <p:sldLayoutIdLst>
     <p:sldLayoutId id="2147483648" r:id="rId1"/>
     <p:sldLayoutId id="2147483649" r:id="rId2"/>
@@ -4622,10 +4949,10 @@
     <p:sldLayoutId id="2147483657" r:id="rId10"/>
     <p:sldLayoutId id="2147483658" r:id="rId11"/>
   </p:sldLayoutIdLst>
-  <p:hf dt="0" ftr="0" hdr="0" sldNum="0"/>
+  <p:hf sldNum="0" hdr="0" ftr="0" dt="0"/>
   <p:txStyles>
     <p:titleStyle>
-      <a:defPPr lvl="0" marR="0" rtl="0" algn="l">
+      <a:defPPr marR="0" lvl="0" algn="l" rtl="0">
         <a:lnSpc>
           <a:spcPct val="100000"/>
         </a:lnSpc>
@@ -4636,7 +4963,7 @@
           <a:spcPts val="0"/>
         </a:spcAft>
       </a:defPPr>
-      <a:lvl1pPr lvl="0" marR="0" rtl="0" algn="l">
+      <a:lvl1pPr marR="0" lvl="0" algn="l" rtl="0">
         <a:lnSpc>
           <a:spcPct val="100000"/>
         </a:lnSpc>
@@ -4647,7 +4974,7 @@
           <a:spcPts val="0"/>
         </a:spcAft>
         <a:buNone/>
-        <a:defRPr b="0" i="0" sz="1400" u="none" cap="none" strike="noStrike">
+        <a:defRPr sz="1400" b="0" i="0" u="none" strike="noStrike" cap="none">
           <a:solidFill>
             <a:srgbClr val="000000"/>
           </a:solidFill>
@@ -4659,7 +4986,7 @@
       </a:lvl1pPr>
     </p:titleStyle>
     <p:bodyStyle>
-      <a:defPPr lvl="0" marR="0" rtl="0" algn="l">
+      <a:defPPr marR="0" lvl="0" algn="l" rtl="0">
         <a:lnSpc>
           <a:spcPct val="100000"/>
         </a:lnSpc>
@@ -4670,7 +4997,7 @@
           <a:spcPts val="0"/>
         </a:spcAft>
       </a:defPPr>
-      <a:lvl1pPr lvl="0" marR="0" rtl="0" algn="l">
+      <a:lvl1pPr marR="0" lvl="0" algn="l" rtl="0">
         <a:lnSpc>
           <a:spcPct val="100000"/>
         </a:lnSpc>
@@ -4681,7 +5008,7 @@
           <a:spcPts val="0"/>
         </a:spcAft>
         <a:buNone/>
-        <a:defRPr b="0" i="0" sz="1400" u="none" cap="none" strike="noStrike">
+        <a:defRPr sz="1400" b="0" i="0" u="none" strike="noStrike" cap="none">
           <a:solidFill>
             <a:srgbClr val="000000"/>
           </a:solidFill>
@@ -4691,7 +5018,7 @@
           <a:sym typeface="Arial"/>
         </a:defRPr>
       </a:lvl1pPr>
-      <a:lvl2pPr lvl="1" marR="0" rtl="0" algn="l">
+      <a:lvl2pPr marR="0" lvl="1" algn="l" rtl="0">
         <a:lnSpc>
           <a:spcPct val="100000"/>
         </a:lnSpc>
@@ -4702,7 +5029,7 @@
           <a:spcPts val="0"/>
         </a:spcAft>
         <a:buNone/>
-        <a:defRPr b="0" i="0" sz="1400" u="none" cap="none" strike="noStrike">
+        <a:defRPr sz="1400" b="0" i="0" u="none" strike="noStrike" cap="none">
           <a:solidFill>
             <a:srgbClr val="000000"/>
           </a:solidFill>
@@ -4712,7 +5039,7 @@
           <a:sym typeface="Arial"/>
         </a:defRPr>
       </a:lvl2pPr>
-      <a:lvl3pPr lvl="2" marR="0" rtl="0" algn="l">
+      <a:lvl3pPr marR="0" lvl="2" algn="l" rtl="0">
         <a:lnSpc>
           <a:spcPct val="100000"/>
         </a:lnSpc>
@@ -4723,7 +5050,7 @@
           <a:spcPts val="0"/>
         </a:spcAft>
         <a:buNone/>
-        <a:defRPr b="0" i="0" sz="1400" u="none" cap="none" strike="noStrike">
+        <a:defRPr sz="1400" b="0" i="0" u="none" strike="noStrike" cap="none">
           <a:solidFill>
             <a:srgbClr val="000000"/>
           </a:solidFill>
@@ -4733,7 +5060,7 @@
           <a:sym typeface="Arial"/>
         </a:defRPr>
       </a:lvl3pPr>
-      <a:lvl4pPr lvl="3" marR="0" rtl="0" algn="l">
+      <a:lvl4pPr marR="0" lvl="3" algn="l" rtl="0">
         <a:lnSpc>
           <a:spcPct val="100000"/>
         </a:lnSpc>
@@ -4744,7 +5071,7 @@
           <a:spcPts val="0"/>
         </a:spcAft>
         <a:buNone/>
-        <a:defRPr b="0" i="0" sz="1400" u="none" cap="none" strike="noStrike">
+        <a:defRPr sz="1400" b="0" i="0" u="none" strike="noStrike" cap="none">
           <a:solidFill>
             <a:srgbClr val="000000"/>
           </a:solidFill>
@@ -4754,7 +5081,7 @@
           <a:sym typeface="Arial"/>
         </a:defRPr>
       </a:lvl4pPr>
-      <a:lvl5pPr lvl="4" marR="0" rtl="0" algn="l">
+      <a:lvl5pPr marR="0" lvl="4" algn="l" rtl="0">
         <a:lnSpc>
           <a:spcPct val="100000"/>
         </a:lnSpc>
@@ -4765,7 +5092,7 @@
           <a:spcPts val="0"/>
         </a:spcAft>
         <a:buNone/>
-        <a:defRPr b="0" i="0" sz="1400" u="none" cap="none" strike="noStrike">
+        <a:defRPr sz="1400" b="0" i="0" u="none" strike="noStrike" cap="none">
           <a:solidFill>
             <a:srgbClr val="000000"/>
           </a:solidFill>
@@ -4775,7 +5102,7 @@
           <a:sym typeface="Arial"/>
         </a:defRPr>
       </a:lvl5pPr>
-      <a:lvl6pPr lvl="5" marR="0" rtl="0" algn="l">
+      <a:lvl6pPr marR="0" lvl="5" algn="l" rtl="0">
         <a:lnSpc>
           <a:spcPct val="100000"/>
         </a:lnSpc>
@@ -4786,7 +5113,7 @@
           <a:spcPts val="0"/>
         </a:spcAft>
         <a:buNone/>
-        <a:defRPr b="0" i="0" sz="1400" u="none" cap="none" strike="noStrike">
+        <a:defRPr sz="1400" b="0" i="0" u="none" strike="noStrike" cap="none">
           <a:solidFill>
             <a:srgbClr val="000000"/>
           </a:solidFill>
@@ -4796,7 +5123,7 @@
           <a:sym typeface="Arial"/>
         </a:defRPr>
       </a:lvl6pPr>
-      <a:lvl7pPr lvl="6" marR="0" rtl="0" algn="l">
+      <a:lvl7pPr marR="0" lvl="6" algn="l" rtl="0">
         <a:lnSpc>
           <a:spcPct val="100000"/>
         </a:lnSpc>
@@ -4807,7 +5134,7 @@
           <a:spcPts val="0"/>
         </a:spcAft>
         <a:buNone/>
-        <a:defRPr b="0" i="0" sz="1400" u="none" cap="none" strike="noStrike">
+        <a:defRPr sz="1400" b="0" i="0" u="none" strike="noStrike" cap="none">
           <a:solidFill>
             <a:srgbClr val="000000"/>
           </a:solidFill>
@@ -4817,7 +5144,7 @@
           <a:sym typeface="Arial"/>
         </a:defRPr>
       </a:lvl7pPr>
-      <a:lvl8pPr lvl="7" marR="0" rtl="0" algn="l">
+      <a:lvl8pPr marR="0" lvl="7" algn="l" rtl="0">
         <a:lnSpc>
           <a:spcPct val="100000"/>
         </a:lnSpc>
@@ -4828,7 +5155,7 @@
           <a:spcPts val="0"/>
         </a:spcAft>
         <a:buNone/>
-        <a:defRPr b="0" i="0" sz="1400" u="none" cap="none" strike="noStrike">
+        <a:defRPr sz="1400" b="0" i="0" u="none" strike="noStrike" cap="none">
           <a:solidFill>
             <a:srgbClr val="000000"/>
           </a:solidFill>
@@ -4838,7 +5165,7 @@
           <a:sym typeface="Arial"/>
         </a:defRPr>
       </a:lvl8pPr>
-      <a:lvl9pPr lvl="8" marR="0" rtl="0" algn="l">
+      <a:lvl9pPr marR="0" lvl="8" algn="l" rtl="0">
         <a:lnSpc>
           <a:spcPct val="100000"/>
         </a:lnSpc>
@@ -4849,7 +5176,7 @@
           <a:spcPts val="0"/>
         </a:spcAft>
         <a:buNone/>
-        <a:defRPr b="0" i="0" sz="1400" u="none" cap="none" strike="noStrike">
+        <a:defRPr sz="1400" b="0" i="0" u="none" strike="noStrike" cap="none">
           <a:solidFill>
             <a:srgbClr val="000000"/>
           </a:solidFill>
@@ -4861,7 +5188,7 @@
       </a:lvl9pPr>
     </p:bodyStyle>
     <p:otherStyle>
-      <a:defPPr lvl="0" marR="0" rtl="0" algn="l">
+      <a:defPPr marR="0" lvl="0" algn="l" rtl="0">
         <a:lnSpc>
           <a:spcPct val="100000"/>
         </a:lnSpc>
@@ -4872,7 +5199,7 @@
           <a:spcPts val="0"/>
         </a:spcAft>
       </a:defPPr>
-      <a:lvl1pPr lvl="0" marR="0" rtl="0" algn="l">
+      <a:lvl1pPr marR="0" lvl="0" algn="l" rtl="0">
         <a:lnSpc>
           <a:spcPct val="100000"/>
         </a:lnSpc>
@@ -4883,7 +5210,7 @@
           <a:spcPts val="0"/>
         </a:spcAft>
         <a:buNone/>
-        <a:defRPr b="0" i="0" sz="1400" u="none" cap="none" strike="noStrike">
+        <a:defRPr sz="1400" b="0" i="0" u="none" strike="noStrike" cap="none">
           <a:solidFill>
             <a:srgbClr val="000000"/>
           </a:solidFill>
@@ -4893,7 +5220,7 @@
           <a:sym typeface="Arial"/>
         </a:defRPr>
       </a:lvl1pPr>
-      <a:lvl2pPr lvl="1" marR="0" rtl="0" algn="l">
+      <a:lvl2pPr marR="0" lvl="1" algn="l" rtl="0">
         <a:lnSpc>
           <a:spcPct val="100000"/>
         </a:lnSpc>
@@ -4904,7 +5231,7 @@
           <a:spcPts val="0"/>
         </a:spcAft>
         <a:buNone/>
-        <a:defRPr b="0" i="0" sz="1400" u="none" cap="none" strike="noStrike">
+        <a:defRPr sz="1400" b="0" i="0" u="none" strike="noStrike" cap="none">
           <a:solidFill>
             <a:srgbClr val="000000"/>
           </a:solidFill>
@@ -4914,7 +5241,7 @@
           <a:sym typeface="Arial"/>
         </a:defRPr>
       </a:lvl2pPr>
-      <a:lvl3pPr lvl="2" marR="0" rtl="0" algn="l">
+      <a:lvl3pPr marR="0" lvl="2" algn="l" rtl="0">
         <a:lnSpc>
           <a:spcPct val="100000"/>
         </a:lnSpc>
@@ -4925,7 +5252,7 @@
           <a:spcPts val="0"/>
         </a:spcAft>
         <a:buNone/>
-        <a:defRPr b="0" i="0" sz="1400" u="none" cap="none" strike="noStrike">
+        <a:defRPr sz="1400" b="0" i="0" u="none" strike="noStrike" cap="none">
           <a:solidFill>
             <a:srgbClr val="000000"/>
           </a:solidFill>
@@ -4935,7 +5262,7 @@
           <a:sym typeface="Arial"/>
         </a:defRPr>
       </a:lvl3pPr>
-      <a:lvl4pPr lvl="3" marR="0" rtl="0" algn="l">
+      <a:lvl4pPr marR="0" lvl="3" algn="l" rtl="0">
         <a:lnSpc>
           <a:spcPct val="100000"/>
         </a:lnSpc>
@@ -4946,7 +5273,7 @@
           <a:spcPts val="0"/>
         </a:spcAft>
         <a:buNone/>
-        <a:defRPr b="0" i="0" sz="1400" u="none" cap="none" strike="noStrike">
+        <a:defRPr sz="1400" b="0" i="0" u="none" strike="noStrike" cap="none">
           <a:solidFill>
             <a:srgbClr val="000000"/>
           </a:solidFill>
@@ -4956,7 +5283,7 @@
           <a:sym typeface="Arial"/>
         </a:defRPr>
       </a:lvl4pPr>
-      <a:lvl5pPr lvl="4" marR="0" rtl="0" algn="l">
+      <a:lvl5pPr marR="0" lvl="4" algn="l" rtl="0">
         <a:lnSpc>
           <a:spcPct val="100000"/>
         </a:lnSpc>
@@ -4967,7 +5294,7 @@
           <a:spcPts val="0"/>
         </a:spcAft>
         <a:buNone/>
-        <a:defRPr b="0" i="0" sz="1400" u="none" cap="none" strike="noStrike">
+        <a:defRPr sz="1400" b="0" i="0" u="none" strike="noStrike" cap="none">
           <a:solidFill>
             <a:srgbClr val="000000"/>
           </a:solidFill>
@@ -4977,7 +5304,7 @@
           <a:sym typeface="Arial"/>
         </a:defRPr>
       </a:lvl5pPr>
-      <a:lvl6pPr lvl="5" marR="0" rtl="0" algn="l">
+      <a:lvl6pPr marR="0" lvl="5" algn="l" rtl="0">
         <a:lnSpc>
           <a:spcPct val="100000"/>
         </a:lnSpc>
@@ -4988,7 +5315,7 @@
           <a:spcPts val="0"/>
         </a:spcAft>
         <a:buNone/>
-        <a:defRPr b="0" i="0" sz="1400" u="none" cap="none" strike="noStrike">
+        <a:defRPr sz="1400" b="0" i="0" u="none" strike="noStrike" cap="none">
           <a:solidFill>
             <a:srgbClr val="000000"/>
           </a:solidFill>
@@ -4998,7 +5325,7 @@
           <a:sym typeface="Arial"/>
         </a:defRPr>
       </a:lvl6pPr>
-      <a:lvl7pPr lvl="6" marR="0" rtl="0" algn="l">
+      <a:lvl7pPr marR="0" lvl="6" algn="l" rtl="0">
         <a:lnSpc>
           <a:spcPct val="100000"/>
         </a:lnSpc>
@@ -5009,7 +5336,7 @@
           <a:spcPts val="0"/>
         </a:spcAft>
         <a:buNone/>
-        <a:defRPr b="0" i="0" sz="1400" u="none" cap="none" strike="noStrike">
+        <a:defRPr sz="1400" b="0" i="0" u="none" strike="noStrike" cap="none">
           <a:solidFill>
             <a:srgbClr val="000000"/>
           </a:solidFill>
@@ -5019,7 +5346,7 @@
           <a:sym typeface="Arial"/>
         </a:defRPr>
       </a:lvl7pPr>
-      <a:lvl8pPr lvl="7" marR="0" rtl="0" algn="l">
+      <a:lvl8pPr marR="0" lvl="7" algn="l" rtl="0">
         <a:lnSpc>
           <a:spcPct val="100000"/>
         </a:lnSpc>
@@ -5030,7 +5357,7 @@
           <a:spcPts val="0"/>
         </a:spcAft>
         <a:buNone/>
-        <a:defRPr b="0" i="0" sz="1400" u="none" cap="none" strike="noStrike">
+        <a:defRPr sz="1400" b="0" i="0" u="none" strike="noStrike" cap="none">
           <a:solidFill>
             <a:srgbClr val="000000"/>
           </a:solidFill>
@@ -5040,7 +5367,7 @@
           <a:sym typeface="Arial"/>
         </a:defRPr>
       </a:lvl8pPr>
-      <a:lvl9pPr lvl="8" marR="0" rtl="0" algn="l">
+      <a:lvl9pPr marR="0" lvl="8" algn="l" rtl="0">
         <a:lnSpc>
           <a:spcPct val="100000"/>
         </a:lnSpc>
@@ -5051,7 +5378,7 @@
           <a:spcPts val="0"/>
         </a:spcAft>
         <a:buNone/>
-        <a:defRPr b="0" i="0" sz="1400" u="none" cap="none" strike="noStrike">
+        <a:defRPr sz="1400" b="0" i="0" u="none" strike="noStrike" cap="none">
           <a:solidFill>
             <a:srgbClr val="000000"/>
           </a:solidFill>
@@ -5067,11 +5394,11 @@
 </file>
 
 <file path=ppt/slides/slide1.xml><?xml version="1.0" encoding="utf-8"?>
-<p:sld xmlns:a="http://schemas.openxmlformats.org/drawingml/2006/main" xmlns:r="http://schemas.openxmlformats.org/officeDocument/2006/relationships" xmlns:mc="http://schemas.openxmlformats.org/markup-compatibility/2006" xmlns:mv="urn:schemas-microsoft-com:mac:vml" xmlns:p="http://schemas.openxmlformats.org/presentationml/2006/main" xmlns:c="http://schemas.openxmlformats.org/drawingml/2006/chart" xmlns:dgm="http://schemas.openxmlformats.org/drawingml/2006/diagram" xmlns:o="urn:schemas-microsoft-com:office:office" xmlns:v="urn:schemas-microsoft-com:vml" xmlns:pvml="urn:schemas-microsoft-com:office:powerpoint" xmlns:com="http://schemas.openxmlformats.org/drawingml/2006/compatibility" xmlns:p14="http://schemas.microsoft.com/office/powerpoint/2010/main" xmlns:p15="http://schemas.microsoft.com/office/powerpoint/2012/main">
+<p:sld xmlns:a="http://schemas.openxmlformats.org/drawingml/2006/main" xmlns:r="http://schemas.openxmlformats.org/officeDocument/2006/relationships" xmlns:p="http://schemas.openxmlformats.org/presentationml/2006/main">
   <p:cSld>
     <p:spTree>
       <p:nvGrpSpPr>
-        <p:cNvPr id="62" name="Shape 62"/>
+        <p:cNvPr id="1" name="Shape 62"/>
         <p:cNvGrpSpPr/>
         <p:nvPr/>
       </p:nvGrpSpPr>
@@ -5086,7 +5413,9 @@
       <p:sp>
         <p:nvSpPr>
           <p:cNvPr id="63" name="Shape 63"/>
-          <p:cNvSpPr txBox="1"/>
+          <p:cNvSpPr txBox="1">
+            <a:spLocks noGrp="1"/>
+          </p:cNvSpPr>
           <p:nvPr>
             <p:ph type="ctrTitle"/>
           </p:nvPr>
@@ -5101,7 +5430,7 @@
           </a:prstGeom>
         </p:spPr>
         <p:txBody>
-          <a:bodyPr anchorCtr="0" anchor="b" bIns="91425" lIns="91425" rIns="91425" wrap="square" tIns="91425">
+          <a:bodyPr wrap="square" lIns="91425" tIns="91425" rIns="91425" bIns="91425" anchor="b" anchorCtr="0">
             <a:noAutofit/>
           </a:bodyPr>
           <a:lstStyle/>
@@ -5122,9 +5451,11 @@
       <p:sp>
         <p:nvSpPr>
           <p:cNvPr id="64" name="Shape 64"/>
-          <p:cNvSpPr txBox="1"/>
+          <p:cNvSpPr txBox="1">
+            <a:spLocks noGrp="1"/>
+          </p:cNvSpPr>
           <p:nvPr>
-            <p:ph idx="1" type="subTitle"/>
+            <p:ph type="subTitle" idx="1"/>
           </p:nvPr>
         </p:nvSpPr>
         <p:spPr>
@@ -5137,7 +5468,7 @@
           </a:prstGeom>
         </p:spPr>
         <p:txBody>
-          <a:bodyPr anchorCtr="0" anchor="t" bIns="91425" lIns="91425" rIns="91425" wrap="square" tIns="91425">
+          <a:bodyPr wrap="square" lIns="91425" tIns="91425" rIns="91425" bIns="91425" anchor="t" anchorCtr="0">
             <a:noAutofit/>
           </a:bodyPr>
           <a:lstStyle/>
@@ -5164,11 +5495,11 @@
 </file>
 
 <file path=ppt/slides/slide2.xml><?xml version="1.0" encoding="utf-8"?>
-<p:sld xmlns:a="http://schemas.openxmlformats.org/drawingml/2006/main" xmlns:r="http://schemas.openxmlformats.org/officeDocument/2006/relationships" xmlns:mc="http://schemas.openxmlformats.org/markup-compatibility/2006" xmlns:mv="urn:schemas-microsoft-com:mac:vml" xmlns:p="http://schemas.openxmlformats.org/presentationml/2006/main" xmlns:c="http://schemas.openxmlformats.org/drawingml/2006/chart" xmlns:dgm="http://schemas.openxmlformats.org/drawingml/2006/diagram" xmlns:o="urn:schemas-microsoft-com:office:office" xmlns:v="urn:schemas-microsoft-com:vml" xmlns:pvml="urn:schemas-microsoft-com:office:powerpoint" xmlns:com="http://schemas.openxmlformats.org/drawingml/2006/compatibility" xmlns:p14="http://schemas.microsoft.com/office/powerpoint/2010/main" xmlns:p15="http://schemas.microsoft.com/office/powerpoint/2012/main">
+<p:sld xmlns:a="http://schemas.openxmlformats.org/drawingml/2006/main" xmlns:r="http://schemas.openxmlformats.org/officeDocument/2006/relationships" xmlns:p="http://schemas.openxmlformats.org/presentationml/2006/main">
   <p:cSld>
     <p:spTree>
       <p:nvGrpSpPr>
-        <p:cNvPr id="68" name="Shape 68"/>
+        <p:cNvPr id="1" name="Shape 68"/>
         <p:cNvGrpSpPr/>
         <p:nvPr/>
       </p:nvGrpSpPr>
@@ -5183,7 +5514,9 @@
       <p:sp>
         <p:nvSpPr>
           <p:cNvPr id="69" name="Shape 69"/>
-          <p:cNvSpPr txBox="1"/>
+          <p:cNvSpPr txBox="1">
+            <a:spLocks noGrp="1"/>
+          </p:cNvSpPr>
           <p:nvPr>
             <p:ph type="title"/>
           </p:nvPr>
@@ -5198,7 +5531,7 @@
           </a:prstGeom>
         </p:spPr>
         <p:txBody>
-          <a:bodyPr anchorCtr="0" anchor="b" bIns="91425" lIns="91425" rIns="91425" wrap="square" tIns="91425">
+          <a:bodyPr wrap="square" lIns="91425" tIns="91425" rIns="91425" bIns="91425" anchor="b" anchorCtr="0">
             <a:noAutofit/>
           </a:bodyPr>
           <a:lstStyle/>
@@ -5219,9 +5552,11 @@
       <p:sp>
         <p:nvSpPr>
           <p:cNvPr id="70" name="Shape 70"/>
-          <p:cNvSpPr txBox="1"/>
+          <p:cNvSpPr txBox="1">
+            <a:spLocks noGrp="1"/>
+          </p:cNvSpPr>
           <p:nvPr>
-            <p:ph idx="1" type="body"/>
+            <p:ph type="body" idx="1"/>
           </p:nvPr>
         </p:nvSpPr>
         <p:spPr>
@@ -5234,7 +5569,7 @@
           </a:prstGeom>
         </p:spPr>
         <p:txBody>
-          <a:bodyPr anchorCtr="0" anchor="t" bIns="91425" lIns="91425" rIns="91425" wrap="square" tIns="91425">
+          <a:bodyPr wrap="square" lIns="91425" tIns="91425" rIns="91425" bIns="91425" anchor="t" anchorCtr="0">
             <a:noAutofit/>
           </a:bodyPr>
           <a:lstStyle/>
@@ -5267,23 +5602,7 @@
                   <a:schemeClr val="dk1"/>
                 </a:solidFill>
               </a:rPr>
-              <a:t>Usage:	</a:t>
-            </a:r>
-            <a:r>
-              <a:rPr lang="en">
-                <a:solidFill>
-                  <a:schemeClr val="dk1"/>
-                </a:solidFill>
-              </a:rPr>
-              <a:t>Prediction for quantitative trading </a:t>
-            </a:r>
-            <a:r>
-              <a:rPr lang="en">
-                <a:solidFill>
-                  <a:schemeClr val="dk1"/>
-                </a:solidFill>
-              </a:rPr>
-              <a:t>and high frequency trading strategy</a:t>
+              <a:t>Usage:	Prediction for quantitative trading and high frequency trading strategy</a:t>
             </a:r>
           </a:p>
           <a:p>
@@ -5299,16 +5618,8 @@
                   <a:schemeClr val="dk1"/>
                 </a:solidFill>
               </a:rPr>
-              <a:t>	E</a:t>
+              <a:t>	Eg.: Given a stock and a particular timeframe, predict the following trend price and its possibility based on time scale (per day). Results will show as a line chart with values like open price, close price, low/high, trading volume</a:t>
             </a:r>
-            <a:r>
-              <a:rPr lang="en">
-                <a:solidFill>
-                  <a:schemeClr val="dk1"/>
-                </a:solidFill>
-              </a:rPr>
-              <a:t>g.: Given a stock and a particular timeframe, predict the following trend price and its possibility based on time scale (per day). Results will show as a line chart with values like open price, close price, low/high, trading volume</a:t>
-            </a:r>
           </a:p>
           <a:p>
             <a:pPr lvl="0" rtl="0">
@@ -5317,9 +5628,6 @@
               </a:spcBef>
               <a:buNone/>
             </a:pPr>
-            <a:r>
-              <a:t/>
-            </a:r>
             <a:endParaRPr>
               <a:solidFill>
                 <a:schemeClr val="dk1"/>
@@ -5333,9 +5641,6 @@
               </a:spcBef>
               <a:buNone/>
             </a:pPr>
-            <a:r>
-              <a:t/>
-            </a:r>
             <a:endParaRPr>
               <a:solidFill>
                 <a:schemeClr val="dk1"/>
@@ -5353,11 +5658,11 @@
 </file>
 
 <file path=ppt/slides/slide3.xml><?xml version="1.0" encoding="utf-8"?>
-<p:sld xmlns:a="http://schemas.openxmlformats.org/drawingml/2006/main" xmlns:r="http://schemas.openxmlformats.org/officeDocument/2006/relationships" xmlns:mc="http://schemas.openxmlformats.org/markup-compatibility/2006" xmlns:mv="urn:schemas-microsoft-com:mac:vml" xmlns:p="http://schemas.openxmlformats.org/presentationml/2006/main" xmlns:c="http://schemas.openxmlformats.org/drawingml/2006/chart" xmlns:dgm="http://schemas.openxmlformats.org/drawingml/2006/diagram" xmlns:o="urn:schemas-microsoft-com:office:office" xmlns:v="urn:schemas-microsoft-com:vml" xmlns:pvml="urn:schemas-microsoft-com:office:powerpoint" xmlns:com="http://schemas.openxmlformats.org/drawingml/2006/compatibility" xmlns:p14="http://schemas.microsoft.com/office/powerpoint/2010/main" xmlns:p15="http://schemas.microsoft.com/office/powerpoint/2012/main">
+<p:sld xmlns:a="http://schemas.openxmlformats.org/drawingml/2006/main" xmlns:r="http://schemas.openxmlformats.org/officeDocument/2006/relationships" xmlns:p="http://schemas.openxmlformats.org/presentationml/2006/main">
   <p:cSld>
     <p:spTree>
       <p:nvGrpSpPr>
-        <p:cNvPr id="74" name="Shape 74"/>
+        <p:cNvPr id="1" name="Shape 74"/>
         <p:cNvGrpSpPr/>
         <p:nvPr/>
       </p:nvGrpSpPr>
@@ -5372,7 +5677,9 @@
       <p:sp>
         <p:nvSpPr>
           <p:cNvPr id="75" name="Shape 75"/>
-          <p:cNvSpPr txBox="1"/>
+          <p:cNvSpPr txBox="1">
+            <a:spLocks noGrp="1"/>
+          </p:cNvSpPr>
           <p:nvPr>
             <p:ph type="title"/>
           </p:nvPr>
@@ -5387,7 +5694,7 @@
           </a:prstGeom>
         </p:spPr>
         <p:txBody>
-          <a:bodyPr anchorCtr="0" anchor="b" bIns="91425" lIns="91425" rIns="91425" wrap="square" tIns="91425">
+          <a:bodyPr wrap="square" lIns="91425" tIns="91425" rIns="91425" bIns="91425" anchor="b" anchorCtr="0">
             <a:noAutofit/>
           </a:bodyPr>
           <a:lstStyle/>
@@ -5399,7 +5706,7 @@
               <a:buNone/>
             </a:pPr>
             <a:r>
-              <a:rPr lang="en"/>
+              <a:rPr lang="en" dirty="0"/>
               <a:t>Methodology</a:t>
             </a:r>
           </a:p>
@@ -5408,9 +5715,11 @@
       <p:sp>
         <p:nvSpPr>
           <p:cNvPr id="76" name="Shape 76"/>
-          <p:cNvSpPr txBox="1"/>
+          <p:cNvSpPr txBox="1">
+            <a:spLocks noGrp="1"/>
+          </p:cNvSpPr>
           <p:nvPr>
-            <p:ph idx="1" type="body"/>
+            <p:ph type="body" idx="1"/>
           </p:nvPr>
         </p:nvSpPr>
         <p:spPr>
@@ -5423,14 +5732,14 @@
           </a:prstGeom>
         </p:spPr>
         <p:txBody>
-          <a:bodyPr anchorCtr="0" anchor="t" bIns="91425" lIns="91425" rIns="91425" wrap="square" tIns="91425">
+          <a:bodyPr wrap="square" lIns="91425" tIns="91425" rIns="91425" bIns="91425" anchor="t" anchorCtr="0">
             <a:noAutofit/>
           </a:bodyPr>
           <a:lstStyle/>
           <a:p>
-            <a:pPr indent="-342900" lvl="0" marL="457200" rtl="0">
-              <a:spcBef>
-                <a:spcPts val="0"/>
+            <a:pPr marL="457200" lvl="0" indent="-342900" rtl="0">
+              <a:spcBef>
+                <a:spcPts val="1200"/>
               </a:spcBef>
               <a:spcAft>
                 <a:spcPts val="0"/>
@@ -5441,26 +5750,18 @@
               <a:buAutoNum type="arabicPeriod"/>
             </a:pPr>
             <a:r>
-              <a:rPr lang="en">
+              <a:rPr lang="en" dirty="0">
                 <a:solidFill>
                   <a:schemeClr val="dk1"/>
                 </a:solidFill>
               </a:rPr>
-              <a:t>Focus on some main factors that will influence the price and get </a:t>
+              <a:t>Focus on some main factors that will influence the price and get relevant dataset. (Market Price, Ask, Bid, Market Cap, PE Ratio, EPS, Volume and historical Financial Statement)</a:t>
             </a:r>
-            <a:r>
-              <a:rPr lang="en">
-                <a:solidFill>
-                  <a:schemeClr val="dk1"/>
-                </a:solidFill>
-              </a:rPr>
-              <a:t>relevant dataset. (Market Price, Ask, Bid, Market Cap, PE Ratio, EPS, Volume and historical Financial Statement)</a:t>
-            </a:r>
-          </a:p>
-          <a:p>
-            <a:pPr indent="-342900" lvl="0" marL="457200" rtl="0">
-              <a:spcBef>
-                <a:spcPts val="0"/>
+          </a:p>
+          <a:p>
+            <a:pPr marL="457200" lvl="0" indent="-342900" rtl="0">
+              <a:spcBef>
+                <a:spcPts val="1200"/>
               </a:spcBef>
               <a:spcAft>
                 <a:spcPts val="0"/>
@@ -5471,19 +5772,19 @@
               <a:buAutoNum type="arabicPeriod"/>
             </a:pPr>
             <a:r>
-              <a:rPr lang="en"/>
+              <a:rPr lang="en" dirty="0"/>
               <a:t>Train the data science models and pick the best one based on performance</a:t>
             </a:r>
           </a:p>
           <a:p>
-            <a:pPr indent="-342900" lvl="0" marL="457200">
-              <a:spcBef>
-                <a:spcPts val="0"/>
+            <a:pPr marL="457200" lvl="0" indent="-342900">
+              <a:spcBef>
+                <a:spcPts val="1200"/>
               </a:spcBef>
               <a:buAutoNum type="arabicPeriod"/>
             </a:pPr>
             <a:r>
-              <a:rPr lang="en"/>
+              <a:rPr lang="en" dirty="0"/>
               <a:t>Visualization using Zeppelin</a:t>
             </a:r>
           </a:p>
@@ -5498,11 +5799,11 @@
 </file>
 
 <file path=ppt/slides/slide4.xml><?xml version="1.0" encoding="utf-8"?>
-<p:sld xmlns:a="http://schemas.openxmlformats.org/drawingml/2006/main" xmlns:r="http://schemas.openxmlformats.org/officeDocument/2006/relationships" xmlns:mc="http://schemas.openxmlformats.org/markup-compatibility/2006" xmlns:mv="urn:schemas-microsoft-com:mac:vml" xmlns:p="http://schemas.openxmlformats.org/presentationml/2006/main" xmlns:c="http://schemas.openxmlformats.org/drawingml/2006/chart" xmlns:dgm="http://schemas.openxmlformats.org/drawingml/2006/diagram" xmlns:o="urn:schemas-microsoft-com:office:office" xmlns:v="urn:schemas-microsoft-com:vml" xmlns:pvml="urn:schemas-microsoft-com:office:powerpoint" xmlns:com="http://schemas.openxmlformats.org/drawingml/2006/compatibility" xmlns:p14="http://schemas.microsoft.com/office/powerpoint/2010/main" xmlns:p15="http://schemas.microsoft.com/office/powerpoint/2012/main">
+<p:sld xmlns:a="http://schemas.openxmlformats.org/drawingml/2006/main" xmlns:r="http://schemas.openxmlformats.org/officeDocument/2006/relationships" xmlns:p="http://schemas.openxmlformats.org/presentationml/2006/main">
   <p:cSld>
     <p:spTree>
       <p:nvGrpSpPr>
-        <p:cNvPr id="80" name="Shape 80"/>
+        <p:cNvPr id="1" name="Shape 80"/>
         <p:cNvGrpSpPr/>
         <p:nvPr/>
       </p:nvGrpSpPr>
@@ -5517,7 +5818,9 @@
       <p:sp>
         <p:nvSpPr>
           <p:cNvPr id="81" name="Shape 81"/>
-          <p:cNvSpPr txBox="1"/>
+          <p:cNvSpPr txBox="1">
+            <a:spLocks noGrp="1"/>
+          </p:cNvSpPr>
           <p:nvPr>
             <p:ph type="title"/>
           </p:nvPr>
@@ -5532,7 +5835,7 @@
           </a:prstGeom>
         </p:spPr>
         <p:txBody>
-          <a:bodyPr anchorCtr="0" anchor="b" bIns="91425" lIns="91425" rIns="91425" wrap="square" tIns="91425">
+          <a:bodyPr wrap="square" lIns="91425" tIns="91425" rIns="91425" bIns="91425" anchor="b" anchorCtr="0">
             <a:noAutofit/>
           </a:bodyPr>
           <a:lstStyle/>
@@ -5553,9 +5856,11 @@
       <p:sp>
         <p:nvSpPr>
           <p:cNvPr id="82" name="Shape 82"/>
-          <p:cNvSpPr txBox="1"/>
+          <p:cNvSpPr txBox="1">
+            <a:spLocks noGrp="1"/>
+          </p:cNvSpPr>
           <p:nvPr>
-            <p:ph idx="1" type="body"/>
+            <p:ph type="body" idx="1"/>
           </p:nvPr>
         </p:nvSpPr>
         <p:spPr>
@@ -5568,12 +5873,12 @@
           </a:prstGeom>
         </p:spPr>
         <p:txBody>
-          <a:bodyPr anchorCtr="0" anchor="t" bIns="91425" lIns="91425" rIns="91425" wrap="square" tIns="91425">
+          <a:bodyPr wrap="square" lIns="91425" tIns="91425" rIns="91425" bIns="91425" anchor="t" anchorCtr="0">
             <a:noAutofit/>
           </a:bodyPr>
           <a:lstStyle/>
           <a:p>
-            <a:pPr indent="-342900" lvl="0" marL="457200" rtl="0">
+            <a:pPr marL="457200" lvl="0" indent="-342900" rtl="0">
               <a:lnSpc>
                 <a:spcPct val="115000"/>
               </a:lnSpc>
@@ -5594,7 +5899,7 @@
               <a:t>New York Stock Exchange S&amp;P 500 Companies historical prices with fundamental data:</a:t>
             </a:r>
             <a:r>
-              <a:rPr i="1" lang="en">
+              <a:rPr lang="en" i="1">
                 <a:solidFill>
                   <a:schemeClr val="dk1"/>
                 </a:solidFill>
@@ -5603,7 +5908,7 @@
             </a:r>
           </a:p>
           <a:p>
-            <a:pPr indent="457200" lvl="0" rtl="0">
+            <a:pPr lvl="0" indent="457200" rtl="0">
               <a:lnSpc>
                 <a:spcPct val="115000"/>
               </a:lnSpc>
@@ -5613,7 +5918,7 @@
               <a:buNone/>
             </a:pPr>
             <a:r>
-              <a:rPr i="1" lang="en">
+              <a:rPr lang="en" i="1">
                 <a:solidFill>
                   <a:schemeClr val="hlink"/>
                 </a:solidFill>
@@ -5623,7 +5928,7 @@
             </a:r>
           </a:p>
           <a:p>
-            <a:pPr indent="-342900" lvl="0" marL="457200" rtl="0">
+            <a:pPr marL="457200" lvl="0" indent="-342900" rtl="0">
               <a:lnSpc>
                 <a:spcPct val="115000"/>
               </a:lnSpc>
@@ -5645,7 +5950,7 @@
             </a:r>
           </a:p>
           <a:p>
-            <a:pPr indent="457200" lvl="0">
+            <a:pPr lvl="0" indent="457200">
               <a:lnSpc>
                 <a:spcPct val="115000"/>
               </a:lnSpc>
@@ -5655,7 +5960,7 @@
               <a:buNone/>
             </a:pPr>
             <a:r>
-              <a:rPr i="1" lang="en">
+              <a:rPr lang="en" i="1">
                 <a:solidFill>
                   <a:srgbClr val="4285F4"/>
                 </a:solidFill>
@@ -5674,11 +5979,11 @@
 </file>
 
 <file path=ppt/slides/slide5.xml><?xml version="1.0" encoding="utf-8"?>
-<p:sld xmlns:a="http://schemas.openxmlformats.org/drawingml/2006/main" xmlns:r="http://schemas.openxmlformats.org/officeDocument/2006/relationships" xmlns:mc="http://schemas.openxmlformats.org/markup-compatibility/2006" xmlns:mv="urn:schemas-microsoft-com:mac:vml" xmlns:p="http://schemas.openxmlformats.org/presentationml/2006/main" xmlns:c="http://schemas.openxmlformats.org/drawingml/2006/chart" xmlns:dgm="http://schemas.openxmlformats.org/drawingml/2006/diagram" xmlns:o="urn:schemas-microsoft-com:office:office" xmlns:v="urn:schemas-microsoft-com:vml" xmlns:pvml="urn:schemas-microsoft-com:office:powerpoint" xmlns:com="http://schemas.openxmlformats.org/drawingml/2006/compatibility" xmlns:p14="http://schemas.microsoft.com/office/powerpoint/2010/main" xmlns:p15="http://schemas.microsoft.com/office/powerpoint/2012/main">
+<p:sld xmlns:a="http://schemas.openxmlformats.org/drawingml/2006/main" xmlns:r="http://schemas.openxmlformats.org/officeDocument/2006/relationships" xmlns:p="http://schemas.openxmlformats.org/presentationml/2006/main">
   <p:cSld>
     <p:spTree>
       <p:nvGrpSpPr>
-        <p:cNvPr id="86" name="Shape 86"/>
+        <p:cNvPr id="1" name="Shape 86"/>
         <p:cNvGrpSpPr/>
         <p:nvPr/>
       </p:nvGrpSpPr>
@@ -5693,7 +5998,9 @@
       <p:sp>
         <p:nvSpPr>
           <p:cNvPr id="87" name="Shape 87"/>
-          <p:cNvSpPr txBox="1"/>
+          <p:cNvSpPr txBox="1">
+            <a:spLocks noGrp="1"/>
+          </p:cNvSpPr>
           <p:nvPr>
             <p:ph type="title"/>
           </p:nvPr>
@@ -5708,7 +6015,7 @@
           </a:prstGeom>
         </p:spPr>
         <p:txBody>
-          <a:bodyPr anchorCtr="0" anchor="b" bIns="91425" lIns="91425" rIns="91425" wrap="square" tIns="91425">
+          <a:bodyPr wrap="square" lIns="91425" tIns="91425" rIns="91425" bIns="91425" anchor="b" anchorCtr="0">
             <a:noAutofit/>
           </a:bodyPr>
           <a:lstStyle/>
@@ -5741,14 +6048,14 @@
             <a:avLst/>
           </a:prstGeom>
           <a:noFill/>
-          <a:ln cap="flat" cmpd="sng" w="38100">
+          <a:ln w="38100" cap="flat" cmpd="sng">
             <a:solidFill>
               <a:srgbClr val="FFF2CC"/>
             </a:solidFill>
             <a:prstDash val="solid"/>
             <a:round/>
-            <a:headEnd len="lg" w="lg" type="none"/>
-            <a:tailEnd len="lg" w="lg" type="triangle"/>
+            <a:headEnd type="none" w="lg" len="lg"/>
+            <a:tailEnd type="triangle" w="lg" len="lg"/>
           </a:ln>
         </p:spPr>
       </p:cxnSp>
@@ -5765,26 +6072,26 @@
           </a:xfrm>
           <a:prstGeom prst="wedgeRoundRectCallout">
             <a:avLst>
-              <a:gd fmla="val -8798" name="adj1"/>
-              <a:gd fmla="val 81542" name="adj2"/>
-              <a:gd fmla="val 0" name="adj3"/>
+              <a:gd name="adj1" fmla="val -8798"/>
+              <a:gd name="adj2" fmla="val 81542"/>
+              <a:gd name="adj3" fmla="val 0"/>
             </a:avLst>
           </a:prstGeom>
           <a:solidFill>
             <a:srgbClr val="F3F3F3"/>
           </a:solidFill>
-          <a:ln cap="flat" cmpd="sng" w="9525">
+          <a:ln w="9525" cap="flat" cmpd="sng">
             <a:solidFill>
               <a:schemeClr val="dk2"/>
             </a:solidFill>
             <a:prstDash val="solid"/>
             <a:round/>
-            <a:headEnd len="med" w="med" type="none"/>
-            <a:tailEnd len="med" w="med" type="none"/>
+            <a:headEnd type="none" w="med" len="med"/>
+            <a:tailEnd type="none" w="med" len="med"/>
           </a:ln>
         </p:spPr>
         <p:txBody>
-          <a:bodyPr anchorCtr="0" anchor="ctr" bIns="91425" lIns="91425" rIns="91425" wrap="square" tIns="91425">
+          <a:bodyPr wrap="square" lIns="91425" tIns="91425" rIns="91425" bIns="91425" anchor="ctr" anchorCtr="0">
             <a:noAutofit/>
           </a:bodyPr>
           <a:lstStyle/>
@@ -5822,7 +6129,7 @@
           </a:ln>
         </p:spPr>
         <p:txBody>
-          <a:bodyPr anchorCtr="0" anchor="t" bIns="91425" lIns="91425" rIns="91425" wrap="square" tIns="91425">
+          <a:bodyPr wrap="square" lIns="91425" tIns="91425" rIns="91425" bIns="91425" anchor="t" anchorCtr="0">
             <a:noAutofit/>
           </a:bodyPr>
           <a:lstStyle/>
@@ -5864,7 +6171,7 @@
           </a:ln>
         </p:spPr>
         <p:txBody>
-          <a:bodyPr anchorCtr="0" anchor="t" bIns="91425" lIns="91425" rIns="91425" wrap="square" tIns="91425">
+          <a:bodyPr wrap="square" lIns="91425" tIns="91425" rIns="91425" bIns="91425" anchor="t" anchorCtr="0">
             <a:noAutofit/>
           </a:bodyPr>
           <a:lstStyle/>
@@ -5906,7 +6213,7 @@
           </a:ln>
         </p:spPr>
         <p:txBody>
-          <a:bodyPr anchorCtr="0" anchor="t" bIns="91425" lIns="91425" rIns="91425" wrap="square" tIns="91425">
+          <a:bodyPr wrap="square" lIns="91425" tIns="91425" rIns="91425" bIns="91425" anchor="t" anchorCtr="0">
             <a:noAutofit/>
           </a:bodyPr>
           <a:lstStyle/>
@@ -5948,7 +6255,7 @@
           </a:ln>
         </p:spPr>
         <p:txBody>
-          <a:bodyPr anchorCtr="0" anchor="t" bIns="91425" lIns="91425" rIns="91425" wrap="square" tIns="91425">
+          <a:bodyPr wrap="square" lIns="91425" tIns="91425" rIns="91425" bIns="91425" anchor="t" anchorCtr="0">
             <a:noAutofit/>
           </a:bodyPr>
           <a:lstStyle/>
@@ -5987,14 +6294,14 @@
             <a:avLst/>
           </a:prstGeom>
           <a:noFill/>
-          <a:ln cap="flat" cmpd="sng" w="9525">
+          <a:ln w="9525" cap="flat" cmpd="sng">
             <a:solidFill>
               <a:schemeClr val="dk2"/>
             </a:solidFill>
             <a:prstDash val="solid"/>
             <a:round/>
-            <a:headEnd len="lg" w="lg" type="none"/>
-            <a:tailEnd len="lg" w="lg" type="none"/>
+            <a:headEnd type="none" w="lg" len="lg"/>
+            <a:tailEnd type="none" w="lg" len="lg"/>
           </a:ln>
         </p:spPr>
       </p:cxnSp>
@@ -6011,26 +6318,26 @@
           </a:xfrm>
           <a:prstGeom prst="wedgeRoundRectCallout">
             <a:avLst>
-              <a:gd fmla="val -35237" name="adj1"/>
-              <a:gd fmla="val 83639" name="adj2"/>
-              <a:gd fmla="val 0" name="adj3"/>
+              <a:gd name="adj1" fmla="val -35237"/>
+              <a:gd name="adj2" fmla="val 83639"/>
+              <a:gd name="adj3" fmla="val 0"/>
             </a:avLst>
           </a:prstGeom>
           <a:solidFill>
             <a:srgbClr val="F3F3F3"/>
           </a:solidFill>
-          <a:ln cap="flat" cmpd="sng" w="9525">
+          <a:ln w="9525" cap="flat" cmpd="sng">
             <a:solidFill>
               <a:schemeClr val="dk2"/>
             </a:solidFill>
             <a:prstDash val="solid"/>
             <a:round/>
-            <a:headEnd len="med" w="med" type="none"/>
-            <a:tailEnd len="med" w="med" type="none"/>
+            <a:headEnd type="none" w="med" len="med"/>
+            <a:tailEnd type="none" w="med" len="med"/>
           </a:ln>
         </p:spPr>
         <p:txBody>
-          <a:bodyPr anchorCtr="0" anchor="ctr" bIns="91425" lIns="91425" rIns="91425" wrap="square" tIns="91425">
+          <a:bodyPr wrap="square" lIns="91425" tIns="91425" rIns="91425" bIns="91425" anchor="ctr" anchorCtr="0">
             <a:noAutofit/>
           </a:bodyPr>
           <a:lstStyle/>
@@ -6061,26 +6368,26 @@
           </a:xfrm>
           <a:prstGeom prst="wedgeRoundRectCallout">
             <a:avLst>
-              <a:gd fmla="val 24680" name="adj1"/>
-              <a:gd fmla="val -86639" name="adj2"/>
-              <a:gd fmla="val 0" name="adj3"/>
+              <a:gd name="adj1" fmla="val 24680"/>
+              <a:gd name="adj2" fmla="val -86639"/>
+              <a:gd name="adj3" fmla="val 0"/>
             </a:avLst>
           </a:prstGeom>
           <a:solidFill>
             <a:srgbClr val="F3F3F3"/>
           </a:solidFill>
-          <a:ln cap="flat" cmpd="sng" w="9525">
+          <a:ln w="9525" cap="flat" cmpd="sng">
             <a:solidFill>
               <a:schemeClr val="dk2"/>
             </a:solidFill>
             <a:prstDash val="solid"/>
             <a:round/>
-            <a:headEnd len="med" w="med" type="none"/>
-            <a:tailEnd len="med" w="med" type="none"/>
+            <a:headEnd type="none" w="med" len="med"/>
+            <a:tailEnd type="none" w="med" len="med"/>
           </a:ln>
         </p:spPr>
         <p:txBody>
-          <a:bodyPr anchorCtr="0" anchor="ctr" bIns="91425" lIns="91425" rIns="91425" wrap="square" tIns="91425">
+          <a:bodyPr wrap="square" lIns="91425" tIns="91425" rIns="91425" bIns="91425" anchor="ctr" anchorCtr="0">
             <a:noAutofit/>
           </a:bodyPr>
           <a:lstStyle/>
@@ -6111,26 +6418,26 @@
           </a:xfrm>
           <a:prstGeom prst="wedgeRoundRectCallout">
             <a:avLst>
-              <a:gd fmla="val 6267" name="adj1"/>
-              <a:gd fmla="val -87703" name="adj2"/>
-              <a:gd fmla="val 0" name="adj3"/>
+              <a:gd name="adj1" fmla="val 6267"/>
+              <a:gd name="adj2" fmla="val -87703"/>
+              <a:gd name="adj3" fmla="val 0"/>
             </a:avLst>
           </a:prstGeom>
           <a:solidFill>
             <a:srgbClr val="F3F3F3"/>
           </a:solidFill>
-          <a:ln cap="flat" cmpd="sng" w="9525">
+          <a:ln w="9525" cap="flat" cmpd="sng">
             <a:solidFill>
               <a:schemeClr val="dk2"/>
             </a:solidFill>
             <a:prstDash val="solid"/>
             <a:round/>
-            <a:headEnd len="med" w="med" type="none"/>
-            <a:tailEnd len="med" w="med" type="none"/>
+            <a:headEnd type="none" w="med" len="med"/>
+            <a:tailEnd type="none" w="med" len="med"/>
           </a:ln>
         </p:spPr>
         <p:txBody>
-          <a:bodyPr anchorCtr="0" anchor="ctr" bIns="91425" lIns="91425" rIns="91425" wrap="square" tIns="91425">
+          <a:bodyPr wrap="square" lIns="91425" tIns="91425" rIns="91425" bIns="91425" anchor="ctr" anchorCtr="0">
             <a:noAutofit/>
           </a:bodyPr>
           <a:lstStyle/>
@@ -6157,11 +6464,11 @@
 </file>
 
 <file path=ppt/slides/slide6.xml><?xml version="1.0" encoding="utf-8"?>
-<p:sld xmlns:a="http://schemas.openxmlformats.org/drawingml/2006/main" xmlns:r="http://schemas.openxmlformats.org/officeDocument/2006/relationships" xmlns:mc="http://schemas.openxmlformats.org/markup-compatibility/2006" xmlns:mv="urn:schemas-microsoft-com:mac:vml" xmlns:p="http://schemas.openxmlformats.org/presentationml/2006/main" xmlns:c="http://schemas.openxmlformats.org/drawingml/2006/chart" xmlns:dgm="http://schemas.openxmlformats.org/drawingml/2006/diagram" xmlns:o="urn:schemas-microsoft-com:office:office" xmlns:v="urn:schemas-microsoft-com:vml" xmlns:pvml="urn:schemas-microsoft-com:office:powerpoint" xmlns:com="http://schemas.openxmlformats.org/drawingml/2006/compatibility" xmlns:p14="http://schemas.microsoft.com/office/powerpoint/2010/main" xmlns:p15="http://schemas.microsoft.com/office/powerpoint/2012/main">
+<p:sld xmlns:a="http://schemas.openxmlformats.org/drawingml/2006/main" xmlns:r="http://schemas.openxmlformats.org/officeDocument/2006/relationships" xmlns:p="http://schemas.openxmlformats.org/presentationml/2006/main">
   <p:cSld>
     <p:spTree>
       <p:nvGrpSpPr>
-        <p:cNvPr id="101" name="Shape 101"/>
+        <p:cNvPr id="1" name="Shape 101"/>
         <p:cNvGrpSpPr/>
         <p:nvPr/>
       </p:nvGrpSpPr>
@@ -6176,7 +6483,9 @@
       <p:sp>
         <p:nvSpPr>
           <p:cNvPr id="102" name="Shape 102"/>
-          <p:cNvSpPr txBox="1"/>
+          <p:cNvSpPr txBox="1">
+            <a:spLocks noGrp="1"/>
+          </p:cNvSpPr>
           <p:nvPr>
             <p:ph type="title"/>
           </p:nvPr>
@@ -6191,12 +6500,12 @@
           </a:prstGeom>
         </p:spPr>
         <p:txBody>
-          <a:bodyPr anchorCtr="0" anchor="b" bIns="91425" lIns="91425" rIns="91425" wrap="square" tIns="91425">
+          <a:bodyPr wrap="square" lIns="91425" tIns="91425" rIns="91425" bIns="91425" anchor="b" anchorCtr="0">
             <a:noAutofit/>
           </a:bodyPr>
           <a:lstStyle/>
           <a:p>
-            <a:pPr indent="0" lvl="0" marL="0" marR="0" rtl="0" algn="l">
+            <a:pPr marL="0" marR="0" lvl="0" indent="0" algn="l" rtl="0">
               <a:lnSpc>
                 <a:spcPct val="100000"/>
               </a:lnSpc>
@@ -6218,9 +6527,11 @@
       <p:sp>
         <p:nvSpPr>
           <p:cNvPr id="103" name="Shape 103"/>
-          <p:cNvSpPr txBox="1"/>
+          <p:cNvSpPr txBox="1">
+            <a:spLocks noGrp="1"/>
+          </p:cNvSpPr>
           <p:nvPr>
-            <p:ph idx="1" type="body"/>
+            <p:ph type="body" idx="1"/>
           </p:nvPr>
         </p:nvSpPr>
         <p:spPr>
@@ -6233,7 +6544,7 @@
           </a:prstGeom>
         </p:spPr>
         <p:txBody>
-          <a:bodyPr anchorCtr="0" anchor="t" bIns="91425" lIns="91425" rIns="91425" wrap="square" tIns="91425">
+          <a:bodyPr wrap="square" lIns="91425" tIns="91425" rIns="91425" bIns="91425" anchor="t" anchorCtr="0">
             <a:noAutofit/>
           </a:bodyPr>
           <a:lstStyle/>
@@ -6250,7 +6561,7 @@
             </a:r>
           </a:p>
           <a:p>
-            <a:pPr indent="-342900" lvl="0" marL="457200" rtl="0">
+            <a:pPr marL="457200" lvl="0" indent="-342900" rtl="0">
               <a:spcBef>
                 <a:spcPts val="0"/>
               </a:spcBef>
@@ -6264,7 +6575,7 @@
             </a:r>
           </a:p>
           <a:p>
-            <a:pPr indent="-342900" lvl="0" marL="457200" rtl="0">
+            <a:pPr marL="457200" lvl="0" indent="-342900" rtl="0">
               <a:spcBef>
                 <a:spcPts val="0"/>
               </a:spcBef>
@@ -6278,7 +6589,7 @@
             </a:r>
           </a:p>
           <a:p>
-            <a:pPr indent="-342900" lvl="0" marL="457200" rtl="0">
+            <a:pPr marL="457200" lvl="0" indent="-342900" rtl="0">
               <a:spcBef>
                 <a:spcPts val="0"/>
               </a:spcBef>
@@ -6292,7 +6603,7 @@
             </a:r>
           </a:p>
           <a:p>
-            <a:pPr indent="-342900" lvl="0" marL="457200" rtl="0">
+            <a:pPr marL="457200" lvl="0" indent="-342900" rtl="0">
               <a:spcBef>
                 <a:spcPts val="0"/>
               </a:spcBef>
@@ -6306,7 +6617,7 @@
             </a:r>
           </a:p>
           <a:p>
-            <a:pPr indent="-342900" lvl="0" marL="457200" rtl="0">
+            <a:pPr marL="457200" lvl="0" indent="-342900" rtl="0">
               <a:spcBef>
                 <a:spcPts val="0"/>
               </a:spcBef>
@@ -6316,15 +6627,11 @@
             </a:pPr>
             <a:r>
               <a:rPr lang="en"/>
-              <a:t>Data </a:t>
+              <a:t>Data visualization</a:t>
             </a:r>
-            <a:r>
-              <a:rPr lang="en"/>
-              <a:t>visualization</a:t>
-            </a:r>
-          </a:p>
-          <a:p>
-            <a:pPr indent="-342900" lvl="0" marL="457200">
+          </a:p>
+          <a:p>
+            <a:pPr marL="457200" lvl="0" indent="-342900">
               <a:spcBef>
                 <a:spcPts val="0"/>
               </a:spcBef>
@@ -6366,9 +6673,6 @@
               </a:spcBef>
               <a:buNone/>
             </a:pPr>
-            <a:r>
-              <a:t/>
-            </a:r>
             <a:endParaRPr/>
           </a:p>
         </p:txBody>
@@ -6382,11 +6686,11 @@
 </file>
 
 <file path=ppt/slides/slide7.xml><?xml version="1.0" encoding="utf-8"?>
-<p:sld xmlns:a="http://schemas.openxmlformats.org/drawingml/2006/main" xmlns:r="http://schemas.openxmlformats.org/officeDocument/2006/relationships" xmlns:mc="http://schemas.openxmlformats.org/markup-compatibility/2006" xmlns:mv="urn:schemas-microsoft-com:mac:vml" xmlns:p="http://schemas.openxmlformats.org/presentationml/2006/main" xmlns:c="http://schemas.openxmlformats.org/drawingml/2006/chart" xmlns:dgm="http://schemas.openxmlformats.org/drawingml/2006/diagram" xmlns:o="urn:schemas-microsoft-com:office:office" xmlns:v="urn:schemas-microsoft-com:vml" xmlns:pvml="urn:schemas-microsoft-com:office:powerpoint" xmlns:com="http://schemas.openxmlformats.org/drawingml/2006/compatibility" xmlns:p14="http://schemas.microsoft.com/office/powerpoint/2010/main" xmlns:p15="http://schemas.microsoft.com/office/powerpoint/2012/main">
+<p:sld xmlns:a="http://schemas.openxmlformats.org/drawingml/2006/main" xmlns:r="http://schemas.openxmlformats.org/officeDocument/2006/relationships" xmlns:p="http://schemas.openxmlformats.org/presentationml/2006/main">
   <p:cSld>
     <p:spTree>
       <p:nvGrpSpPr>
-        <p:cNvPr id="107" name="Shape 107"/>
+        <p:cNvPr id="1" name="Shape 107"/>
         <p:cNvGrpSpPr/>
         <p:nvPr/>
       </p:nvGrpSpPr>
@@ -6401,9 +6705,11 @@
       <p:sp>
         <p:nvSpPr>
           <p:cNvPr id="108" name="Shape 108"/>
-          <p:cNvSpPr txBox="1"/>
+          <p:cNvSpPr txBox="1">
+            <a:spLocks noGrp="1"/>
+          </p:cNvSpPr>
           <p:nvPr>
-            <p:ph idx="1" type="body"/>
+            <p:ph type="body" idx="1"/>
           </p:nvPr>
         </p:nvSpPr>
         <p:spPr>
@@ -6416,14 +6722,14 @@
           </a:prstGeom>
         </p:spPr>
         <p:txBody>
-          <a:bodyPr anchorCtr="0" anchor="t" bIns="91425" lIns="91425" rIns="91425" wrap="square" tIns="91425">
+          <a:bodyPr wrap="square" lIns="91425" tIns="91425" rIns="91425" bIns="91425" anchor="t" anchorCtr="0">
             <a:noAutofit/>
           </a:bodyPr>
           <a:lstStyle/>
           <a:p>
-            <a:pPr indent="-342900" lvl="0" marL="457200" rtl="0">
-              <a:spcBef>
-                <a:spcPts val="0"/>
+            <a:pPr marL="457200" lvl="0" indent="-342900" rtl="0">
+              <a:spcBef>
+                <a:spcPts val="1200"/>
               </a:spcBef>
               <a:spcAft>
                 <a:spcPts val="0"/>
@@ -6434,30 +6740,30 @@
               <a:buChar char="●"/>
             </a:pPr>
             <a:r>
-              <a:rPr lang="en"/>
+              <a:rPr lang="en" dirty="0"/>
               <a:t>Accuracy of prediction model for price </a:t>
             </a:r>
             <a:r>
-              <a:rPr b="1" i="1" lang="en"/>
+              <a:rPr lang="en" b="1" i="1" dirty="0"/>
               <a:t>trend</a:t>
             </a:r>
             <a:r>
-              <a:rPr lang="en"/>
+              <a:rPr lang="en" dirty="0"/>
               <a:t> at </a:t>
             </a:r>
             <a:r>
-              <a:rPr b="1" i="1" lang="en"/>
+              <a:rPr lang="en" b="1" i="1" dirty="0"/>
               <a:t>least</a:t>
             </a:r>
             <a:r>
-              <a:rPr lang="en"/>
+              <a:rPr lang="en" dirty="0"/>
               <a:t> 65%.</a:t>
             </a:r>
           </a:p>
           <a:p>
-            <a:pPr indent="-342900" lvl="0" marL="457200" rtl="0">
-              <a:spcBef>
-                <a:spcPts val="0"/>
+            <a:pPr marL="457200" lvl="0" indent="-342900" rtl="0">
+              <a:spcBef>
+                <a:spcPts val="1200"/>
               </a:spcBef>
               <a:spcAft>
                 <a:spcPts val="0"/>
@@ -6465,30 +6771,30 @@
               <a:buChar char="●"/>
             </a:pPr>
             <a:r>
-              <a:rPr lang="en"/>
+              <a:rPr lang="en" dirty="0"/>
               <a:t>Difference of prediction model for price </a:t>
             </a:r>
             <a:r>
-              <a:rPr b="1" i="1" lang="en"/>
+              <a:rPr lang="en" b="1" i="1" dirty="0"/>
               <a:t>movement</a:t>
             </a:r>
             <a:r>
-              <a:rPr lang="en"/>
+              <a:rPr lang="en" dirty="0"/>
               <a:t> at </a:t>
             </a:r>
             <a:r>
-              <a:rPr b="1" i="1" lang="en"/>
+              <a:rPr lang="en" b="1" i="1" dirty="0"/>
               <a:t>most</a:t>
             </a:r>
             <a:r>
-              <a:rPr lang="en"/>
+              <a:rPr lang="en" dirty="0"/>
               <a:t> 20%.</a:t>
             </a:r>
           </a:p>
           <a:p>
-            <a:pPr indent="-342900" lvl="0" marL="457200" rtl="0">
-              <a:spcBef>
-                <a:spcPts val="0"/>
+            <a:pPr marL="457200" lvl="0" indent="-342900" rtl="0">
+              <a:spcBef>
+                <a:spcPts val="1200"/>
               </a:spcBef>
               <a:spcAft>
                 <a:spcPts val="0"/>
@@ -6496,19 +6802,24 @@
               <a:buChar char="●"/>
             </a:pPr>
             <a:r>
-              <a:rPr lang="en"/>
-              <a:t>Visualization the prediction result using Zepplin</a:t>
+              <a:rPr lang="en" dirty="0"/>
+              <a:t>Visualization the prediction result using </a:t>
             </a:r>
-          </a:p>
-          <a:p>
-            <a:pPr indent="-342900" lvl="0" marL="457200" rtl="0">
-              <a:spcBef>
-                <a:spcPts val="0"/>
+            <a:r>
+              <a:rPr lang="en" dirty="0" err="1"/>
+              <a:t>Zepplin</a:t>
+            </a:r>
+            <a:endParaRPr lang="en" dirty="0"/>
+          </a:p>
+          <a:p>
+            <a:pPr marL="457200" lvl="0" indent="-342900" rtl="0">
+              <a:spcBef>
+                <a:spcPts val="1200"/>
               </a:spcBef>
               <a:buChar char="●"/>
             </a:pPr>
             <a:r>
-              <a:rPr lang="en"/>
+              <a:rPr lang="en" dirty="0"/>
               <a:t>Provide prediction for individual stock based on user inputs</a:t>
             </a:r>
           </a:p>
@@ -6519,17 +6830,16 @@
               </a:spcBef>
               <a:buNone/>
             </a:pPr>
-            <a:r>
-              <a:t/>
-            </a:r>
-            <a:endParaRPr/>
+            <a:endParaRPr dirty="0"/>
           </a:p>
         </p:txBody>
       </p:sp>
       <p:sp>
         <p:nvSpPr>
           <p:cNvPr id="109" name="Shape 109"/>
-          <p:cNvSpPr txBox="1"/>
+          <p:cNvSpPr txBox="1">
+            <a:spLocks noGrp="1"/>
+          </p:cNvSpPr>
           <p:nvPr>
             <p:ph type="title"/>
           </p:nvPr>
@@ -6544,7 +6854,7 @@
           </a:prstGeom>
         </p:spPr>
         <p:txBody>
-          <a:bodyPr anchorCtr="0" anchor="b" bIns="91425" lIns="91425" rIns="91425" wrap="square" tIns="91425">
+          <a:bodyPr wrap="square" lIns="91425" tIns="91425" rIns="91425" bIns="91425" anchor="b" anchorCtr="0">
             <a:noAutofit/>
           </a:bodyPr>
           <a:lstStyle/>
@@ -6571,11 +6881,11 @@
 </file>
 
 <file path=ppt/slides/slide8.xml><?xml version="1.0" encoding="utf-8"?>
-<p:sld xmlns:a="http://schemas.openxmlformats.org/drawingml/2006/main" xmlns:r="http://schemas.openxmlformats.org/officeDocument/2006/relationships" xmlns:mc="http://schemas.openxmlformats.org/markup-compatibility/2006" xmlns:mv="urn:schemas-microsoft-com:mac:vml" xmlns:p="http://schemas.openxmlformats.org/presentationml/2006/main" xmlns:c="http://schemas.openxmlformats.org/drawingml/2006/chart" xmlns:dgm="http://schemas.openxmlformats.org/drawingml/2006/diagram" xmlns:o="urn:schemas-microsoft-com:office:office" xmlns:v="urn:schemas-microsoft-com:vml" xmlns:pvml="urn:schemas-microsoft-com:office:powerpoint" xmlns:com="http://schemas.openxmlformats.org/drawingml/2006/compatibility" xmlns:p14="http://schemas.microsoft.com/office/powerpoint/2010/main" xmlns:p15="http://schemas.microsoft.com/office/powerpoint/2012/main">
+<p:sld xmlns:a="http://schemas.openxmlformats.org/drawingml/2006/main" xmlns:r="http://schemas.openxmlformats.org/officeDocument/2006/relationships" xmlns:p="http://schemas.openxmlformats.org/presentationml/2006/main">
   <p:cSld>
     <p:spTree>
       <p:nvGrpSpPr>
-        <p:cNvPr id="113" name="Shape 113"/>
+        <p:cNvPr id="1" name="Shape 113"/>
         <p:cNvGrpSpPr/>
         <p:nvPr/>
       </p:nvGrpSpPr>
@@ -6590,7 +6900,9 @@
       <p:sp>
         <p:nvSpPr>
           <p:cNvPr id="114" name="Shape 114"/>
-          <p:cNvSpPr txBox="1"/>
+          <p:cNvSpPr txBox="1">
+            <a:spLocks noGrp="1"/>
+          </p:cNvSpPr>
           <p:nvPr>
             <p:ph type="title"/>
           </p:nvPr>
@@ -6605,7 +6917,7 @@
           </a:prstGeom>
         </p:spPr>
         <p:txBody>
-          <a:bodyPr anchorCtr="0" anchor="b" bIns="91425" lIns="91425" rIns="91425" wrap="square" tIns="91425">
+          <a:bodyPr wrap="square" lIns="91425" tIns="91425" rIns="91425" bIns="91425" anchor="b" anchorCtr="0">
             <a:noAutofit/>
           </a:bodyPr>
           <a:lstStyle/>
@@ -6626,9 +6938,11 @@
       <p:sp>
         <p:nvSpPr>
           <p:cNvPr id="115" name="Shape 115"/>
-          <p:cNvSpPr txBox="1"/>
+          <p:cNvSpPr txBox="1">
+            <a:spLocks noGrp="1"/>
+          </p:cNvSpPr>
           <p:nvPr>
-            <p:ph idx="1" type="body"/>
+            <p:ph type="body" idx="1"/>
           </p:nvPr>
         </p:nvSpPr>
         <p:spPr>
@@ -6641,12 +6955,12 @@
           </a:prstGeom>
         </p:spPr>
         <p:txBody>
-          <a:bodyPr anchorCtr="0" anchor="t" bIns="91425" lIns="91425" rIns="91425" wrap="square" tIns="91425">
+          <a:bodyPr wrap="square" lIns="91425" tIns="91425" rIns="91425" bIns="91425" anchor="t" anchorCtr="0">
             <a:noAutofit/>
           </a:bodyPr>
           <a:lstStyle/>
           <a:p>
-            <a:pPr indent="-355600" lvl="0" marL="457200" rtl="0">
+            <a:pPr marL="457200" lvl="0" indent="-355600" rtl="0">
               <a:spcBef>
                 <a:spcPts val="0"/>
               </a:spcBef>
@@ -6660,27 +6974,11 @@
             </a:pPr>
             <a:r>
               <a:rPr lang="en" sz="2000"/>
-              <a:t>Process historical stock </a:t>
+              <a:t>Process historical stock data sets to make meaningful analysis and predict stock price</a:t>
             </a:r>
-            <a:r>
-              <a:rPr lang="en" sz="2000"/>
-              <a:t>data sets</a:t>
-            </a:r>
-            <a:r>
-              <a:rPr lang="en" sz="2000"/>
-              <a:t> </a:t>
-            </a:r>
-            <a:r>
-              <a:rPr lang="en" sz="2000"/>
-              <a:t>to make</a:t>
-            </a:r>
-            <a:r>
-              <a:rPr lang="en" sz="2000"/>
-              <a:t> meaningful analysis and predict stock price</a:t>
-            </a:r>
-          </a:p>
-          <a:p>
-            <a:pPr indent="-355600" lvl="0" marL="457200" rtl="0">
+          </a:p>
+          <a:p>
+            <a:pPr marL="457200" lvl="0" indent="-355600" rtl="0">
               <a:spcBef>
                 <a:spcPts val="0"/>
               </a:spcBef>
@@ -6695,7 +6993,7 @@
             </a:r>
           </a:p>
           <a:p>
-            <a:pPr indent="-355600" lvl="0" marL="457200" rtl="0">
+            <a:pPr marL="457200" lvl="0" indent="-355600" rtl="0">
               <a:spcBef>
                 <a:spcPts val="0"/>
               </a:spcBef>
@@ -6706,23 +7004,11 @@
             </a:pPr>
             <a:r>
               <a:rPr lang="en" sz="2000"/>
-              <a:t>Design UI to allow </a:t>
+              <a:t>Design UI to allow interact with users and represent result using charts</a:t>
             </a:r>
-            <a:r>
-              <a:rPr lang="en" sz="2000"/>
-              <a:t>interact</a:t>
-            </a:r>
-            <a:r>
-              <a:rPr lang="en" sz="2000"/>
-              <a:t> with users and r</a:t>
-            </a:r>
-            <a:r>
-              <a:rPr lang="en" sz="2000"/>
-              <a:t>epresent result using charts</a:t>
-            </a:r>
-          </a:p>
-          <a:p>
-            <a:pPr indent="-355600" lvl="0" marL="457200">
+          </a:p>
+          <a:p>
+            <a:pPr marL="457200" lvl="0" indent="-355600">
               <a:spcBef>
                 <a:spcPts val="0"/>
               </a:spcBef>
@@ -6744,11 +7030,11 @@
 </file>
 
 <file path=ppt/slides/slide9.xml><?xml version="1.0" encoding="utf-8"?>
-<p:sld xmlns:a="http://schemas.openxmlformats.org/drawingml/2006/main" xmlns:r="http://schemas.openxmlformats.org/officeDocument/2006/relationships" xmlns:mc="http://schemas.openxmlformats.org/markup-compatibility/2006" xmlns:mv="urn:schemas-microsoft-com:mac:vml" xmlns:p="http://schemas.openxmlformats.org/presentationml/2006/main" xmlns:c="http://schemas.openxmlformats.org/drawingml/2006/chart" xmlns:dgm="http://schemas.openxmlformats.org/drawingml/2006/diagram" xmlns:o="urn:schemas-microsoft-com:office:office" xmlns:v="urn:schemas-microsoft-com:vml" xmlns:pvml="urn:schemas-microsoft-com:office:powerpoint" xmlns:com="http://schemas.openxmlformats.org/drawingml/2006/compatibility" xmlns:p14="http://schemas.microsoft.com/office/powerpoint/2010/main" xmlns:p15="http://schemas.microsoft.com/office/powerpoint/2012/main">
+<p:sld xmlns:a="http://schemas.openxmlformats.org/drawingml/2006/main" xmlns:r="http://schemas.openxmlformats.org/officeDocument/2006/relationships" xmlns:p="http://schemas.openxmlformats.org/presentationml/2006/main">
   <p:cSld>
     <p:spTree>
       <p:nvGrpSpPr>
-        <p:cNvPr id="119" name="Shape 119"/>
+        <p:cNvPr id="1" name="Shape 119"/>
         <p:cNvGrpSpPr/>
         <p:nvPr/>
       </p:nvGrpSpPr>
@@ -6763,7 +7049,9 @@
       <p:sp>
         <p:nvSpPr>
           <p:cNvPr id="120" name="Shape 120"/>
-          <p:cNvSpPr txBox="1"/>
+          <p:cNvSpPr txBox="1">
+            <a:spLocks noGrp="1"/>
+          </p:cNvSpPr>
           <p:nvPr>
             <p:ph type="title"/>
           </p:nvPr>
@@ -6778,7 +7066,7 @@
           </a:prstGeom>
         </p:spPr>
         <p:txBody>
-          <a:bodyPr anchorCtr="0" anchor="b" bIns="91425" lIns="91425" rIns="91425" wrap="square" tIns="91425">
+          <a:bodyPr wrap="square" lIns="91425" tIns="91425" rIns="91425" bIns="91425" anchor="b" anchorCtr="0">
             <a:noAutofit/>
           </a:bodyPr>
           <a:lstStyle/>
@@ -6799,9 +7087,11 @@
       <p:sp>
         <p:nvSpPr>
           <p:cNvPr id="121" name="Shape 121"/>
-          <p:cNvSpPr txBox="1"/>
+          <p:cNvSpPr txBox="1">
+            <a:spLocks noGrp="1"/>
+          </p:cNvSpPr>
           <p:nvPr>
-            <p:ph idx="4294967295" type="body"/>
+            <p:ph type="body" idx="4294967295"/>
           </p:nvPr>
         </p:nvSpPr>
         <p:spPr>
@@ -6814,7 +7104,7 @@
           </a:prstGeom>
         </p:spPr>
         <p:txBody>
-          <a:bodyPr anchorCtr="0" anchor="t" bIns="91425" lIns="91425" rIns="91425" wrap="square" tIns="91425">
+          <a:bodyPr wrap="square" lIns="91425" tIns="91425" rIns="91425" bIns="91425" anchor="t" anchorCtr="0">
             <a:noAutofit/>
           </a:bodyPr>
           <a:lstStyle/>
@@ -6841,7 +7131,7 @@
 </file>
 
 <file path=ppt/theme/theme1.xml><?xml version="1.0" encoding="utf-8"?>
-<a:theme xmlns:a="http://schemas.openxmlformats.org/drawingml/2006/main" xmlns:r="http://schemas.openxmlformats.org/officeDocument/2006/relationships" name="Marina">
+<a:theme xmlns:a="http://schemas.openxmlformats.org/drawingml/2006/main" name="Marina">
   <a:themeElements>
     <a:clrScheme name="Marina">
       <a:dk1>
@@ -7116,11 +7406,13 @@
       </a:bgFillStyleLst>
     </a:fmtScheme>
   </a:themeElements>
+  <a:objectDefaults/>
+  <a:extraClrSchemeLst/>
 </a:theme>
 </file>
 
 <file path=ppt/theme/theme2.xml><?xml version="1.0" encoding="utf-8"?>
-<a:theme xmlns:a="http://schemas.openxmlformats.org/drawingml/2006/main" xmlns:r="http://schemas.openxmlformats.org/officeDocument/2006/relationships" name="Custom Theme">
+<a:theme xmlns:a="http://schemas.openxmlformats.org/drawingml/2006/main" name="Custom Theme">
   <a:themeElements>
     <a:clrScheme name="Default">
       <a:dk1>
@@ -7395,5 +7687,7 @@
       </a:bgFillStyleLst>
     </a:fmtScheme>
   </a:themeElements>
+  <a:objectDefaults/>
+  <a:extraClrSchemeLst/>
 </a:theme>
 </file>
</xml_diff>